<commit_message>
Right side content added. Terminology/Features. Opportunities for industry adoption, paper links
</commit_message>
<xml_diff>
--- a/pycon-poster.pptx
+++ b/pycon-poster.pptx
@@ -4377,7 +4377,7 @@
         <p:spPr>
           <a:xfrm>
             <a:off x="1066800" y="8077200"/>
-            <a:ext cx="9975850" cy="26961229"/>
+            <a:ext cx="9975850" cy="26591893"/>
           </a:xfrm>
           <a:prstGeom prst="rect">
             <a:avLst/>
@@ -4647,7 +4647,17 @@
                 <a:latin typeface="LeituraSans-Grot 2"/>
                 <a:cs typeface="LeituraSans-Grot 2"/>
               </a:rPr>
-              <a:t>System Under Test (Declarative): </a:t>
+              <a:t>System Under Test (</a:t>
+            </a:r>
+            <a:r>
+              <a:rPr lang="en-US" sz="3000" b="1" dirty="0" smtClean="0">
+                <a:solidFill>
+                  <a:srgbClr val="000000"/>
+                </a:solidFill>
+                <a:latin typeface="LeituraSans-Grot 2"/>
+                <a:cs typeface="LeituraSans-Grot 2"/>
+              </a:rPr>
+              <a:t>Declarative): </a:t>
             </a:r>
             <a:r>
               <a:rPr lang="en-US" sz="3000" dirty="0" smtClean="0">
@@ -4727,7 +4737,7 @@
                 <a:latin typeface="LeituraSans-Grot 2"/>
                 <a:cs typeface="LeituraSans-Grot 2"/>
               </a:rPr>
-              <a:t> extension</a:t>
+              <a:t> </a:t>
             </a:r>
             <a:r>
               <a:rPr lang="en-US" sz="3000" dirty="0" smtClean="0">
@@ -4737,9 +4747,9 @@
                 <a:latin typeface="LeituraSans-Grot 2"/>
                 <a:cs typeface="LeituraSans-Grot 2"/>
               </a:rPr>
-              <a:t>.</a:t>
-            </a:r>
-            <a:br>
+              <a:t>extension</a:t>
+            </a:r>
+            <a:r>
               <a:rPr lang="en-US" sz="3000" dirty="0" smtClean="0">
                 <a:solidFill>
                   <a:srgbClr val="000000"/>
@@ -4747,7 +4757,33 @@
                 <a:latin typeface="LeituraSans-Grot 2"/>
                 <a:cs typeface="LeituraSans-Grot 2"/>
               </a:rPr>
-            </a:br>
+              <a:t>, </a:t>
+            </a:r>
+            <a:r>
+              <a:rPr lang="en-US" sz="3000" dirty="0" err="1" smtClean="0">
+                <a:solidFill>
+                  <a:srgbClr val="000000"/>
+                </a:solidFill>
+                <a:latin typeface="LeituraSans-Grot 2"/>
+                <a:cs typeface="LeituraSans-Grot 2"/>
+              </a:rPr>
+              <a:t>a.k.a</a:t>
+            </a:r>
+            <a:r>
+              <a:rPr lang="en-US" sz="3000" dirty="0" smtClean="0">
+                <a:solidFill>
+                  <a:srgbClr val="000000"/>
+                </a:solidFill>
+                <a:latin typeface="LeituraSans-Grot 2"/>
+                <a:cs typeface="LeituraSans-Grot 2"/>
+              </a:rPr>
+              <a:t> ACT files.</a:t>
+            </a:r>
+          </a:p>
+          <a:p>
+            <a:pPr>
+              <a:defRPr/>
+            </a:pPr>
             <a:endParaRPr lang="en-US" sz="3000" dirty="0" smtClean="0">
               <a:solidFill>
                 <a:srgbClr val="000000"/>
@@ -5093,8 +5129,8 @@
         </p:nvSpPr>
         <p:spPr>
           <a:xfrm>
-            <a:off x="21793200" y="19126200"/>
-            <a:ext cx="9975850" cy="12311063"/>
+            <a:off x="21793200" y="18745200"/>
+            <a:ext cx="9975850" cy="4770537"/>
           </a:xfrm>
           <a:prstGeom prst="rect">
             <a:avLst/>
@@ -5111,1527 +5147,16 @@
               <a:defRPr/>
             </a:pPr>
             <a:r>
-              <a:rPr lang="en-US" sz="5400" dirty="0">
+              <a:rPr lang="en-US" sz="4000" dirty="0" smtClean="0">
                 <a:solidFill>
                   <a:srgbClr val="000000"/>
                 </a:solidFill>
                 <a:latin typeface="LeituraSans-Grot 3"/>
                 <a:cs typeface="LeituraSans-Grot 3"/>
               </a:rPr>
-              <a:t>Head 1 Head 1 Head 1</a:t>
-            </a:r>
-          </a:p>
-          <a:p>
-            <a:pPr marL="571500" indent="-571500">
-              <a:buFont typeface="Arial"/>
-              <a:buChar char="•"/>
-              <a:defRPr/>
-            </a:pPr>
-            <a:r>
-              <a:rPr lang="en-US" sz="3000" dirty="0" err="1">
-                <a:solidFill>
-                  <a:srgbClr val="000000"/>
-                </a:solidFill>
-                <a:latin typeface="LeituraSans-Grot 2"/>
-                <a:cs typeface="LeituraSans-Grot 2"/>
-              </a:rPr>
-              <a:t>Velit</a:t>
-            </a:r>
-            <a:r>
-              <a:rPr lang="en-US" sz="3000" dirty="0">
-                <a:solidFill>
-                  <a:srgbClr val="000000"/>
-                </a:solidFill>
-                <a:latin typeface="LeituraSans-Grot 2"/>
-                <a:cs typeface="LeituraSans-Grot 2"/>
-              </a:rPr>
-              <a:t> </a:t>
-            </a:r>
-            <a:r>
-              <a:rPr lang="en-US" sz="3000" dirty="0" err="1">
-                <a:solidFill>
-                  <a:srgbClr val="000000"/>
-                </a:solidFill>
-                <a:latin typeface="LeituraSans-Grot 2"/>
-                <a:cs typeface="LeituraSans-Grot 2"/>
-              </a:rPr>
-              <a:t>vendipit</a:t>
-            </a:r>
-            <a:r>
-              <a:rPr lang="en-US" sz="3000" dirty="0">
-                <a:solidFill>
-                  <a:srgbClr val="000000"/>
-                </a:solidFill>
-                <a:latin typeface="LeituraSans-Grot 2"/>
-                <a:cs typeface="LeituraSans-Grot 2"/>
-              </a:rPr>
-              <a:t>, </a:t>
-            </a:r>
-            <a:r>
-              <a:rPr lang="en-US" sz="3000" dirty="0" err="1">
-                <a:solidFill>
-                  <a:srgbClr val="000000"/>
-                </a:solidFill>
-                <a:latin typeface="LeituraSans-Grot 2"/>
-                <a:cs typeface="LeituraSans-Grot 2"/>
-              </a:rPr>
-              <a:t>quat</a:t>
-            </a:r>
-            <a:r>
-              <a:rPr lang="en-US" sz="3000" dirty="0">
-                <a:solidFill>
-                  <a:srgbClr val="000000"/>
-                </a:solidFill>
-                <a:latin typeface="LeituraSans-Grot 2"/>
-                <a:cs typeface="LeituraSans-Grot 2"/>
-              </a:rPr>
-              <a:t> </a:t>
-            </a:r>
-            <a:r>
-              <a:rPr lang="en-US" sz="3000" dirty="0" err="1">
-                <a:solidFill>
-                  <a:srgbClr val="000000"/>
-                </a:solidFill>
-                <a:latin typeface="LeituraSans-Grot 2"/>
-                <a:cs typeface="LeituraSans-Grot 2"/>
-              </a:rPr>
-              <a:t>iustrud</a:t>
-            </a:r>
-            <a:r>
-              <a:rPr lang="en-US" sz="3000" dirty="0">
-                <a:solidFill>
-                  <a:srgbClr val="000000"/>
-                </a:solidFill>
-                <a:latin typeface="LeituraSans-Grot 2"/>
-                <a:cs typeface="LeituraSans-Grot 2"/>
-              </a:rPr>
-              <a:t> </a:t>
-            </a:r>
-            <a:r>
-              <a:rPr lang="en-US" sz="3000" dirty="0" err="1">
-                <a:solidFill>
-                  <a:srgbClr val="000000"/>
-                </a:solidFill>
-                <a:latin typeface="LeituraSans-Grot 2"/>
-                <a:cs typeface="LeituraSans-Grot 2"/>
-              </a:rPr>
-              <a:t>eraeseniat</a:t>
-            </a:r>
-            <a:r>
-              <a:rPr lang="en-US" sz="3000" dirty="0">
-                <a:solidFill>
-                  <a:srgbClr val="000000"/>
-                </a:solidFill>
-                <a:latin typeface="LeituraSans-Grot 2"/>
-                <a:cs typeface="LeituraSans-Grot 2"/>
-              </a:rPr>
-              <a:t> do </a:t>
-            </a:r>
-            <a:r>
-              <a:rPr lang="en-US" sz="3000" dirty="0" err="1">
-                <a:solidFill>
-                  <a:srgbClr val="000000"/>
-                </a:solidFill>
-                <a:latin typeface="LeituraSans-Grot 2"/>
-                <a:cs typeface="LeituraSans-Grot 2"/>
-              </a:rPr>
-              <a:t>conummod</a:t>
-            </a:r>
-            <a:r>
-              <a:rPr lang="en-US" sz="3000" dirty="0">
-                <a:solidFill>
-                  <a:srgbClr val="000000"/>
-                </a:solidFill>
-                <a:latin typeface="LeituraSans-Grot 2"/>
-                <a:cs typeface="LeituraSans-Grot 2"/>
-              </a:rPr>
-              <a:t> </a:t>
-            </a:r>
-            <a:r>
-              <a:rPr lang="en-US" sz="3000" dirty="0" err="1">
-                <a:solidFill>
-                  <a:srgbClr val="000000"/>
-                </a:solidFill>
-                <a:latin typeface="LeituraSans-Grot 2"/>
-                <a:cs typeface="LeituraSans-Grot 2"/>
-              </a:rPr>
-              <a:t>ea</a:t>
-            </a:r>
-            <a:r>
-              <a:rPr lang="en-US" sz="3000" dirty="0">
-                <a:solidFill>
-                  <a:srgbClr val="000000"/>
-                </a:solidFill>
-                <a:latin typeface="LeituraSans-Grot 2"/>
-                <a:cs typeface="LeituraSans-Grot 2"/>
-              </a:rPr>
-              <a:t> </a:t>
-            </a:r>
-            <a:r>
-              <a:rPr lang="en-US" sz="3000" dirty="0" err="1">
-                <a:solidFill>
-                  <a:srgbClr val="000000"/>
-                </a:solidFill>
-                <a:latin typeface="LeituraSans-Grot 2"/>
-                <a:cs typeface="LeituraSans-Grot 2"/>
-              </a:rPr>
-              <a:t>alisci</a:t>
-            </a:r>
-            <a:r>
-              <a:rPr lang="en-US" sz="3000" dirty="0">
-                <a:solidFill>
-                  <a:srgbClr val="000000"/>
-                </a:solidFill>
-                <a:latin typeface="LeituraSans-Grot 2"/>
-                <a:cs typeface="LeituraSans-Grot 2"/>
-              </a:rPr>
-              <a:t> tie </a:t>
-            </a:r>
-            <a:r>
-              <a:rPr lang="en-US" sz="3000" dirty="0" err="1">
-                <a:solidFill>
-                  <a:srgbClr val="000000"/>
-                </a:solidFill>
-                <a:latin typeface="LeituraSans-Grot 2"/>
-                <a:cs typeface="LeituraSans-Grot 2"/>
-              </a:rPr>
-              <a:t>vel</a:t>
-            </a:r>
-            <a:r>
-              <a:rPr lang="en-US" sz="3000" dirty="0">
-                <a:solidFill>
-                  <a:srgbClr val="000000"/>
-                </a:solidFill>
-                <a:latin typeface="LeituraSans-Grot 2"/>
-                <a:cs typeface="LeituraSans-Grot 2"/>
-              </a:rPr>
-              <a:t> </a:t>
-            </a:r>
-            <a:r>
-              <a:rPr lang="en-US" sz="3000" dirty="0" err="1">
-                <a:solidFill>
-                  <a:srgbClr val="000000"/>
-                </a:solidFill>
-                <a:latin typeface="LeituraSans-Grot 2"/>
-                <a:cs typeface="LeituraSans-Grot 2"/>
-              </a:rPr>
-              <a:t>ea</a:t>
-            </a:r>
-            <a:r>
-              <a:rPr lang="en-US" sz="3000" dirty="0">
-                <a:solidFill>
-                  <a:srgbClr val="000000"/>
-                </a:solidFill>
-                <a:latin typeface="LeituraSans-Grot 2"/>
-                <a:cs typeface="LeituraSans-Grot 2"/>
-              </a:rPr>
-              <a:t> </a:t>
-            </a:r>
-            <a:r>
-              <a:rPr lang="en-US" sz="3000" dirty="0" err="1">
-                <a:solidFill>
-                  <a:srgbClr val="000000"/>
-                </a:solidFill>
-                <a:latin typeface="LeituraSans-Grot 2"/>
-                <a:cs typeface="LeituraSans-Grot 2"/>
-              </a:rPr>
-              <a:t>commodo</a:t>
-            </a:r>
-            <a:r>
-              <a:rPr lang="en-US" sz="3000" dirty="0">
-                <a:solidFill>
-                  <a:srgbClr val="000000"/>
-                </a:solidFill>
-                <a:latin typeface="LeituraSans-Grot 2"/>
-                <a:cs typeface="LeituraSans-Grot 2"/>
-              </a:rPr>
-              <a:t> </a:t>
-            </a:r>
-            <a:r>
-              <a:rPr lang="en-US" sz="3000" dirty="0" err="1">
-                <a:solidFill>
-                  <a:srgbClr val="000000"/>
-                </a:solidFill>
-                <a:latin typeface="LeituraSans-Grot 2"/>
-                <a:cs typeface="LeituraSans-Grot 2"/>
-              </a:rPr>
-              <a:t>lortis</a:t>
-            </a:r>
-            <a:r>
-              <a:rPr lang="en-US" sz="3000" dirty="0">
-                <a:solidFill>
-                  <a:srgbClr val="000000"/>
-                </a:solidFill>
-                <a:latin typeface="LeituraSans-Grot 2"/>
-                <a:cs typeface="LeituraSans-Grot 2"/>
-              </a:rPr>
-              <a:t> </a:t>
-            </a:r>
-            <a:r>
-              <a:rPr lang="en-US" sz="3000" dirty="0" err="1">
-                <a:solidFill>
-                  <a:srgbClr val="000000"/>
-                </a:solidFill>
-                <a:latin typeface="LeituraSans-Grot 2"/>
-                <a:cs typeface="LeituraSans-Grot 2"/>
-              </a:rPr>
-              <a:t>aliquamcommy</a:t>
-            </a:r>
-            <a:r>
-              <a:rPr lang="en-US" sz="3000" dirty="0">
-                <a:solidFill>
-                  <a:srgbClr val="000000"/>
-                </a:solidFill>
-                <a:latin typeface="LeituraSans-Grot 2"/>
-                <a:cs typeface="LeituraSans-Grot 2"/>
-              </a:rPr>
-              <a:t> </a:t>
-            </a:r>
-            <a:r>
-              <a:rPr lang="en-US" sz="3000" dirty="0" err="1">
-                <a:solidFill>
-                  <a:srgbClr val="000000"/>
-                </a:solidFill>
-                <a:latin typeface="LeituraSans-Grot 2"/>
-                <a:cs typeface="LeituraSans-Grot 2"/>
-              </a:rPr>
-              <a:t>niat</a:t>
-            </a:r>
-            <a:r>
-              <a:rPr lang="en-US" sz="3000" dirty="0">
-                <a:solidFill>
-                  <a:srgbClr val="000000"/>
-                </a:solidFill>
-                <a:latin typeface="LeituraSans-Grot 2"/>
-                <a:cs typeface="LeituraSans-Grot 2"/>
-              </a:rPr>
-              <a:t> </a:t>
-            </a:r>
-            <a:r>
-              <a:rPr lang="en-US" sz="3000" dirty="0" err="1">
-                <a:solidFill>
-                  <a:srgbClr val="000000"/>
-                </a:solidFill>
-                <a:latin typeface="LeituraSans-Grot 2"/>
-                <a:cs typeface="LeituraSans-Grot 2"/>
-              </a:rPr>
-              <a:t>aliquat</a:t>
-            </a:r>
-            <a:r>
-              <a:rPr lang="en-US" sz="3000" dirty="0">
-                <a:solidFill>
-                  <a:srgbClr val="000000"/>
-                </a:solidFill>
-                <a:latin typeface="LeituraSans-Grot 2"/>
-                <a:cs typeface="LeituraSans-Grot 2"/>
-              </a:rPr>
-              <a:t> </a:t>
-            </a:r>
-            <a:r>
-              <a:rPr lang="en-US" sz="3000" dirty="0" err="1">
-                <a:solidFill>
-                  <a:srgbClr val="000000"/>
-                </a:solidFill>
-                <a:latin typeface="LeituraSans-Grot 2"/>
-                <a:cs typeface="LeituraSans-Grot 2"/>
-              </a:rPr>
-              <a:t>niam</a:t>
-            </a:r>
-            <a:r>
-              <a:rPr lang="en-US" sz="3000" dirty="0">
-                <a:solidFill>
-                  <a:srgbClr val="000000"/>
-                </a:solidFill>
-                <a:latin typeface="LeituraSans-Grot 2"/>
-                <a:cs typeface="LeituraSans-Grot 2"/>
-              </a:rPr>
-              <a:t> </a:t>
-            </a:r>
-            <a:r>
-              <a:rPr lang="en-US" sz="3000" dirty="0" err="1">
-                <a:solidFill>
-                  <a:srgbClr val="000000"/>
-                </a:solidFill>
-                <a:latin typeface="LeituraSans-Grot 2"/>
-                <a:cs typeface="LeituraSans-Grot 2"/>
-              </a:rPr>
-              <a:t>ercillan</a:t>
-            </a:r>
-            <a:r>
-              <a:rPr lang="en-US" sz="3000" dirty="0">
-                <a:solidFill>
-                  <a:srgbClr val="000000"/>
-                </a:solidFill>
-                <a:latin typeface="LeituraSans-Grot 2"/>
-                <a:cs typeface="LeituraSans-Grot 2"/>
-              </a:rPr>
-              <a:t> </a:t>
-            </a:r>
-            <a:r>
-              <a:rPr lang="en-US" sz="3000" dirty="0" err="1">
-                <a:solidFill>
-                  <a:srgbClr val="000000"/>
-                </a:solidFill>
-                <a:latin typeface="LeituraSans-Grot 2"/>
-                <a:cs typeface="LeituraSans-Grot 2"/>
-              </a:rPr>
-              <a:t>eu</a:t>
-            </a:r>
-            <a:r>
-              <a:rPr lang="en-US" sz="3000" dirty="0">
-                <a:solidFill>
-                  <a:srgbClr val="000000"/>
-                </a:solidFill>
-                <a:latin typeface="LeituraSans-Grot 2"/>
-                <a:cs typeface="LeituraSans-Grot 2"/>
-              </a:rPr>
-              <a:t> </a:t>
-            </a:r>
-            <a:r>
-              <a:rPr lang="en-US" sz="3000" dirty="0" err="1">
-                <a:solidFill>
-                  <a:srgbClr val="000000"/>
-                </a:solidFill>
-                <a:latin typeface="LeituraSans-Grot 2"/>
-                <a:cs typeface="LeituraSans-Grot 2"/>
-              </a:rPr>
-              <a:t>feugue</a:t>
-            </a:r>
-            <a:r>
-              <a:rPr lang="en-US" sz="3000" dirty="0">
-                <a:solidFill>
-                  <a:srgbClr val="000000"/>
-                </a:solidFill>
-                <a:latin typeface="LeituraSans-Grot 2"/>
-                <a:cs typeface="LeituraSans-Grot 2"/>
-              </a:rPr>
-              <a:t> </a:t>
-            </a:r>
-            <a:r>
-              <a:rPr lang="en-US" sz="3000" dirty="0" err="1">
-                <a:solidFill>
-                  <a:srgbClr val="000000"/>
-                </a:solidFill>
-                <a:latin typeface="LeituraSans-Grot 2"/>
-                <a:cs typeface="LeituraSans-Grot 2"/>
-              </a:rPr>
-              <a:t>magnisl</a:t>
-            </a:r>
-            <a:r>
-              <a:rPr lang="en-US" sz="3000" dirty="0">
-                <a:solidFill>
-                  <a:srgbClr val="000000"/>
-                </a:solidFill>
-                <a:latin typeface="LeituraSans-Grot 2"/>
-                <a:cs typeface="LeituraSans-Grot 2"/>
-              </a:rPr>
-              <a:t> </a:t>
-            </a:r>
-            <a:r>
-              <a:rPr lang="en-US" sz="3000" dirty="0" err="1">
-                <a:solidFill>
-                  <a:srgbClr val="000000"/>
-                </a:solidFill>
-                <a:latin typeface="LeituraSans-Grot 2"/>
-                <a:cs typeface="LeituraSans-Grot 2"/>
-              </a:rPr>
-              <a:t>utpat</a:t>
-            </a:r>
-            <a:r>
-              <a:rPr lang="en-US" sz="3000" dirty="0">
-                <a:solidFill>
-                  <a:srgbClr val="000000"/>
-                </a:solidFill>
-                <a:latin typeface="LeituraSans-Grot 2"/>
-                <a:cs typeface="LeituraSans-Grot 2"/>
-              </a:rPr>
-              <a:t> </a:t>
-            </a:r>
-            <a:r>
-              <a:rPr lang="en-US" sz="3000" dirty="0" err="1">
-                <a:solidFill>
-                  <a:srgbClr val="000000"/>
-                </a:solidFill>
-                <a:latin typeface="LeituraSans-Grot 2"/>
-                <a:cs typeface="LeituraSans-Grot 2"/>
-              </a:rPr>
-              <a:t>autat</a:t>
-            </a:r>
-            <a:r>
-              <a:rPr lang="en-US" sz="3000" dirty="0">
-                <a:solidFill>
-                  <a:srgbClr val="000000"/>
-                </a:solidFill>
-                <a:latin typeface="LeituraSans-Grot 2"/>
-                <a:cs typeface="LeituraSans-Grot 2"/>
-              </a:rPr>
-              <a:t>. Bullet. </a:t>
-            </a:r>
-            <a:r>
-              <a:rPr lang="en-US" sz="3000" dirty="0" err="1">
-                <a:solidFill>
-                  <a:srgbClr val="000000"/>
-                </a:solidFill>
-                <a:latin typeface="LeituraSans-Grot 2"/>
-                <a:cs typeface="LeituraSans-Grot 2"/>
-              </a:rPr>
-              <a:t>lum</a:t>
-            </a:r>
-            <a:r>
-              <a:rPr lang="en-US" sz="3000" dirty="0">
-                <a:solidFill>
-                  <a:srgbClr val="000000"/>
-                </a:solidFill>
-                <a:latin typeface="LeituraSans-Grot 2"/>
-                <a:cs typeface="LeituraSans-Grot 2"/>
-              </a:rPr>
-              <a:t> </a:t>
-            </a:r>
-            <a:r>
-              <a:rPr lang="en-US" sz="3000" dirty="0" err="1">
-                <a:solidFill>
-                  <a:srgbClr val="000000"/>
-                </a:solidFill>
-                <a:latin typeface="LeituraSans-Grot 2"/>
-                <a:cs typeface="LeituraSans-Grot 2"/>
-              </a:rPr>
-              <a:t>exer</a:t>
-            </a:r>
-            <a:r>
-              <a:rPr lang="en-US" sz="3000" dirty="0">
-                <a:solidFill>
-                  <a:srgbClr val="000000"/>
-                </a:solidFill>
-                <a:latin typeface="LeituraSans-Grot 2"/>
-                <a:cs typeface="LeituraSans-Grot 2"/>
-              </a:rPr>
-              <a:t> </a:t>
-            </a:r>
-            <a:r>
-              <a:rPr lang="en-US" sz="3000" dirty="0" err="1">
-                <a:solidFill>
-                  <a:srgbClr val="000000"/>
-                </a:solidFill>
-                <a:latin typeface="LeituraSans-Grot 2"/>
-                <a:cs typeface="LeituraSans-Grot 2"/>
-              </a:rPr>
-              <a:t>adipsustrud</a:t>
-            </a:r>
-            <a:r>
-              <a:rPr lang="en-US" sz="3000" dirty="0">
-                <a:solidFill>
-                  <a:srgbClr val="000000"/>
-                </a:solidFill>
-                <a:latin typeface="LeituraSans-Grot 2"/>
-                <a:cs typeface="LeituraSans-Grot 2"/>
-              </a:rPr>
-              <a:t> </a:t>
-            </a:r>
-            <a:r>
-              <a:rPr lang="en-US" sz="3000" dirty="0" err="1">
-                <a:solidFill>
-                  <a:srgbClr val="000000"/>
-                </a:solidFill>
-                <a:latin typeface="LeituraSans-Grot 2"/>
-                <a:cs typeface="LeituraSans-Grot 2"/>
-              </a:rPr>
-              <a:t>doloree</a:t>
-            </a:r>
-            <a:r>
-              <a:rPr lang="en-US" sz="3000" dirty="0">
-                <a:solidFill>
-                  <a:srgbClr val="000000"/>
-                </a:solidFill>
-                <a:latin typeface="LeituraSans-Grot 2"/>
-                <a:cs typeface="LeituraSans-Grot 2"/>
-              </a:rPr>
-              <a:t> </a:t>
-            </a:r>
-            <a:r>
-              <a:rPr lang="en-US" sz="3000" dirty="0" err="1">
-                <a:solidFill>
-                  <a:srgbClr val="000000"/>
-                </a:solidFill>
-                <a:latin typeface="LeituraSans-Grot 2"/>
-                <a:cs typeface="LeituraSans-Grot 2"/>
-              </a:rPr>
-              <a:t>tuerat</a:t>
-            </a:r>
-            <a:r>
-              <a:rPr lang="en-US" sz="3000" dirty="0">
-                <a:solidFill>
-                  <a:srgbClr val="000000"/>
-                </a:solidFill>
-                <a:latin typeface="LeituraSans-Grot 2"/>
-                <a:cs typeface="LeituraSans-Grot 2"/>
-              </a:rPr>
-              <a:t> </a:t>
-            </a:r>
-            <a:r>
-              <a:rPr lang="en-US" sz="3000" dirty="0" err="1">
-                <a:solidFill>
-                  <a:srgbClr val="000000"/>
-                </a:solidFill>
-                <a:latin typeface="LeituraSans-Grot 2"/>
-                <a:cs typeface="LeituraSans-Grot 2"/>
-              </a:rPr>
-              <a:t>lorpera</a:t>
-            </a:r>
-            <a:r>
-              <a:rPr lang="en-US" sz="3000" dirty="0">
-                <a:solidFill>
-                  <a:srgbClr val="000000"/>
-                </a:solidFill>
-                <a:latin typeface="LeituraSans-Grot 2"/>
-                <a:cs typeface="LeituraSans-Grot 2"/>
-              </a:rPr>
-              <a:t> </a:t>
-            </a:r>
-            <a:r>
-              <a:rPr lang="en-US" sz="3000" dirty="0" err="1">
-                <a:solidFill>
-                  <a:srgbClr val="000000"/>
-                </a:solidFill>
-                <a:latin typeface="LeituraSans-Grot 2"/>
-                <a:cs typeface="LeituraSans-Grot 2"/>
-              </a:rPr>
-              <a:t>esenibh</a:t>
-            </a:r>
-            <a:r>
-              <a:rPr lang="en-US" sz="3000" dirty="0">
-                <a:solidFill>
-                  <a:srgbClr val="000000"/>
-                </a:solidFill>
-                <a:latin typeface="LeituraSans-Grot 2"/>
-                <a:cs typeface="LeituraSans-Grot 2"/>
-              </a:rPr>
-              <a:t> </a:t>
-            </a:r>
-            <a:r>
-              <a:rPr lang="en-US" sz="3000" dirty="0" err="1">
-                <a:solidFill>
-                  <a:srgbClr val="000000"/>
-                </a:solidFill>
-                <a:latin typeface="LeituraSans-Grot 2"/>
-                <a:cs typeface="LeituraSans-Grot 2"/>
-              </a:rPr>
-              <a:t>eu</a:t>
-            </a:r>
-            <a:r>
-              <a:rPr lang="en-US" sz="3000" dirty="0">
-                <a:solidFill>
-                  <a:srgbClr val="000000"/>
-                </a:solidFill>
-                <a:latin typeface="LeituraSans-Grot 2"/>
-                <a:cs typeface="LeituraSans-Grot 2"/>
-              </a:rPr>
-              <a:t> </a:t>
-            </a:r>
-            <a:r>
-              <a:rPr lang="en-US" sz="3000" dirty="0" err="1">
-                <a:solidFill>
-                  <a:srgbClr val="000000"/>
-                </a:solidFill>
-                <a:latin typeface="LeituraSans-Grot 2"/>
-                <a:cs typeface="LeituraSans-Grot 2"/>
-              </a:rPr>
-              <a:t>faccum</a:t>
-            </a:r>
-            <a:r>
-              <a:rPr lang="en-US" sz="3000" dirty="0">
-                <a:solidFill>
-                  <a:srgbClr val="000000"/>
-                </a:solidFill>
-                <a:latin typeface="LeituraSans-Grot 2"/>
-                <a:cs typeface="LeituraSans-Grot 2"/>
-              </a:rPr>
-              <a:t> </a:t>
-            </a:r>
-            <a:r>
-              <a:rPr lang="en-US" sz="3000" dirty="0" err="1">
-                <a:solidFill>
-                  <a:srgbClr val="000000"/>
-                </a:solidFill>
-                <a:latin typeface="LeituraSans-Grot 2"/>
-                <a:cs typeface="LeituraSans-Grot 2"/>
-              </a:rPr>
-              <a:t>eum</a:t>
-            </a:r>
-            <a:r>
-              <a:rPr lang="en-US" sz="3000" dirty="0">
-                <a:solidFill>
-                  <a:srgbClr val="000000"/>
-                </a:solidFill>
-                <a:latin typeface="LeituraSans-Grot 2"/>
-                <a:cs typeface="LeituraSans-Grot 2"/>
-              </a:rPr>
-              <a:t> </a:t>
-            </a:r>
-            <a:r>
-              <a:rPr lang="en-US" sz="3000" dirty="0" err="1">
-                <a:solidFill>
-                  <a:srgbClr val="000000"/>
-                </a:solidFill>
-                <a:latin typeface="LeituraSans-Grot 2"/>
-                <a:cs typeface="LeituraSans-Grot 2"/>
-              </a:rPr>
-              <a:t>iuscili</a:t>
-            </a:r>
-            <a:r>
-              <a:rPr lang="en-US" sz="3000" dirty="0">
-                <a:solidFill>
-                  <a:srgbClr val="000000"/>
-                </a:solidFill>
-                <a:latin typeface="LeituraSans-Grot 2"/>
-                <a:cs typeface="LeituraSans-Grot 2"/>
-              </a:rPr>
-              <a:t> </a:t>
-            </a:r>
-            <a:r>
-              <a:rPr lang="en-US" sz="3000" dirty="0" err="1">
-                <a:solidFill>
-                  <a:srgbClr val="000000"/>
-                </a:solidFill>
-                <a:latin typeface="LeituraSans-Grot 2"/>
-                <a:cs typeface="LeituraSans-Grot 2"/>
-              </a:rPr>
-              <a:t>quamcommy</a:t>
-            </a:r>
-            <a:r>
-              <a:rPr lang="en-US" sz="3000" dirty="0">
-                <a:solidFill>
-                  <a:srgbClr val="000000"/>
-                </a:solidFill>
-                <a:latin typeface="LeituraSans-Grot 2"/>
-                <a:cs typeface="LeituraSans-Grot 2"/>
-              </a:rPr>
-              <a:t> nit </a:t>
-            </a:r>
-            <a:r>
-              <a:rPr lang="en-US" sz="3000" dirty="0" err="1">
-                <a:solidFill>
-                  <a:srgbClr val="000000"/>
-                </a:solidFill>
-                <a:latin typeface="LeituraSans-Grot 2"/>
-                <a:cs typeface="LeituraSans-Grot 2"/>
-              </a:rPr>
-              <a:t>lorerillut</a:t>
-            </a:r>
-            <a:r>
-              <a:rPr lang="en-US" sz="3000" dirty="0">
-                <a:solidFill>
-                  <a:srgbClr val="000000"/>
-                </a:solidFill>
-                <a:latin typeface="LeituraSans-Grot 2"/>
-                <a:cs typeface="LeituraSans-Grot 2"/>
-              </a:rPr>
-              <a:t> </a:t>
-            </a:r>
-            <a:r>
-              <a:rPr lang="en-US" sz="3000" dirty="0" err="1">
-                <a:solidFill>
-                  <a:srgbClr val="000000"/>
-                </a:solidFill>
-                <a:latin typeface="LeituraSans-Grot 2"/>
-                <a:cs typeface="LeituraSans-Grot 2"/>
-              </a:rPr>
-              <a:t>ullam</a:t>
-            </a:r>
-            <a:r>
-              <a:rPr lang="en-US" sz="3000" dirty="0">
-                <a:solidFill>
-                  <a:srgbClr val="000000"/>
-                </a:solidFill>
-                <a:latin typeface="LeituraSans-Grot 2"/>
-                <a:cs typeface="LeituraSans-Grot 2"/>
-              </a:rPr>
-              <a:t> </a:t>
-            </a:r>
-            <a:r>
-              <a:rPr lang="en-US" sz="3000" dirty="0" err="1">
-                <a:solidFill>
-                  <a:srgbClr val="000000"/>
-                </a:solidFill>
-                <a:latin typeface="LeituraSans-Grot 2"/>
-                <a:cs typeface="LeituraSans-Grot 2"/>
-              </a:rPr>
-              <a:t>quat</a:t>
-            </a:r>
-            <a:r>
-              <a:rPr lang="en-US" sz="3000" dirty="0">
-                <a:solidFill>
-                  <a:srgbClr val="000000"/>
-                </a:solidFill>
-                <a:latin typeface="LeituraSans-Grot 2"/>
-                <a:cs typeface="LeituraSans-Grot 2"/>
-              </a:rPr>
-              <a:t> lore </a:t>
-            </a:r>
-            <a:r>
-              <a:rPr lang="en-US" sz="3000" dirty="0" err="1">
-                <a:solidFill>
-                  <a:srgbClr val="000000"/>
-                </a:solidFill>
-                <a:latin typeface="LeituraSans-Grot 2"/>
-                <a:cs typeface="LeituraSans-Grot 2"/>
-              </a:rPr>
-              <a:t>verostrud</a:t>
-            </a:r>
-            <a:r>
-              <a:rPr lang="en-US" sz="3000" dirty="0">
-                <a:solidFill>
-                  <a:srgbClr val="000000"/>
-                </a:solidFill>
-                <a:latin typeface="LeituraSans-Grot 2"/>
-                <a:cs typeface="LeituraSans-Grot 2"/>
-              </a:rPr>
-              <a:t> </a:t>
-            </a:r>
-            <a:r>
-              <a:rPr lang="en-US" sz="3000" dirty="0" err="1">
-                <a:solidFill>
-                  <a:srgbClr val="000000"/>
-                </a:solidFill>
-                <a:latin typeface="LeituraSans-Grot 2"/>
-                <a:cs typeface="LeituraSans-Grot 2"/>
-              </a:rPr>
-              <a:t>ming</a:t>
-            </a:r>
-            <a:r>
-              <a:rPr lang="en-US" sz="3000" dirty="0">
-                <a:solidFill>
-                  <a:srgbClr val="000000"/>
-                </a:solidFill>
-                <a:latin typeface="LeituraSans-Grot 2"/>
-                <a:cs typeface="LeituraSans-Grot 2"/>
-              </a:rPr>
-              <a:t> et, </a:t>
-            </a:r>
-            <a:r>
-              <a:rPr lang="en-US" sz="3000" dirty="0" err="1">
-                <a:solidFill>
-                  <a:srgbClr val="000000"/>
-                </a:solidFill>
-                <a:latin typeface="LeituraSans-Grot 2"/>
-                <a:cs typeface="LeituraSans-Grot 2"/>
-              </a:rPr>
-              <a:t>si</a:t>
-            </a:r>
-            <a:r>
-              <a:rPr lang="en-US" sz="3000" dirty="0">
-                <a:solidFill>
-                  <a:srgbClr val="000000"/>
-                </a:solidFill>
-                <a:latin typeface="LeituraSans-Grot 2"/>
-                <a:cs typeface="LeituraSans-Grot 2"/>
-              </a:rPr>
-              <a:t> tie </a:t>
-            </a:r>
-            <a:r>
-              <a:rPr lang="en-US" sz="3000" dirty="0" err="1">
-                <a:solidFill>
-                  <a:srgbClr val="000000"/>
-                </a:solidFill>
-                <a:latin typeface="LeituraSans-Grot 2"/>
-                <a:cs typeface="LeituraSans-Grot 2"/>
-              </a:rPr>
-              <a:t>faciliquisse</a:t>
-            </a:r>
-            <a:r>
-              <a:rPr lang="en-US" sz="3000" dirty="0">
-                <a:solidFill>
-                  <a:srgbClr val="000000"/>
-                </a:solidFill>
-                <a:latin typeface="LeituraSans-Grot 2"/>
-                <a:cs typeface="LeituraSans-Grot 2"/>
-              </a:rPr>
-              <a:t> </a:t>
-            </a:r>
-            <a:r>
-              <a:rPr lang="en-US" sz="3000" dirty="0" err="1">
-                <a:solidFill>
-                  <a:srgbClr val="000000"/>
-                </a:solidFill>
-                <a:latin typeface="LeituraSans-Grot 2"/>
-                <a:cs typeface="LeituraSans-Grot 2"/>
-              </a:rPr>
-              <a:t>modolortin</a:t>
-            </a:r>
-            <a:r>
-              <a:rPr lang="en-US" sz="3000" dirty="0">
-                <a:solidFill>
-                  <a:srgbClr val="000000"/>
-                </a:solidFill>
-                <a:latin typeface="LeituraSans-Grot 2"/>
-                <a:cs typeface="LeituraSans-Grot 2"/>
-              </a:rPr>
-              <a:t> </a:t>
-            </a:r>
-            <a:r>
-              <a:rPr lang="en-US" sz="3000" dirty="0" err="1">
-                <a:solidFill>
-                  <a:srgbClr val="000000"/>
-                </a:solidFill>
-                <a:latin typeface="LeituraSans-Grot 2"/>
-                <a:cs typeface="LeituraSans-Grot 2"/>
-              </a:rPr>
-              <a:t>volore</a:t>
-            </a:r>
-            <a:r>
-              <a:rPr lang="en-US" sz="3000" dirty="0">
-                <a:solidFill>
-                  <a:srgbClr val="000000"/>
-                </a:solidFill>
-                <a:latin typeface="LeituraSans-Grot 2"/>
-                <a:cs typeface="LeituraSans-Grot 2"/>
-              </a:rPr>
-              <a:t> </a:t>
-            </a:r>
-          </a:p>
-          <a:p>
-            <a:pPr marL="571500" indent="-571500">
-              <a:buFont typeface="Arial"/>
-              <a:buChar char="•"/>
-              <a:defRPr/>
-            </a:pPr>
-            <a:r>
-              <a:rPr lang="en-US" sz="3000" dirty="0" err="1">
-                <a:solidFill>
-                  <a:srgbClr val="000000"/>
-                </a:solidFill>
-                <a:latin typeface="LeituraSans-Grot 2"/>
-                <a:cs typeface="LeituraSans-Grot 2"/>
-              </a:rPr>
-              <a:t>vel</a:t>
-            </a:r>
-            <a:r>
-              <a:rPr lang="en-US" sz="3000" dirty="0">
-                <a:solidFill>
-                  <a:srgbClr val="000000"/>
-                </a:solidFill>
-                <a:latin typeface="LeituraSans-Grot 2"/>
-                <a:cs typeface="LeituraSans-Grot 2"/>
-              </a:rPr>
-              <a:t> et </a:t>
-            </a:r>
-            <a:r>
-              <a:rPr lang="en-US" sz="3000" dirty="0" err="1">
-                <a:solidFill>
-                  <a:srgbClr val="000000"/>
-                </a:solidFill>
-                <a:latin typeface="LeituraSans-Grot 2"/>
-                <a:cs typeface="LeituraSans-Grot 2"/>
-              </a:rPr>
-              <a:t>vel</a:t>
-            </a:r>
-            <a:r>
-              <a:rPr lang="en-US" sz="3000" dirty="0">
-                <a:solidFill>
-                  <a:srgbClr val="000000"/>
-                </a:solidFill>
-                <a:latin typeface="LeituraSans-Grot 2"/>
-                <a:cs typeface="LeituraSans-Grot 2"/>
-              </a:rPr>
-              <a:t> </a:t>
-            </a:r>
-            <a:r>
-              <a:rPr lang="en-US" sz="3000" dirty="0" err="1">
-                <a:solidFill>
-                  <a:srgbClr val="000000"/>
-                </a:solidFill>
-                <a:latin typeface="LeituraSans-Grot 2"/>
-                <a:cs typeface="LeituraSans-Grot 2"/>
-              </a:rPr>
-              <a:t>dionsenit</a:t>
-            </a:r>
-            <a:r>
-              <a:rPr lang="en-US" sz="3000" dirty="0">
-                <a:solidFill>
-                  <a:srgbClr val="000000"/>
-                </a:solidFill>
-                <a:latin typeface="LeituraSans-Grot 2"/>
-                <a:cs typeface="LeituraSans-Grot 2"/>
-              </a:rPr>
-              <a:t> </a:t>
-            </a:r>
-            <a:r>
-              <a:rPr lang="en-US" sz="3000" dirty="0" err="1">
-                <a:solidFill>
-                  <a:srgbClr val="000000"/>
-                </a:solidFill>
-                <a:latin typeface="LeituraSans-Grot 2"/>
-                <a:cs typeface="LeituraSans-Grot 2"/>
-              </a:rPr>
-              <a:t>adit</a:t>
-            </a:r>
-            <a:r>
-              <a:rPr lang="en-US" sz="3000" dirty="0">
-                <a:solidFill>
-                  <a:srgbClr val="000000"/>
-                </a:solidFill>
-                <a:latin typeface="LeituraSans-Grot 2"/>
-                <a:cs typeface="LeituraSans-Grot 2"/>
-              </a:rPr>
-              <a:t>, </a:t>
-            </a:r>
-            <a:r>
-              <a:rPr lang="en-US" sz="3000" dirty="0" err="1">
-                <a:solidFill>
-                  <a:srgbClr val="000000"/>
-                </a:solidFill>
-                <a:latin typeface="LeituraSans-Grot 2"/>
-                <a:cs typeface="LeituraSans-Grot 2"/>
-              </a:rPr>
-              <a:t>consenim</a:t>
-            </a:r>
-            <a:r>
-              <a:rPr lang="en-US" sz="3000" dirty="0">
-                <a:solidFill>
-                  <a:srgbClr val="000000"/>
-                </a:solidFill>
-                <a:latin typeface="LeituraSans-Grot 2"/>
-                <a:cs typeface="LeituraSans-Grot 2"/>
-              </a:rPr>
-              <a:t> </a:t>
-            </a:r>
-            <a:r>
-              <a:rPr lang="en-US" sz="3000" dirty="0" err="1">
-                <a:solidFill>
-                  <a:srgbClr val="000000"/>
-                </a:solidFill>
-                <a:latin typeface="LeituraSans-Grot 2"/>
-                <a:cs typeface="LeituraSans-Grot 2"/>
-              </a:rPr>
-              <a:t>zzrillute</a:t>
-            </a:r>
-            <a:r>
-              <a:rPr lang="en-US" sz="3000" dirty="0">
-                <a:solidFill>
-                  <a:srgbClr val="000000"/>
-                </a:solidFill>
-                <a:latin typeface="LeituraSans-Grot 2"/>
-                <a:cs typeface="LeituraSans-Grot 2"/>
-              </a:rPr>
-              <a:t> el </a:t>
-            </a:r>
-            <a:r>
-              <a:rPr lang="en-US" sz="3000" dirty="0" err="1">
-                <a:solidFill>
-                  <a:srgbClr val="000000"/>
-                </a:solidFill>
-                <a:latin typeface="LeituraSans-Grot 2"/>
-                <a:cs typeface="LeituraSans-Grot 2"/>
-              </a:rPr>
-              <a:t>euguerostie</a:t>
-            </a:r>
-            <a:r>
-              <a:rPr lang="en-US" sz="3000" dirty="0">
-                <a:solidFill>
-                  <a:srgbClr val="000000"/>
-                </a:solidFill>
-                <a:latin typeface="LeituraSans-Grot 2"/>
-                <a:cs typeface="LeituraSans-Grot 2"/>
-              </a:rPr>
-              <a:t> </a:t>
-            </a:r>
-            <a:r>
-              <a:rPr lang="en-US" sz="3000" dirty="0" err="1">
-                <a:solidFill>
-                  <a:srgbClr val="000000"/>
-                </a:solidFill>
-                <a:latin typeface="LeituraSans-Grot 2"/>
-                <a:cs typeface="LeituraSans-Grot 2"/>
-              </a:rPr>
-              <a:t>faci</a:t>
-            </a:r>
-            <a:r>
-              <a:rPr lang="en-US" sz="3000" dirty="0">
-                <a:solidFill>
-                  <a:srgbClr val="000000"/>
-                </a:solidFill>
-                <a:latin typeface="LeituraSans-Grot 2"/>
-                <a:cs typeface="LeituraSans-Grot 2"/>
-              </a:rPr>
-              <a:t> </a:t>
-            </a:r>
-            <a:r>
-              <a:rPr lang="en-US" sz="3000" dirty="0" err="1">
-                <a:solidFill>
-                  <a:srgbClr val="000000"/>
-                </a:solidFill>
-                <a:latin typeface="LeituraSans-Grot 2"/>
-                <a:cs typeface="LeituraSans-Grot 2"/>
-              </a:rPr>
-              <a:t>bla</a:t>
-            </a:r>
-            <a:r>
-              <a:rPr lang="en-US" sz="3000" dirty="0">
-                <a:solidFill>
-                  <a:srgbClr val="000000"/>
-                </a:solidFill>
-                <a:latin typeface="LeituraSans-Grot 2"/>
-                <a:cs typeface="LeituraSans-Grot 2"/>
-              </a:rPr>
-              <a:t> </a:t>
-            </a:r>
-            <a:r>
-              <a:rPr lang="en-US" sz="3000" dirty="0" err="1">
-                <a:solidFill>
-                  <a:srgbClr val="000000"/>
-                </a:solidFill>
-                <a:latin typeface="LeituraSans-Grot 2"/>
-                <a:cs typeface="LeituraSans-Grot 2"/>
-              </a:rPr>
-              <a:t>conse</a:t>
-            </a:r>
-            <a:r>
-              <a:rPr lang="en-US" sz="3000" dirty="0">
-                <a:solidFill>
-                  <a:srgbClr val="000000"/>
-                </a:solidFill>
-                <a:latin typeface="LeituraSans-Grot 2"/>
-                <a:cs typeface="LeituraSans-Grot 2"/>
-              </a:rPr>
-              <a:t> minim </a:t>
-            </a:r>
-            <a:r>
-              <a:rPr lang="en-US" sz="3000" dirty="0" err="1">
-                <a:solidFill>
-                  <a:srgbClr val="000000"/>
-                </a:solidFill>
-                <a:latin typeface="LeituraSans-Grot 2"/>
-                <a:cs typeface="LeituraSans-Grot 2"/>
-              </a:rPr>
-              <a:t>zzriure</a:t>
-            </a:r>
-            <a:r>
-              <a:rPr lang="en-US" sz="3000" dirty="0">
-                <a:solidFill>
-                  <a:srgbClr val="000000"/>
-                </a:solidFill>
-                <a:latin typeface="LeituraSans-Grot 2"/>
-                <a:cs typeface="LeituraSans-Grot 2"/>
-              </a:rPr>
-              <a:t> </a:t>
-            </a:r>
-            <a:r>
-              <a:rPr lang="en-US" sz="3000" dirty="0" err="1">
-                <a:solidFill>
-                  <a:srgbClr val="000000"/>
-                </a:solidFill>
-                <a:latin typeface="LeituraSans-Grot 2"/>
-                <a:cs typeface="LeituraSans-Grot 2"/>
-              </a:rPr>
-              <a:t>tio</a:t>
-            </a:r>
-            <a:r>
-              <a:rPr lang="en-US" sz="3000" dirty="0">
-                <a:solidFill>
-                  <a:srgbClr val="000000"/>
-                </a:solidFill>
-                <a:latin typeface="LeituraSans-Grot 2"/>
-                <a:cs typeface="LeituraSans-Grot 2"/>
-              </a:rPr>
-              <a:t> </a:t>
-            </a:r>
-            <a:r>
-              <a:rPr lang="en-US" sz="3000" dirty="0" err="1">
-                <a:solidFill>
-                  <a:srgbClr val="000000"/>
-                </a:solidFill>
-                <a:latin typeface="LeituraSans-Grot 2"/>
-                <a:cs typeface="LeituraSans-Grot 2"/>
-              </a:rPr>
-              <a:t>dolore</a:t>
-            </a:r>
-            <a:r>
-              <a:rPr lang="en-US" sz="3000" dirty="0">
-                <a:solidFill>
-                  <a:srgbClr val="000000"/>
-                </a:solidFill>
-                <a:latin typeface="LeituraSans-Grot 2"/>
-                <a:cs typeface="LeituraSans-Grot 2"/>
-              </a:rPr>
-              <a:t> </a:t>
-            </a:r>
-            <a:r>
-              <a:rPr lang="en-US" sz="3000" dirty="0" err="1">
-                <a:solidFill>
-                  <a:srgbClr val="000000"/>
-                </a:solidFill>
-                <a:latin typeface="LeituraSans-Grot 2"/>
-                <a:cs typeface="LeituraSans-Grot 2"/>
-              </a:rPr>
-              <a:t>tet</a:t>
-            </a:r>
-            <a:r>
-              <a:rPr lang="en-US" sz="3000" dirty="0">
-                <a:solidFill>
-                  <a:srgbClr val="000000"/>
-                </a:solidFill>
-                <a:latin typeface="LeituraSans-Grot 2"/>
-                <a:cs typeface="LeituraSans-Grot 2"/>
-              </a:rPr>
-              <a:t>, </a:t>
-            </a:r>
-            <a:r>
-              <a:rPr lang="en-US" sz="3000" dirty="0" err="1">
-                <a:solidFill>
-                  <a:srgbClr val="000000"/>
-                </a:solidFill>
-                <a:latin typeface="LeituraSans-Grot 2"/>
-                <a:cs typeface="LeituraSans-Grot 2"/>
-              </a:rPr>
-              <a:t>volobor</a:t>
-            </a:r>
-            <a:r>
-              <a:rPr lang="en-US" sz="3000" dirty="0">
-                <a:solidFill>
-                  <a:srgbClr val="000000"/>
-                </a:solidFill>
-                <a:latin typeface="LeituraSans-Grot 2"/>
-                <a:cs typeface="LeituraSans-Grot 2"/>
-              </a:rPr>
-              <a:t> </a:t>
-            </a:r>
-            <a:r>
-              <a:rPr lang="en-US" sz="3000" dirty="0" err="1">
-                <a:solidFill>
-                  <a:srgbClr val="000000"/>
-                </a:solidFill>
-                <a:latin typeface="LeituraSans-Grot 2"/>
-                <a:cs typeface="LeituraSans-Grot 2"/>
-              </a:rPr>
-              <a:t>si</a:t>
-            </a:r>
-            <a:r>
-              <a:rPr lang="en-US" sz="3000" dirty="0">
-                <a:solidFill>
-                  <a:srgbClr val="000000"/>
-                </a:solidFill>
-                <a:latin typeface="LeituraSans-Grot 2"/>
-                <a:cs typeface="LeituraSans-Grot 2"/>
-              </a:rPr>
-              <a:t>.</a:t>
-            </a:r>
-          </a:p>
-          <a:p>
-            <a:pPr marL="939453" lvl="1" indent="-571500">
-              <a:buFont typeface="Arial"/>
-              <a:buChar char="•"/>
-              <a:defRPr/>
-            </a:pPr>
-            <a:r>
-              <a:rPr lang="en-US" sz="3000" dirty="0" err="1" smtClean="0">
-                <a:solidFill>
-                  <a:srgbClr val="000000"/>
-                </a:solidFill>
-                <a:latin typeface="LeituraSans-Grot 2"/>
-                <a:cs typeface="LeituraSans-Grot 2"/>
-              </a:rPr>
-              <a:t>vel</a:t>
-            </a:r>
-            <a:r>
-              <a:rPr lang="en-US" sz="3000" dirty="0" smtClean="0">
-                <a:solidFill>
-                  <a:srgbClr val="000000"/>
-                </a:solidFill>
-                <a:latin typeface="LeituraSans-Grot 2"/>
-                <a:cs typeface="LeituraSans-Grot 2"/>
-              </a:rPr>
-              <a:t> et </a:t>
-            </a:r>
-            <a:r>
-              <a:rPr lang="en-US" sz="3000" dirty="0" err="1" smtClean="0">
-                <a:solidFill>
-                  <a:srgbClr val="000000"/>
-                </a:solidFill>
-                <a:latin typeface="LeituraSans-Grot 2"/>
-                <a:cs typeface="LeituraSans-Grot 2"/>
-              </a:rPr>
-              <a:t>vel</a:t>
-            </a:r>
-            <a:r>
-              <a:rPr lang="en-US" sz="3000" dirty="0" smtClean="0">
-                <a:solidFill>
-                  <a:srgbClr val="000000"/>
-                </a:solidFill>
-                <a:latin typeface="LeituraSans-Grot 2"/>
-                <a:cs typeface="LeituraSans-Grot 2"/>
-              </a:rPr>
-              <a:t> </a:t>
-            </a:r>
-            <a:r>
-              <a:rPr lang="en-US" sz="3000" dirty="0" err="1" smtClean="0">
-                <a:solidFill>
-                  <a:srgbClr val="000000"/>
-                </a:solidFill>
-                <a:latin typeface="LeituraSans-Grot 2"/>
-                <a:cs typeface="LeituraSans-Grot 2"/>
-              </a:rPr>
-              <a:t>dionsenit</a:t>
-            </a:r>
-            <a:r>
-              <a:rPr lang="en-US" sz="3000" dirty="0" smtClean="0">
-                <a:solidFill>
-                  <a:srgbClr val="000000"/>
-                </a:solidFill>
-                <a:latin typeface="LeituraSans-Grot 2"/>
-                <a:cs typeface="LeituraSans-Grot 2"/>
-              </a:rPr>
-              <a:t> </a:t>
-            </a:r>
-            <a:r>
-              <a:rPr lang="en-US" sz="3000" dirty="0" err="1" smtClean="0">
-                <a:solidFill>
-                  <a:srgbClr val="000000"/>
-                </a:solidFill>
-                <a:latin typeface="LeituraSans-Grot 2"/>
-                <a:cs typeface="LeituraSans-Grot 2"/>
-              </a:rPr>
-              <a:t>adit</a:t>
-            </a:r>
-            <a:r>
-              <a:rPr lang="en-US" sz="3000" dirty="0" smtClean="0">
-                <a:solidFill>
-                  <a:srgbClr val="000000"/>
-                </a:solidFill>
-                <a:latin typeface="LeituraSans-Grot 2"/>
-                <a:cs typeface="LeituraSans-Grot 2"/>
-              </a:rPr>
-              <a:t>, </a:t>
-            </a:r>
-            <a:r>
-              <a:rPr lang="en-US" sz="3000" dirty="0" err="1" smtClean="0">
-                <a:solidFill>
-                  <a:srgbClr val="000000"/>
-                </a:solidFill>
-                <a:latin typeface="LeituraSans-Grot 2"/>
-                <a:cs typeface="LeituraSans-Grot 2"/>
-              </a:rPr>
-              <a:t>consenim</a:t>
-            </a:r>
-            <a:r>
-              <a:rPr lang="en-US" sz="3000" dirty="0" smtClean="0">
-                <a:solidFill>
-                  <a:srgbClr val="000000"/>
-                </a:solidFill>
-                <a:latin typeface="LeituraSans-Grot 2"/>
-                <a:cs typeface="LeituraSans-Grot 2"/>
-              </a:rPr>
-              <a:t> </a:t>
-            </a:r>
-            <a:r>
-              <a:rPr lang="en-US" sz="3000" dirty="0" err="1" smtClean="0">
-                <a:solidFill>
-                  <a:srgbClr val="000000"/>
-                </a:solidFill>
-                <a:latin typeface="LeituraSans-Grot 2"/>
-                <a:cs typeface="LeituraSans-Grot 2"/>
-              </a:rPr>
-              <a:t>zzrillute</a:t>
-            </a:r>
-            <a:r>
-              <a:rPr lang="en-US" sz="3000" dirty="0" smtClean="0">
-                <a:solidFill>
-                  <a:srgbClr val="000000"/>
-                </a:solidFill>
-                <a:latin typeface="LeituraSans-Grot 2"/>
-                <a:cs typeface="LeituraSans-Grot 2"/>
-              </a:rPr>
-              <a:t> el </a:t>
-            </a:r>
-            <a:r>
-              <a:rPr lang="en-US" sz="3000" dirty="0" err="1" smtClean="0">
-                <a:solidFill>
-                  <a:srgbClr val="000000"/>
-                </a:solidFill>
-                <a:latin typeface="LeituraSans-Grot 2"/>
-                <a:cs typeface="LeituraSans-Grot 2"/>
-              </a:rPr>
-              <a:t>euguerostie</a:t>
-            </a:r>
-            <a:r>
-              <a:rPr lang="en-US" sz="3000" dirty="0" smtClean="0">
-                <a:solidFill>
-                  <a:srgbClr val="000000"/>
-                </a:solidFill>
-                <a:latin typeface="LeituraSans-Grot 2"/>
-                <a:cs typeface="LeituraSans-Grot 2"/>
-              </a:rPr>
-              <a:t> </a:t>
-            </a:r>
-            <a:r>
-              <a:rPr lang="en-US" sz="3000" dirty="0" err="1" smtClean="0">
-                <a:solidFill>
-                  <a:srgbClr val="000000"/>
-                </a:solidFill>
-                <a:latin typeface="LeituraSans-Grot 2"/>
-                <a:cs typeface="LeituraSans-Grot 2"/>
-              </a:rPr>
-              <a:t>faci</a:t>
-            </a:r>
-            <a:r>
-              <a:rPr lang="en-US" sz="3000" dirty="0" smtClean="0">
-                <a:solidFill>
-                  <a:srgbClr val="000000"/>
-                </a:solidFill>
-                <a:latin typeface="LeituraSans-Grot 2"/>
-                <a:cs typeface="LeituraSans-Grot 2"/>
-              </a:rPr>
-              <a:t> </a:t>
-            </a:r>
-            <a:r>
-              <a:rPr lang="en-US" sz="3000" dirty="0" err="1" smtClean="0">
-                <a:solidFill>
-                  <a:srgbClr val="000000"/>
-                </a:solidFill>
-                <a:latin typeface="LeituraSans-Grot 2"/>
-                <a:cs typeface="LeituraSans-Grot 2"/>
-              </a:rPr>
-              <a:t>bla</a:t>
-            </a:r>
-            <a:r>
-              <a:rPr lang="en-US" sz="3000" dirty="0" smtClean="0">
-                <a:solidFill>
-                  <a:srgbClr val="000000"/>
-                </a:solidFill>
-                <a:latin typeface="LeituraSans-Grot 2"/>
-                <a:cs typeface="LeituraSans-Grot 2"/>
-              </a:rPr>
-              <a:t> </a:t>
-            </a:r>
-            <a:r>
-              <a:rPr lang="en-US" sz="3000" dirty="0" err="1" smtClean="0">
-                <a:solidFill>
-                  <a:srgbClr val="000000"/>
-                </a:solidFill>
-                <a:latin typeface="LeituraSans-Grot 2"/>
-                <a:cs typeface="LeituraSans-Grot 2"/>
-              </a:rPr>
-              <a:t>conse</a:t>
-            </a:r>
-            <a:r>
-              <a:rPr lang="en-US" sz="3000" dirty="0" smtClean="0">
-                <a:solidFill>
-                  <a:srgbClr val="000000"/>
-                </a:solidFill>
-                <a:latin typeface="LeituraSans-Grot 2"/>
-                <a:cs typeface="LeituraSans-Grot 2"/>
-              </a:rPr>
-              <a:t> minim </a:t>
-            </a:r>
-            <a:r>
-              <a:rPr lang="en-US" sz="3000" dirty="0" err="1" smtClean="0">
-                <a:solidFill>
-                  <a:srgbClr val="000000"/>
-                </a:solidFill>
-                <a:latin typeface="LeituraSans-Grot 2"/>
-                <a:cs typeface="LeituraSans-Grot 2"/>
-              </a:rPr>
-              <a:t>zzriure</a:t>
-            </a:r>
-            <a:r>
-              <a:rPr lang="en-US" sz="3000" dirty="0" smtClean="0">
-                <a:solidFill>
-                  <a:srgbClr val="000000"/>
-                </a:solidFill>
-                <a:latin typeface="LeituraSans-Grot 2"/>
-                <a:cs typeface="LeituraSans-Grot 2"/>
-              </a:rPr>
-              <a:t> </a:t>
-            </a:r>
-            <a:r>
-              <a:rPr lang="en-US" sz="3000" dirty="0" err="1" smtClean="0">
-                <a:solidFill>
-                  <a:srgbClr val="000000"/>
-                </a:solidFill>
-                <a:latin typeface="LeituraSans-Grot 2"/>
-                <a:cs typeface="LeituraSans-Grot 2"/>
-              </a:rPr>
-              <a:t>tio</a:t>
-            </a:r>
-            <a:r>
-              <a:rPr lang="en-US" sz="3000" dirty="0" smtClean="0">
-                <a:solidFill>
-                  <a:srgbClr val="000000"/>
-                </a:solidFill>
-                <a:latin typeface="LeituraSans-Grot 2"/>
-                <a:cs typeface="LeituraSans-Grot 2"/>
-              </a:rPr>
-              <a:t> </a:t>
-            </a:r>
-            <a:r>
-              <a:rPr lang="en-US" sz="3000" dirty="0" err="1" smtClean="0">
-                <a:solidFill>
-                  <a:srgbClr val="000000"/>
-                </a:solidFill>
-                <a:latin typeface="LeituraSans-Grot 2"/>
-                <a:cs typeface="LeituraSans-Grot 2"/>
-              </a:rPr>
-              <a:t>dolore</a:t>
-            </a:r>
-            <a:r>
-              <a:rPr lang="en-US" sz="3000" dirty="0" smtClean="0">
-                <a:solidFill>
-                  <a:srgbClr val="000000"/>
-                </a:solidFill>
-                <a:latin typeface="LeituraSans-Grot 2"/>
-                <a:cs typeface="LeituraSans-Grot 2"/>
-              </a:rPr>
-              <a:t> </a:t>
-            </a:r>
-            <a:r>
-              <a:rPr lang="en-US" sz="3000" dirty="0" err="1" smtClean="0">
-                <a:solidFill>
-                  <a:srgbClr val="000000"/>
-                </a:solidFill>
-                <a:latin typeface="LeituraSans-Grot 2"/>
-                <a:cs typeface="LeituraSans-Grot 2"/>
-              </a:rPr>
-              <a:t>tet</a:t>
-            </a:r>
-            <a:r>
-              <a:rPr lang="en-US" sz="3000" dirty="0" smtClean="0">
-                <a:solidFill>
-                  <a:srgbClr val="000000"/>
-                </a:solidFill>
-                <a:latin typeface="LeituraSans-Grot 2"/>
-                <a:cs typeface="LeituraSans-Grot 2"/>
-              </a:rPr>
-              <a:t>, </a:t>
-            </a:r>
-            <a:r>
-              <a:rPr lang="en-US" sz="3000" dirty="0" err="1" smtClean="0">
-                <a:solidFill>
-                  <a:srgbClr val="000000"/>
-                </a:solidFill>
-                <a:latin typeface="LeituraSans-Grot 2"/>
-                <a:cs typeface="LeituraSans-Grot 2"/>
-              </a:rPr>
-              <a:t>volobor</a:t>
-            </a:r>
-            <a:r>
-              <a:rPr lang="en-US" sz="3000" dirty="0" smtClean="0">
-                <a:solidFill>
-                  <a:srgbClr val="000000"/>
-                </a:solidFill>
-                <a:latin typeface="LeituraSans-Grot 2"/>
-                <a:cs typeface="LeituraSans-Grot 2"/>
-              </a:rPr>
-              <a:t> </a:t>
-            </a:r>
-            <a:r>
-              <a:rPr lang="en-US" sz="3000" dirty="0" err="1" smtClean="0">
-                <a:solidFill>
-                  <a:srgbClr val="000000"/>
-                </a:solidFill>
-                <a:latin typeface="LeituraSans-Grot 2"/>
-                <a:cs typeface="LeituraSans-Grot 2"/>
-              </a:rPr>
-              <a:t>si</a:t>
-            </a:r>
-            <a:endParaRPr lang="en-US" sz="3000" dirty="0" smtClean="0">
+              <a:t>Terminology/Features</a:t>
+            </a:r>
+            <a:endParaRPr lang="en-US" sz="4000" dirty="0" smtClean="0">
               <a:solidFill>
                 <a:srgbClr val="000000"/>
               </a:solidFill>
@@ -6646,334 +5171,34 @@
               <a:defRPr/>
             </a:pPr>
             <a:r>
-              <a:rPr lang="en-US" sz="3000" dirty="0" err="1" smtClean="0">
-                <a:solidFill>
-                  <a:srgbClr val="000000"/>
-                </a:solidFill>
-                <a:latin typeface="LeituraSans-Grot 2"/>
-                <a:cs typeface="LeituraSans-Grot 2"/>
-              </a:rPr>
-              <a:t>vel</a:t>
-            </a:r>
-            <a:r>
-              <a:rPr lang="en-US" sz="3000" dirty="0" smtClean="0">
-                <a:solidFill>
-                  <a:srgbClr val="000000"/>
-                </a:solidFill>
-                <a:latin typeface="LeituraSans-Grot 2"/>
-                <a:cs typeface="LeituraSans-Grot 2"/>
-              </a:rPr>
-              <a:t> </a:t>
-            </a:r>
-            <a:r>
-              <a:rPr lang="en-US" sz="3000" dirty="0">
-                <a:solidFill>
-                  <a:srgbClr val="000000"/>
-                </a:solidFill>
-                <a:latin typeface="LeituraSans-Grot 2"/>
-                <a:cs typeface="LeituraSans-Grot 2"/>
-              </a:rPr>
-              <a:t>et </a:t>
-            </a:r>
-            <a:r>
-              <a:rPr lang="en-US" sz="3000" dirty="0" err="1">
-                <a:solidFill>
-                  <a:srgbClr val="000000"/>
-                </a:solidFill>
-                <a:latin typeface="LeituraSans-Grot 2"/>
-                <a:cs typeface="LeituraSans-Grot 2"/>
-              </a:rPr>
-              <a:t>vel</a:t>
-            </a:r>
-            <a:r>
-              <a:rPr lang="en-US" sz="3000" dirty="0">
-                <a:solidFill>
-                  <a:srgbClr val="000000"/>
-                </a:solidFill>
-                <a:latin typeface="LeituraSans-Grot 2"/>
-                <a:cs typeface="LeituraSans-Grot 2"/>
-              </a:rPr>
-              <a:t> </a:t>
-            </a:r>
-            <a:r>
-              <a:rPr lang="en-US" sz="3000" dirty="0" err="1">
-                <a:solidFill>
-                  <a:srgbClr val="000000"/>
-                </a:solidFill>
-                <a:latin typeface="LeituraSans-Grot 2"/>
-                <a:cs typeface="LeituraSans-Grot 2"/>
-              </a:rPr>
-              <a:t>dionsenit</a:t>
-            </a:r>
-            <a:r>
-              <a:rPr lang="en-US" sz="3000" dirty="0">
-                <a:solidFill>
-                  <a:srgbClr val="000000"/>
-                </a:solidFill>
-                <a:latin typeface="LeituraSans-Grot 2"/>
-                <a:cs typeface="LeituraSans-Grot 2"/>
-              </a:rPr>
-              <a:t> </a:t>
-            </a:r>
-            <a:r>
-              <a:rPr lang="en-US" sz="3000" dirty="0" err="1">
-                <a:solidFill>
-                  <a:srgbClr val="000000"/>
-                </a:solidFill>
-                <a:latin typeface="LeituraSans-Grot 2"/>
-                <a:cs typeface="LeituraSans-Grot 2"/>
-              </a:rPr>
-              <a:t>adit</a:t>
-            </a:r>
-            <a:r>
-              <a:rPr lang="en-US" sz="3000" dirty="0">
-                <a:solidFill>
-                  <a:srgbClr val="000000"/>
-                </a:solidFill>
-                <a:latin typeface="LeituraSans-Grot 2"/>
-                <a:cs typeface="LeituraSans-Grot 2"/>
-              </a:rPr>
-              <a:t>, </a:t>
-            </a:r>
-            <a:r>
-              <a:rPr lang="en-US" sz="3000" dirty="0" err="1">
-                <a:solidFill>
-                  <a:srgbClr val="000000"/>
-                </a:solidFill>
-                <a:latin typeface="LeituraSans-Grot 2"/>
-                <a:cs typeface="LeituraSans-Grot 2"/>
-              </a:rPr>
-              <a:t>consenim</a:t>
-            </a:r>
-            <a:r>
-              <a:rPr lang="en-US" sz="3000" dirty="0">
-                <a:solidFill>
-                  <a:srgbClr val="000000"/>
-                </a:solidFill>
-                <a:latin typeface="LeituraSans-Grot 2"/>
-                <a:cs typeface="LeituraSans-Grot 2"/>
-              </a:rPr>
-              <a:t> </a:t>
-            </a:r>
-            <a:r>
-              <a:rPr lang="en-US" sz="3000" dirty="0" err="1">
-                <a:solidFill>
-                  <a:srgbClr val="000000"/>
-                </a:solidFill>
-                <a:latin typeface="LeituraSans-Grot 2"/>
-                <a:cs typeface="LeituraSans-Grot 2"/>
-              </a:rPr>
-              <a:t>zzrillute</a:t>
-            </a:r>
-            <a:r>
-              <a:rPr lang="en-US" sz="3000" dirty="0">
-                <a:solidFill>
-                  <a:srgbClr val="000000"/>
-                </a:solidFill>
-                <a:latin typeface="LeituraSans-Grot 2"/>
-                <a:cs typeface="LeituraSans-Grot 2"/>
-              </a:rPr>
-              <a:t> el </a:t>
-            </a:r>
-            <a:r>
-              <a:rPr lang="en-US" sz="3000" dirty="0" err="1">
-                <a:solidFill>
-                  <a:srgbClr val="000000"/>
-                </a:solidFill>
-                <a:latin typeface="LeituraSans-Grot 2"/>
-                <a:cs typeface="LeituraSans-Grot 2"/>
-              </a:rPr>
-              <a:t>euguerostie</a:t>
-            </a:r>
-            <a:r>
-              <a:rPr lang="en-US" sz="3000" dirty="0">
-                <a:solidFill>
-                  <a:srgbClr val="000000"/>
-                </a:solidFill>
-                <a:latin typeface="LeituraSans-Grot 2"/>
-                <a:cs typeface="LeituraSans-Grot 2"/>
-              </a:rPr>
-              <a:t> </a:t>
-            </a:r>
-            <a:r>
-              <a:rPr lang="en-US" sz="3000" dirty="0" err="1">
-                <a:solidFill>
-                  <a:srgbClr val="000000"/>
-                </a:solidFill>
-                <a:latin typeface="LeituraSans-Grot 2"/>
-                <a:cs typeface="LeituraSans-Grot 2"/>
-              </a:rPr>
-              <a:t>faci</a:t>
-            </a:r>
-            <a:r>
-              <a:rPr lang="en-US" sz="3000" dirty="0">
-                <a:solidFill>
-                  <a:srgbClr val="000000"/>
-                </a:solidFill>
-                <a:latin typeface="LeituraSans-Grot 2"/>
-                <a:cs typeface="LeituraSans-Grot 2"/>
-              </a:rPr>
-              <a:t> </a:t>
-            </a:r>
-            <a:r>
-              <a:rPr lang="en-US" sz="3000" dirty="0" err="1">
-                <a:solidFill>
-                  <a:srgbClr val="000000"/>
-                </a:solidFill>
-                <a:latin typeface="LeituraSans-Grot 2"/>
-                <a:cs typeface="LeituraSans-Grot 2"/>
-              </a:rPr>
-              <a:t>bla</a:t>
-            </a:r>
-            <a:r>
-              <a:rPr lang="en-US" sz="3000" dirty="0">
-                <a:solidFill>
-                  <a:srgbClr val="000000"/>
-                </a:solidFill>
-                <a:latin typeface="LeituraSans-Grot 2"/>
-                <a:cs typeface="LeituraSans-Grot 2"/>
-              </a:rPr>
-              <a:t> </a:t>
-            </a:r>
-            <a:r>
-              <a:rPr lang="en-US" sz="3000" dirty="0" err="1">
-                <a:solidFill>
-                  <a:srgbClr val="000000"/>
-                </a:solidFill>
-                <a:latin typeface="LeituraSans-Grot 2"/>
-                <a:cs typeface="LeituraSans-Grot 2"/>
-              </a:rPr>
-              <a:t>conse</a:t>
-            </a:r>
-            <a:r>
-              <a:rPr lang="en-US" sz="3000" dirty="0">
-                <a:solidFill>
-                  <a:srgbClr val="000000"/>
-                </a:solidFill>
-                <a:latin typeface="LeituraSans-Grot 2"/>
-                <a:cs typeface="LeituraSans-Grot 2"/>
-              </a:rPr>
-              <a:t> minim </a:t>
-            </a:r>
-            <a:r>
-              <a:rPr lang="en-US" sz="3000" dirty="0" err="1">
-                <a:solidFill>
-                  <a:srgbClr val="000000"/>
-                </a:solidFill>
-                <a:latin typeface="LeituraSans-Grot 2"/>
-                <a:cs typeface="LeituraSans-Grot 2"/>
-              </a:rPr>
-              <a:t>zzriure</a:t>
-            </a:r>
-            <a:r>
-              <a:rPr lang="en-US" sz="3000" dirty="0">
-                <a:solidFill>
-                  <a:srgbClr val="000000"/>
-                </a:solidFill>
-                <a:latin typeface="LeituraSans-Grot 2"/>
-                <a:cs typeface="LeituraSans-Grot 2"/>
-              </a:rPr>
-              <a:t> </a:t>
-            </a:r>
-            <a:r>
-              <a:rPr lang="en-US" sz="3000" dirty="0" err="1">
-                <a:solidFill>
-                  <a:srgbClr val="000000"/>
-                </a:solidFill>
-                <a:latin typeface="LeituraSans-Grot 2"/>
-                <a:cs typeface="LeituraSans-Grot 2"/>
-              </a:rPr>
-              <a:t>tio</a:t>
-            </a:r>
-            <a:r>
-              <a:rPr lang="en-US" sz="3000" dirty="0">
-                <a:solidFill>
-                  <a:srgbClr val="000000"/>
-                </a:solidFill>
-                <a:latin typeface="LeituraSans-Grot 2"/>
-                <a:cs typeface="LeituraSans-Grot 2"/>
-              </a:rPr>
-              <a:t> </a:t>
-            </a:r>
-            <a:r>
-              <a:rPr lang="en-US" sz="3000" dirty="0" err="1">
-                <a:solidFill>
-                  <a:srgbClr val="000000"/>
-                </a:solidFill>
-                <a:latin typeface="LeituraSans-Grot 2"/>
-                <a:cs typeface="LeituraSans-Grot 2"/>
-              </a:rPr>
-              <a:t>dolore</a:t>
-            </a:r>
-            <a:r>
-              <a:rPr lang="en-US" sz="3000" dirty="0">
-                <a:solidFill>
-                  <a:srgbClr val="000000"/>
-                </a:solidFill>
-                <a:latin typeface="LeituraSans-Grot 2"/>
-                <a:cs typeface="LeituraSans-Grot 2"/>
-              </a:rPr>
-              <a:t> </a:t>
-            </a:r>
-            <a:r>
-              <a:rPr lang="en-US" sz="3000" dirty="0" err="1">
-                <a:solidFill>
-                  <a:srgbClr val="000000"/>
-                </a:solidFill>
-                <a:latin typeface="LeituraSans-Grot 2"/>
-                <a:cs typeface="LeituraSans-Grot 2"/>
-              </a:rPr>
-              <a:t>tet</a:t>
-            </a:r>
-            <a:r>
-              <a:rPr lang="en-US" sz="3000" dirty="0">
-                <a:solidFill>
-                  <a:srgbClr val="000000"/>
-                </a:solidFill>
-                <a:latin typeface="LeituraSans-Grot 2"/>
-                <a:cs typeface="LeituraSans-Grot 2"/>
-              </a:rPr>
-              <a:t>, </a:t>
-            </a:r>
-            <a:r>
-              <a:rPr lang="en-US" sz="3000" dirty="0" err="1">
-                <a:solidFill>
-                  <a:srgbClr val="000000"/>
-                </a:solidFill>
-                <a:latin typeface="LeituraSans-Grot 2"/>
-                <a:cs typeface="LeituraSans-Grot 2"/>
-              </a:rPr>
-              <a:t>volobor</a:t>
-            </a:r>
-            <a:r>
-              <a:rPr lang="en-US" sz="3000" dirty="0">
-                <a:solidFill>
-                  <a:srgbClr val="000000"/>
-                </a:solidFill>
-                <a:latin typeface="LeituraSans-Grot 2"/>
-                <a:cs typeface="LeituraSans-Grot 2"/>
-              </a:rPr>
-              <a:t> </a:t>
-            </a:r>
-            <a:r>
-              <a:rPr lang="en-US" sz="3000" dirty="0" err="1">
-                <a:solidFill>
-                  <a:srgbClr val="000000"/>
-                </a:solidFill>
-                <a:latin typeface="LeituraSans-Grot 2"/>
-                <a:cs typeface="LeituraSans-Grot 2"/>
-              </a:rPr>
-              <a:t>si</a:t>
-            </a:r>
-            <a:r>
-              <a:rPr lang="en-US" sz="3000" dirty="0">
-                <a:solidFill>
-                  <a:srgbClr val="000000"/>
-                </a:solidFill>
-                <a:latin typeface="LeituraSans-Grot 2"/>
-                <a:cs typeface="LeituraSans-Grot 2"/>
-              </a:rPr>
-              <a:t>.</a:t>
+              <a:rPr lang="en-US" sz="2400" dirty="0" smtClean="0">
+                <a:solidFill>
+                  <a:srgbClr val="000000"/>
+                </a:solidFill>
+                <a:latin typeface="LeituraSans-Grot 2"/>
+                <a:cs typeface="LeituraSans-Grot 2"/>
+              </a:rPr>
+              <a:t>TSTL Keywords: pool, </a:t>
+            </a:r>
+            <a:r>
+              <a:rPr lang="en-US" sz="2400" dirty="0" err="1" smtClean="0">
+                <a:solidFill>
+                  <a:srgbClr val="000000"/>
+                </a:solidFill>
+                <a:latin typeface="LeituraSans-Grot 2"/>
+                <a:cs typeface="LeituraSans-Grot 2"/>
+              </a:rPr>
+              <a:t>init</a:t>
+            </a:r>
+            <a:r>
+              <a:rPr lang="en-US" sz="2400" dirty="0" smtClean="0">
+                <a:solidFill>
+                  <a:srgbClr val="000000"/>
+                </a:solidFill>
+                <a:latin typeface="LeituraSans-Grot 2"/>
+                <a:cs typeface="LeituraSans-Grot 2"/>
+              </a:rPr>
+              <a:t>, log</a:t>
             </a:r>
           </a:p>
           <a:p>
@@ -6983,324 +5208,14 @@
               <a:defRPr/>
             </a:pPr>
             <a:r>
-              <a:rPr lang="en-US" sz="3000" dirty="0" err="1">
-                <a:solidFill>
-                  <a:srgbClr val="000000"/>
-                </a:solidFill>
-                <a:latin typeface="LeituraSans-Grot 2"/>
-                <a:cs typeface="LeituraSans-Grot 2"/>
-              </a:rPr>
-              <a:t>vel</a:t>
-            </a:r>
-            <a:r>
-              <a:rPr lang="en-US" sz="3000" dirty="0">
-                <a:solidFill>
-                  <a:srgbClr val="000000"/>
-                </a:solidFill>
-                <a:latin typeface="LeituraSans-Grot 2"/>
-                <a:cs typeface="LeituraSans-Grot 2"/>
-              </a:rPr>
-              <a:t> et </a:t>
-            </a:r>
-            <a:r>
-              <a:rPr lang="en-US" sz="3000" dirty="0" err="1">
-                <a:solidFill>
-                  <a:srgbClr val="000000"/>
-                </a:solidFill>
-                <a:latin typeface="LeituraSans-Grot 2"/>
-                <a:cs typeface="LeituraSans-Grot 2"/>
-              </a:rPr>
-              <a:t>vel</a:t>
-            </a:r>
-            <a:r>
-              <a:rPr lang="en-US" sz="3000" dirty="0">
-                <a:solidFill>
-                  <a:srgbClr val="000000"/>
-                </a:solidFill>
-                <a:latin typeface="LeituraSans-Grot 2"/>
-                <a:cs typeface="LeituraSans-Grot 2"/>
-              </a:rPr>
-              <a:t> </a:t>
-            </a:r>
-            <a:r>
-              <a:rPr lang="en-US" sz="3000" dirty="0" err="1">
-                <a:solidFill>
-                  <a:srgbClr val="000000"/>
-                </a:solidFill>
-                <a:latin typeface="LeituraSans-Grot 2"/>
-                <a:cs typeface="LeituraSans-Grot 2"/>
-              </a:rPr>
-              <a:t>dionsenit</a:t>
-            </a:r>
-            <a:r>
-              <a:rPr lang="en-US" sz="3000" dirty="0">
-                <a:solidFill>
-                  <a:srgbClr val="000000"/>
-                </a:solidFill>
-                <a:latin typeface="LeituraSans-Grot 2"/>
-                <a:cs typeface="LeituraSans-Grot 2"/>
-              </a:rPr>
-              <a:t> </a:t>
-            </a:r>
-            <a:r>
-              <a:rPr lang="en-US" sz="3000" dirty="0" err="1">
-                <a:solidFill>
-                  <a:srgbClr val="000000"/>
-                </a:solidFill>
-                <a:latin typeface="LeituraSans-Grot 2"/>
-                <a:cs typeface="LeituraSans-Grot 2"/>
-              </a:rPr>
-              <a:t>adit</a:t>
-            </a:r>
-            <a:r>
-              <a:rPr lang="en-US" sz="3000" dirty="0">
-                <a:solidFill>
-                  <a:srgbClr val="000000"/>
-                </a:solidFill>
-                <a:latin typeface="LeituraSans-Grot 2"/>
-                <a:cs typeface="LeituraSans-Grot 2"/>
-              </a:rPr>
-              <a:t>, </a:t>
-            </a:r>
-            <a:r>
-              <a:rPr lang="en-US" sz="3000" dirty="0" err="1">
-                <a:solidFill>
-                  <a:srgbClr val="000000"/>
-                </a:solidFill>
-                <a:latin typeface="LeituraSans-Grot 2"/>
-                <a:cs typeface="LeituraSans-Grot 2"/>
-              </a:rPr>
-              <a:t>consenim</a:t>
-            </a:r>
-            <a:r>
-              <a:rPr lang="en-US" sz="3000" dirty="0">
-                <a:solidFill>
-                  <a:srgbClr val="000000"/>
-                </a:solidFill>
-                <a:latin typeface="LeituraSans-Grot 2"/>
-                <a:cs typeface="LeituraSans-Grot 2"/>
-              </a:rPr>
-              <a:t> </a:t>
-            </a:r>
-            <a:r>
-              <a:rPr lang="en-US" sz="3000" dirty="0" err="1">
-                <a:solidFill>
-                  <a:srgbClr val="000000"/>
-                </a:solidFill>
-                <a:latin typeface="LeituraSans-Grot 2"/>
-                <a:cs typeface="LeituraSans-Grot 2"/>
-              </a:rPr>
-              <a:t>zzrillute</a:t>
-            </a:r>
-            <a:r>
-              <a:rPr lang="en-US" sz="3000" dirty="0">
-                <a:solidFill>
-                  <a:srgbClr val="000000"/>
-                </a:solidFill>
-                <a:latin typeface="LeituraSans-Grot 2"/>
-                <a:cs typeface="LeituraSans-Grot 2"/>
-              </a:rPr>
-              <a:t> el </a:t>
-            </a:r>
-            <a:r>
-              <a:rPr lang="en-US" sz="3000" dirty="0" err="1">
-                <a:solidFill>
-                  <a:srgbClr val="000000"/>
-                </a:solidFill>
-                <a:latin typeface="LeituraSans-Grot 2"/>
-                <a:cs typeface="LeituraSans-Grot 2"/>
-              </a:rPr>
-              <a:t>euguerostie</a:t>
-            </a:r>
-            <a:r>
-              <a:rPr lang="en-US" sz="3000" dirty="0">
-                <a:solidFill>
-                  <a:srgbClr val="000000"/>
-                </a:solidFill>
-                <a:latin typeface="LeituraSans-Grot 2"/>
-                <a:cs typeface="LeituraSans-Grot 2"/>
-              </a:rPr>
-              <a:t> </a:t>
-            </a:r>
-            <a:r>
-              <a:rPr lang="en-US" sz="3000" dirty="0" err="1">
-                <a:solidFill>
-                  <a:srgbClr val="000000"/>
-                </a:solidFill>
-                <a:latin typeface="LeituraSans-Grot 2"/>
-                <a:cs typeface="LeituraSans-Grot 2"/>
-              </a:rPr>
-              <a:t>faci</a:t>
-            </a:r>
-            <a:r>
-              <a:rPr lang="en-US" sz="3000" dirty="0">
-                <a:solidFill>
-                  <a:srgbClr val="000000"/>
-                </a:solidFill>
-                <a:latin typeface="LeituraSans-Grot 2"/>
-                <a:cs typeface="LeituraSans-Grot 2"/>
-              </a:rPr>
-              <a:t> </a:t>
-            </a:r>
-            <a:r>
-              <a:rPr lang="en-US" sz="3000" dirty="0" err="1">
-                <a:solidFill>
-                  <a:srgbClr val="000000"/>
-                </a:solidFill>
-                <a:latin typeface="LeituraSans-Grot 2"/>
-                <a:cs typeface="LeituraSans-Grot 2"/>
-              </a:rPr>
-              <a:t>bla</a:t>
-            </a:r>
-            <a:r>
-              <a:rPr lang="en-US" sz="3000" dirty="0">
-                <a:solidFill>
-                  <a:srgbClr val="000000"/>
-                </a:solidFill>
-                <a:latin typeface="LeituraSans-Grot 2"/>
-                <a:cs typeface="LeituraSans-Grot 2"/>
-              </a:rPr>
-              <a:t> </a:t>
-            </a:r>
-            <a:r>
-              <a:rPr lang="en-US" sz="3000" dirty="0" err="1">
-                <a:solidFill>
-                  <a:srgbClr val="000000"/>
-                </a:solidFill>
-                <a:latin typeface="LeituraSans-Grot 2"/>
-                <a:cs typeface="LeituraSans-Grot 2"/>
-              </a:rPr>
-              <a:t>conse</a:t>
-            </a:r>
-            <a:r>
-              <a:rPr lang="en-US" sz="3000" dirty="0">
-                <a:solidFill>
-                  <a:srgbClr val="000000"/>
-                </a:solidFill>
-                <a:latin typeface="LeituraSans-Grot 2"/>
-                <a:cs typeface="LeituraSans-Grot 2"/>
-              </a:rPr>
-              <a:t> minim </a:t>
-            </a:r>
-            <a:r>
-              <a:rPr lang="en-US" sz="3000" dirty="0" err="1">
-                <a:solidFill>
-                  <a:srgbClr val="000000"/>
-                </a:solidFill>
-                <a:latin typeface="LeituraSans-Grot 2"/>
-                <a:cs typeface="LeituraSans-Grot 2"/>
-              </a:rPr>
-              <a:t>zzriure</a:t>
-            </a:r>
-            <a:r>
-              <a:rPr lang="en-US" sz="3000" dirty="0">
-                <a:solidFill>
-                  <a:srgbClr val="000000"/>
-                </a:solidFill>
-                <a:latin typeface="LeituraSans-Grot 2"/>
-                <a:cs typeface="LeituraSans-Grot 2"/>
-              </a:rPr>
-              <a:t> </a:t>
-            </a:r>
-            <a:r>
-              <a:rPr lang="en-US" sz="3000" dirty="0" err="1">
-                <a:solidFill>
-                  <a:srgbClr val="000000"/>
-                </a:solidFill>
-                <a:latin typeface="LeituraSans-Grot 2"/>
-                <a:cs typeface="LeituraSans-Grot 2"/>
-              </a:rPr>
-              <a:t>tio</a:t>
-            </a:r>
-            <a:r>
-              <a:rPr lang="en-US" sz="3000" dirty="0">
-                <a:solidFill>
-                  <a:srgbClr val="000000"/>
-                </a:solidFill>
-                <a:latin typeface="LeituraSans-Grot 2"/>
-                <a:cs typeface="LeituraSans-Grot 2"/>
-              </a:rPr>
-              <a:t> </a:t>
-            </a:r>
-            <a:r>
-              <a:rPr lang="en-US" sz="3000" dirty="0" err="1">
-                <a:solidFill>
-                  <a:srgbClr val="000000"/>
-                </a:solidFill>
-                <a:latin typeface="LeituraSans-Grot 2"/>
-                <a:cs typeface="LeituraSans-Grot 2"/>
-              </a:rPr>
-              <a:t>dolore</a:t>
-            </a:r>
-            <a:r>
-              <a:rPr lang="en-US" sz="3000" dirty="0">
-                <a:solidFill>
-                  <a:srgbClr val="000000"/>
-                </a:solidFill>
-                <a:latin typeface="LeituraSans-Grot 2"/>
-                <a:cs typeface="LeituraSans-Grot 2"/>
-              </a:rPr>
-              <a:t> </a:t>
-            </a:r>
-            <a:r>
-              <a:rPr lang="en-US" sz="3000" dirty="0" err="1">
-                <a:solidFill>
-                  <a:srgbClr val="000000"/>
-                </a:solidFill>
-                <a:latin typeface="LeituraSans-Grot 2"/>
-                <a:cs typeface="LeituraSans-Grot 2"/>
-              </a:rPr>
-              <a:t>tet</a:t>
-            </a:r>
-            <a:r>
-              <a:rPr lang="en-US" sz="3000" dirty="0">
-                <a:solidFill>
-                  <a:srgbClr val="000000"/>
-                </a:solidFill>
-                <a:latin typeface="LeituraSans-Grot 2"/>
-                <a:cs typeface="LeituraSans-Grot 2"/>
-              </a:rPr>
-              <a:t>, </a:t>
-            </a:r>
-            <a:r>
-              <a:rPr lang="en-US" sz="3000" dirty="0" err="1">
-                <a:solidFill>
-                  <a:srgbClr val="000000"/>
-                </a:solidFill>
-                <a:latin typeface="LeituraSans-Grot 2"/>
-                <a:cs typeface="LeituraSans-Grot 2"/>
-              </a:rPr>
-              <a:t>volobor</a:t>
-            </a:r>
-            <a:r>
-              <a:rPr lang="en-US" sz="3000" dirty="0">
-                <a:solidFill>
-                  <a:srgbClr val="000000"/>
-                </a:solidFill>
-                <a:latin typeface="LeituraSans-Grot 2"/>
-                <a:cs typeface="LeituraSans-Grot 2"/>
-              </a:rPr>
-              <a:t> </a:t>
-            </a:r>
-            <a:r>
-              <a:rPr lang="en-US" sz="3000" dirty="0" err="1">
-                <a:solidFill>
-                  <a:srgbClr val="000000"/>
-                </a:solidFill>
-                <a:latin typeface="LeituraSans-Grot 2"/>
-                <a:cs typeface="LeituraSans-Grot 2"/>
-              </a:rPr>
-              <a:t>si</a:t>
-            </a:r>
-            <a:r>
-              <a:rPr lang="en-US" sz="3000" dirty="0">
-                <a:solidFill>
-                  <a:srgbClr val="000000"/>
-                </a:solidFill>
-                <a:latin typeface="LeituraSans-Grot 2"/>
-                <a:cs typeface="LeituraSans-Grot 2"/>
-              </a:rPr>
-              <a:t>.</a:t>
+              <a:rPr lang="en-US" sz="2400" dirty="0" smtClean="0">
+                <a:solidFill>
+                  <a:srgbClr val="000000"/>
+                </a:solidFill>
+                <a:latin typeface="LeituraSans-Grot 2"/>
+                <a:cs typeface="LeituraSans-Grot 2"/>
+              </a:rPr>
+              <a:t>Literal Code: Raw/embedded Python code.</a:t>
             </a:r>
           </a:p>
           <a:p>
@@ -7310,37 +5225,51 @@
               <a:defRPr/>
             </a:pPr>
             <a:r>
-              <a:rPr lang="en-US" sz="3000" dirty="0" err="1">
-                <a:solidFill>
-                  <a:srgbClr val="000000"/>
-                </a:solidFill>
-                <a:latin typeface="LeituraSans-Grot 2"/>
-                <a:cs typeface="LeituraSans-Grot 2"/>
-              </a:rPr>
-              <a:t>vel</a:t>
-            </a:r>
-            <a:r>
-              <a:rPr lang="en-US" sz="3000" dirty="0">
-                <a:solidFill>
-                  <a:srgbClr val="000000"/>
-                </a:solidFill>
-                <a:latin typeface="LeituraSans-Grot 2"/>
-                <a:cs typeface="LeituraSans-Grot 2"/>
-              </a:rPr>
-              <a:t> et </a:t>
-            </a:r>
-            <a:r>
-              <a:rPr lang="en-US" sz="3000" dirty="0" err="1">
-                <a:solidFill>
-                  <a:srgbClr val="000000"/>
-                </a:solidFill>
-                <a:latin typeface="LeituraSans-Grot 2"/>
-                <a:cs typeface="LeituraSans-Grot 2"/>
-              </a:rPr>
-              <a:t>vel</a:t>
-            </a:r>
-            <a:r>
-              <a:rPr lang="en-US" sz="3000" dirty="0">
+              <a:rPr lang="en-US" sz="2400" dirty="0" smtClean="0">
+                <a:solidFill>
+                  <a:srgbClr val="000000"/>
+                </a:solidFill>
+                <a:latin typeface="LeituraSans-Grot 2"/>
+                <a:cs typeface="LeituraSans-Grot 2"/>
+              </a:rPr>
+              <a:t>Pool Variable: Used to define value pools. A pool variable can take a range of values.</a:t>
+            </a:r>
+          </a:p>
+          <a:p>
+            <a:pPr marL="571500" indent="-571500">
+              <a:buFont typeface="Arial"/>
+              <a:buChar char="•"/>
+              <a:defRPr/>
+            </a:pPr>
+            <a:r>
+              <a:rPr lang="en-US" sz="2400" dirty="0" smtClean="0">
+                <a:solidFill>
+                  <a:srgbClr val="000000"/>
+                </a:solidFill>
+                <a:latin typeface="LeituraSans-Grot 2"/>
+                <a:cs typeface="LeituraSans-Grot 2"/>
+              </a:rPr>
+              <a:t>Pool Variable with a REF: Used for differential testing.</a:t>
+            </a:r>
+          </a:p>
+          <a:p>
+            <a:pPr marL="571500" indent="-571500">
+              <a:buFont typeface="Arial"/>
+              <a:buChar char="•"/>
+              <a:defRPr/>
+            </a:pPr>
+            <a:r>
+              <a:rPr lang="en-US" sz="2400" dirty="0" smtClean="0">
+                <a:solidFill>
+                  <a:srgbClr val="000000"/>
+                </a:solidFill>
+                <a:latin typeface="LeituraSans-Grot 2"/>
+                <a:cs typeface="LeituraSans-Grot 2"/>
+              </a:rPr>
+              <a:t>Action Line: Any line where an action is performed. Usually the ones with assignment :=</a:t>
+            </a:r>
+            <a:r>
+              <a:rPr lang="en-US" sz="2400" dirty="0">
                 <a:solidFill>
                   <a:srgbClr val="000000"/>
                 </a:solidFill>
@@ -7350,285 +5279,103 @@
               <a:t> </a:t>
             </a:r>
             <a:r>
-              <a:rPr lang="en-US" sz="3000" dirty="0" err="1">
-                <a:solidFill>
-                  <a:srgbClr val="000000"/>
-                </a:solidFill>
-                <a:latin typeface="LeituraSans-Grot 2"/>
-                <a:cs typeface="LeituraSans-Grot 2"/>
-              </a:rPr>
-              <a:t>dionsenit</a:t>
-            </a:r>
-            <a:r>
-              <a:rPr lang="en-US" sz="3000" dirty="0">
-                <a:solidFill>
-                  <a:srgbClr val="000000"/>
-                </a:solidFill>
-                <a:latin typeface="LeituraSans-Grot 2"/>
-                <a:cs typeface="LeituraSans-Grot 2"/>
-              </a:rPr>
-              <a:t> </a:t>
-            </a:r>
-            <a:r>
-              <a:rPr lang="en-US" sz="3000" dirty="0" err="1">
-                <a:solidFill>
-                  <a:srgbClr val="000000"/>
-                </a:solidFill>
-                <a:latin typeface="LeituraSans-Grot 2"/>
-                <a:cs typeface="LeituraSans-Grot 2"/>
-              </a:rPr>
-              <a:t>adit</a:t>
-            </a:r>
-            <a:r>
-              <a:rPr lang="en-US" sz="3000" dirty="0">
-                <a:solidFill>
-                  <a:srgbClr val="000000"/>
-                </a:solidFill>
-                <a:latin typeface="LeituraSans-Grot 2"/>
-                <a:cs typeface="LeituraSans-Grot 2"/>
-              </a:rPr>
-              <a:t>, </a:t>
-            </a:r>
-            <a:r>
-              <a:rPr lang="en-US" sz="3000" dirty="0" err="1">
-                <a:solidFill>
-                  <a:srgbClr val="000000"/>
-                </a:solidFill>
-                <a:latin typeface="LeituraSans-Grot 2"/>
-                <a:cs typeface="LeituraSans-Grot 2"/>
-              </a:rPr>
-              <a:t>consenim</a:t>
-            </a:r>
-            <a:r>
-              <a:rPr lang="en-US" sz="3000" dirty="0">
-                <a:solidFill>
-                  <a:srgbClr val="000000"/>
-                </a:solidFill>
-                <a:latin typeface="LeituraSans-Grot 2"/>
-                <a:cs typeface="LeituraSans-Grot 2"/>
-              </a:rPr>
-              <a:t> </a:t>
-            </a:r>
-            <a:r>
-              <a:rPr lang="en-US" sz="3000" dirty="0" err="1">
-                <a:solidFill>
-                  <a:srgbClr val="000000"/>
-                </a:solidFill>
-                <a:latin typeface="LeituraSans-Grot 2"/>
-                <a:cs typeface="LeituraSans-Grot 2"/>
-              </a:rPr>
-              <a:t>zzrillute</a:t>
-            </a:r>
-            <a:r>
-              <a:rPr lang="en-US" sz="3000" dirty="0">
-                <a:solidFill>
-                  <a:srgbClr val="000000"/>
-                </a:solidFill>
-                <a:latin typeface="LeituraSans-Grot 2"/>
-                <a:cs typeface="LeituraSans-Grot 2"/>
-              </a:rPr>
-              <a:t> el </a:t>
-            </a:r>
-            <a:r>
-              <a:rPr lang="en-US" sz="3000" dirty="0" err="1">
-                <a:solidFill>
-                  <a:srgbClr val="000000"/>
-                </a:solidFill>
-                <a:latin typeface="LeituraSans-Grot 2"/>
-                <a:cs typeface="LeituraSans-Grot 2"/>
-              </a:rPr>
-              <a:t>euguerostie</a:t>
-            </a:r>
-            <a:r>
-              <a:rPr lang="en-US" sz="3000" dirty="0">
-                <a:solidFill>
-                  <a:srgbClr val="000000"/>
-                </a:solidFill>
-                <a:latin typeface="LeituraSans-Grot 2"/>
-                <a:cs typeface="LeituraSans-Grot 2"/>
-              </a:rPr>
-              <a:t> </a:t>
-            </a:r>
-            <a:r>
-              <a:rPr lang="en-US" sz="3000" dirty="0" err="1">
-                <a:solidFill>
-                  <a:srgbClr val="000000"/>
-                </a:solidFill>
-                <a:latin typeface="LeituraSans-Grot 2"/>
-                <a:cs typeface="LeituraSans-Grot 2"/>
-              </a:rPr>
-              <a:t>faci</a:t>
-            </a:r>
-            <a:r>
-              <a:rPr lang="en-US" sz="3000" dirty="0">
-                <a:solidFill>
-                  <a:srgbClr val="000000"/>
-                </a:solidFill>
-                <a:latin typeface="LeituraSans-Grot 2"/>
-                <a:cs typeface="LeituraSans-Grot 2"/>
-              </a:rPr>
-              <a:t> </a:t>
-            </a:r>
-            <a:r>
-              <a:rPr lang="en-US" sz="3000" dirty="0" err="1">
-                <a:solidFill>
-                  <a:srgbClr val="000000"/>
-                </a:solidFill>
-                <a:latin typeface="LeituraSans-Grot 2"/>
-                <a:cs typeface="LeituraSans-Grot 2"/>
-              </a:rPr>
-              <a:t>bla</a:t>
-            </a:r>
-            <a:r>
-              <a:rPr lang="en-US" sz="3000" dirty="0">
-                <a:solidFill>
-                  <a:srgbClr val="000000"/>
-                </a:solidFill>
-                <a:latin typeface="LeituraSans-Grot 2"/>
-                <a:cs typeface="LeituraSans-Grot 2"/>
-              </a:rPr>
-              <a:t> </a:t>
-            </a:r>
-            <a:r>
-              <a:rPr lang="en-US" sz="3000" dirty="0" err="1">
-                <a:solidFill>
-                  <a:srgbClr val="000000"/>
-                </a:solidFill>
-                <a:latin typeface="LeituraSans-Grot 2"/>
-                <a:cs typeface="LeituraSans-Grot 2"/>
-              </a:rPr>
-              <a:t>conse</a:t>
-            </a:r>
-            <a:r>
-              <a:rPr lang="en-US" sz="3000" dirty="0">
-                <a:solidFill>
-                  <a:srgbClr val="000000"/>
-                </a:solidFill>
-                <a:latin typeface="LeituraSans-Grot 2"/>
-                <a:cs typeface="LeituraSans-Grot 2"/>
-              </a:rPr>
-              <a:t> minim </a:t>
-            </a:r>
-            <a:r>
-              <a:rPr lang="en-US" sz="3000" dirty="0" err="1">
-                <a:solidFill>
-                  <a:srgbClr val="000000"/>
-                </a:solidFill>
-                <a:latin typeface="LeituraSans-Grot 2"/>
-                <a:cs typeface="LeituraSans-Grot 2"/>
-              </a:rPr>
-              <a:t>zzriure</a:t>
-            </a:r>
-            <a:r>
-              <a:rPr lang="en-US" sz="3000" dirty="0">
-                <a:solidFill>
-                  <a:srgbClr val="000000"/>
-                </a:solidFill>
-                <a:latin typeface="LeituraSans-Grot 2"/>
-                <a:cs typeface="LeituraSans-Grot 2"/>
-              </a:rPr>
-              <a:t> </a:t>
-            </a:r>
-            <a:r>
-              <a:rPr lang="en-US" sz="3000" dirty="0" err="1">
-                <a:solidFill>
-                  <a:srgbClr val="000000"/>
-                </a:solidFill>
-                <a:latin typeface="LeituraSans-Grot 2"/>
-                <a:cs typeface="LeituraSans-Grot 2"/>
-              </a:rPr>
-              <a:t>tio</a:t>
-            </a:r>
-            <a:r>
-              <a:rPr lang="en-US" sz="3000" dirty="0">
-                <a:solidFill>
-                  <a:srgbClr val="000000"/>
-                </a:solidFill>
-                <a:latin typeface="LeituraSans-Grot 2"/>
-                <a:cs typeface="LeituraSans-Grot 2"/>
-              </a:rPr>
-              <a:t> </a:t>
-            </a:r>
-            <a:r>
-              <a:rPr lang="en-US" sz="3000" dirty="0" err="1">
-                <a:solidFill>
-                  <a:srgbClr val="000000"/>
-                </a:solidFill>
-                <a:latin typeface="LeituraSans-Grot 2"/>
-                <a:cs typeface="LeituraSans-Grot 2"/>
-              </a:rPr>
-              <a:t>dolore</a:t>
-            </a:r>
-            <a:r>
-              <a:rPr lang="en-US" sz="3000" dirty="0">
-                <a:solidFill>
-                  <a:srgbClr val="000000"/>
-                </a:solidFill>
-                <a:latin typeface="LeituraSans-Grot 2"/>
-                <a:cs typeface="LeituraSans-Grot 2"/>
-              </a:rPr>
-              <a:t> </a:t>
-            </a:r>
-            <a:r>
-              <a:rPr lang="en-US" sz="3000" dirty="0" err="1">
-                <a:solidFill>
-                  <a:srgbClr val="000000"/>
-                </a:solidFill>
-                <a:latin typeface="LeituraSans-Grot 2"/>
-                <a:cs typeface="LeituraSans-Grot 2"/>
-              </a:rPr>
-              <a:t>tet</a:t>
-            </a:r>
-            <a:r>
-              <a:rPr lang="en-US" sz="3000" dirty="0">
-                <a:solidFill>
-                  <a:srgbClr val="000000"/>
-                </a:solidFill>
-                <a:latin typeface="LeituraSans-Grot 2"/>
-                <a:cs typeface="LeituraSans-Grot 2"/>
-              </a:rPr>
-              <a:t>, </a:t>
-            </a:r>
-            <a:r>
-              <a:rPr lang="en-US" sz="3000" dirty="0" err="1">
-                <a:solidFill>
-                  <a:srgbClr val="000000"/>
-                </a:solidFill>
-                <a:latin typeface="LeituraSans-Grot 2"/>
-                <a:cs typeface="LeituraSans-Grot 2"/>
-              </a:rPr>
-              <a:t>volobor</a:t>
-            </a:r>
-            <a:r>
-              <a:rPr lang="en-US" sz="3000" dirty="0">
-                <a:solidFill>
-                  <a:srgbClr val="000000"/>
-                </a:solidFill>
-                <a:latin typeface="LeituraSans-Grot 2"/>
-                <a:cs typeface="LeituraSans-Grot 2"/>
-              </a:rPr>
-              <a:t> </a:t>
-            </a:r>
-            <a:r>
-              <a:rPr lang="en-US" sz="3000" dirty="0" err="1">
-                <a:solidFill>
-                  <a:srgbClr val="000000"/>
-                </a:solidFill>
-                <a:latin typeface="LeituraSans-Grot 2"/>
-                <a:cs typeface="LeituraSans-Grot 2"/>
-              </a:rPr>
-              <a:t>si</a:t>
-            </a:r>
-            <a:r>
-              <a:rPr lang="en-US" sz="3000" dirty="0">
-                <a:solidFill>
-                  <a:srgbClr val="000000"/>
-                </a:solidFill>
-                <a:latin typeface="LeituraSans-Grot 2"/>
-                <a:cs typeface="LeituraSans-Grot 2"/>
-              </a:rPr>
-              <a:t>.</a:t>
-            </a:r>
+              <a:rPr lang="en-US" sz="2400" dirty="0" smtClean="0">
+                <a:solidFill>
+                  <a:srgbClr val="000000"/>
+                </a:solidFill>
+                <a:latin typeface="LeituraSans-Grot 2"/>
+                <a:cs typeface="LeituraSans-Grot 2"/>
+              </a:rPr>
+              <a:t>or ones where a method of the API is called without assignment.</a:t>
+            </a:r>
+            <a:endParaRPr lang="en-US" sz="2400" dirty="0">
+              <a:solidFill>
+                <a:srgbClr val="000000"/>
+              </a:solidFill>
+              <a:latin typeface="LeituraSans-Grot 2"/>
+              <a:cs typeface="LeituraSans-Grot 2"/>
+            </a:endParaRPr>
+          </a:p>
+          <a:p>
+            <a:pPr marL="571500" indent="-571500">
+              <a:buFont typeface="Arial"/>
+              <a:buChar char="•"/>
+              <a:defRPr/>
+            </a:pPr>
+            <a:r>
+              <a:rPr lang="en-US" sz="2400" dirty="0" smtClean="0">
+                <a:solidFill>
+                  <a:srgbClr val="000000"/>
+                </a:solidFill>
+                <a:latin typeface="LeituraSans-Grot 2"/>
+                <a:cs typeface="LeituraSans-Grot 2"/>
+              </a:rPr>
+              <a:t>Integrated with </a:t>
+            </a:r>
+            <a:r>
+              <a:rPr lang="en-US" sz="2400" dirty="0" err="1" smtClean="0">
+                <a:solidFill>
+                  <a:srgbClr val="000000"/>
+                </a:solidFill>
+                <a:latin typeface="LeituraSans-Grot 2"/>
+                <a:cs typeface="LeituraSans-Grot 2"/>
+              </a:rPr>
+              <a:t>coverage.py</a:t>
+            </a:r>
+            <a:r>
+              <a:rPr lang="en-US" sz="2400" dirty="0" smtClean="0">
+                <a:solidFill>
+                  <a:srgbClr val="000000"/>
+                </a:solidFill>
+                <a:latin typeface="LeituraSans-Grot 2"/>
+                <a:cs typeface="LeituraSans-Grot 2"/>
+              </a:rPr>
+              <a:t> to show resulting coverage from running a test generator or model checker on the complied SUT</a:t>
+            </a:r>
+          </a:p>
+          <a:p>
+            <a:pPr marL="571500" indent="-571500">
+              <a:buFont typeface="Arial"/>
+              <a:buChar char="•"/>
+              <a:defRPr/>
+            </a:pPr>
+            <a:r>
+              <a:rPr lang="en-US" sz="2400" dirty="0">
+                <a:solidFill>
+                  <a:srgbClr val="000000"/>
+                </a:solidFill>
+                <a:latin typeface="LeituraSans-Grot 2"/>
+                <a:cs typeface="LeituraSans-Grot 2"/>
+              </a:rPr>
+              <a:t>T</a:t>
+            </a:r>
+            <a:r>
+              <a:rPr lang="en-US" sz="2400" dirty="0" smtClean="0">
+                <a:solidFill>
+                  <a:srgbClr val="000000"/>
+                </a:solidFill>
+                <a:latin typeface="LeituraSans-Grot 2"/>
+                <a:cs typeface="LeituraSans-Grot 2"/>
+              </a:rPr>
+              <a:t>ool to generate visual graph of possible </a:t>
+            </a:r>
+            <a:r>
+              <a:rPr lang="en-US" sz="2400" smtClean="0">
+                <a:solidFill>
+                  <a:srgbClr val="000000"/>
+                </a:solidFill>
+                <a:latin typeface="LeituraSans-Grot 2"/>
+                <a:cs typeface="LeituraSans-Grot 2"/>
+              </a:rPr>
+              <a:t>action sequence(s).</a:t>
+            </a:r>
+            <a:endParaRPr lang="en-US" sz="2400" dirty="0" smtClean="0">
+              <a:solidFill>
+                <a:srgbClr val="000000"/>
+              </a:solidFill>
+              <a:latin typeface="LeituraSans-Grot 2"/>
+              <a:cs typeface="LeituraSans-Grot 2"/>
+            </a:endParaRPr>
           </a:p>
         </p:txBody>
       </p:sp>
@@ -7642,7 +5389,7 @@
         </p:nvSpPr>
         <p:spPr bwMode="auto">
           <a:xfrm>
-            <a:off x="11430000" y="26060400"/>
+            <a:off x="11430000" y="25831800"/>
             <a:ext cx="9906000" cy="1569660"/>
           </a:xfrm>
           <a:prstGeom prst="rect">
@@ -7814,37 +5561,7 @@
                 <a:latin typeface="LeituraSans-Grot 2" charset="0"/>
                 <a:cs typeface="LeituraSans-Grot 2" charset="0"/>
               </a:rPr>
-              <a:t>)</a:t>
-            </a:r>
-            <a:r>
-              <a:rPr lang="en-US" sz="2400" dirty="0" smtClean="0">
-                <a:solidFill>
-                  <a:schemeClr val="bg2"/>
-                </a:solidFill>
-                <a:latin typeface="LeituraSans-Grot 2" charset="0"/>
-                <a:cs typeface="LeituraSans-Grot 2" charset="0"/>
-              </a:rPr>
-              <a:t> Declarative TSTL script for </a:t>
-            </a:r>
-            <a:r>
-              <a:rPr lang="en-US" sz="2400" dirty="0" smtClean="0">
-                <a:solidFill>
-                  <a:schemeClr val="bg2"/>
-                </a:solidFill>
-                <a:latin typeface="LeituraSans-Grot 2" charset="0"/>
-                <a:cs typeface="LeituraSans-Grot 2" charset="0"/>
-              </a:rPr>
-              <a:t>testing a stack implementation </a:t>
-            </a:r>
-            <a:r>
-              <a:rPr lang="en-US" sz="2400" dirty="0" smtClean="0">
-                <a:solidFill>
-                  <a:schemeClr val="bg2"/>
-                </a:solidFill>
-                <a:latin typeface="LeituraSans-Grot 2" charset="0"/>
-                <a:cs typeface="LeituraSans-Grot 2" charset="0"/>
-              </a:rPr>
-              <a:t>which can be used with a test generator to generate automated tests for stack API. Stack API contains: __</a:t>
+              <a:t>) Declarative TSTL script for testing a stack implementation which can be used with a test generator to generate automated tests for stack API. Stack API contains: __</a:t>
             </a:r>
             <a:r>
               <a:rPr lang="en-US" sz="2400" dirty="0" err="1" smtClean="0">
@@ -7925,7 +5642,7 @@
         <p:spPr>
           <a:xfrm>
             <a:off x="1524000" y="39281100"/>
-            <a:ext cx="2438400" cy="2476500"/>
+            <a:ext cx="7620000" cy="2476500"/>
           </a:xfrm>
           <a:prstGeom prst="rect">
             <a:avLst/>
@@ -7974,7 +5691,7 @@
         <p:spPr bwMode="auto">
           <a:xfrm>
             <a:off x="1752600" y="39687500"/>
-            <a:ext cx="2667000" cy="1568450"/>
+            <a:ext cx="2667000" cy="1569660"/>
           </a:xfrm>
           <a:prstGeom prst="rect">
             <a:avLst/>
@@ -8118,15 +5835,22 @@
           <a:p>
             <a:pPr eaLnBrk="1" hangingPunct="1"/>
             <a:r>
-              <a:rPr lang="en-US" sz="3200">
+              <a:rPr lang="en-US" sz="3200" dirty="0" smtClean="0">
                 <a:solidFill>
                   <a:srgbClr val="000000"/>
                 </a:solidFill>
                 <a:latin typeface="LeituraSans-Grot 3" charset="0"/>
                 <a:cs typeface="LeituraSans-Grot 3" charset="0"/>
               </a:rPr>
-              <a:t>Secondary logo if necessary</a:t>
-            </a:r>
+              <a:t>Contributors/Acknowledgements:</a:t>
+            </a:r>
+            <a:endParaRPr lang="en-US" sz="3200" dirty="0">
+              <a:solidFill>
+                <a:srgbClr val="000000"/>
+              </a:solidFill>
+              <a:latin typeface="LeituraSans-Grot 3" charset="0"/>
+              <a:cs typeface="LeituraSans-Grot 3" charset="0"/>
+            </a:endParaRPr>
           </a:p>
         </p:txBody>
       </p:sp>
@@ -8182,8 +5906,8 @@
         </p:blipFill>
         <p:spPr>
           <a:xfrm>
-            <a:off x="12573000" y="27813000"/>
-            <a:ext cx="7391400" cy="8029689"/>
+            <a:off x="11963400" y="27660600"/>
+            <a:ext cx="8458200" cy="9188613"/>
           </a:xfrm>
           <a:prstGeom prst="rect">
             <a:avLst/>
@@ -8198,7 +5922,7 @@
         </p:nvSpPr>
         <p:spPr>
           <a:xfrm>
-            <a:off x="11506200" y="19126200"/>
+            <a:off x="11506200" y="18821400"/>
             <a:ext cx="9753600" cy="6858000"/>
           </a:xfrm>
           <a:prstGeom prst="rect">
@@ -8250,8 +5974,670 @@
         </p:blipFill>
         <p:spPr>
           <a:xfrm>
-            <a:off x="11582400" y="19202400"/>
+            <a:off x="11582400" y="18897600"/>
             <a:ext cx="9601200" cy="6443330"/>
+          </a:xfrm>
+          <a:prstGeom prst="rect">
+            <a:avLst/>
+          </a:prstGeom>
+        </p:spPr>
+      </p:pic>
+      <p:sp>
+        <p:nvSpPr>
+          <p:cNvPr id="14" name="TextBox 13"/>
+          <p:cNvSpPr txBox="1"/>
+          <p:nvPr/>
+        </p:nvSpPr>
+        <p:spPr>
+          <a:xfrm>
+            <a:off x="21793200" y="32080200"/>
+            <a:ext cx="10058400" cy="4462760"/>
+          </a:xfrm>
+          <a:prstGeom prst="rect">
+            <a:avLst/>
+          </a:prstGeom>
+          <a:noFill/>
+        </p:spPr>
+        <p:txBody>
+          <a:bodyPr wrap="square">
+            <a:spAutoFit/>
+          </a:bodyPr>
+          <a:lstStyle/>
+          <a:p>
+            <a:pPr>
+              <a:defRPr/>
+            </a:pPr>
+            <a:r>
+              <a:rPr lang="en-US" sz="4400" dirty="0" smtClean="0">
+                <a:solidFill>
+                  <a:srgbClr val="000000"/>
+                </a:solidFill>
+                <a:latin typeface="LeituraSans-Grot 3"/>
+                <a:cs typeface="LeituraSans-Grot 3"/>
+              </a:rPr>
+              <a:t>Links</a:t>
+            </a:r>
+            <a:endParaRPr lang="en-US" sz="2400" dirty="0" smtClean="0">
+              <a:solidFill>
+                <a:srgbClr val="000000"/>
+              </a:solidFill>
+              <a:latin typeface="LeituraSans-Grot 2"/>
+              <a:cs typeface="LeituraSans-Grot 2"/>
+            </a:endParaRPr>
+          </a:p>
+          <a:p>
+            <a:pPr marL="571500" indent="-571500">
+              <a:buFont typeface="Arial"/>
+              <a:buChar char="•"/>
+              <a:defRPr/>
+            </a:pPr>
+            <a:r>
+              <a:rPr lang="en-US" sz="2400" dirty="0" err="1" smtClean="0">
+                <a:solidFill>
+                  <a:srgbClr val="000000"/>
+                </a:solidFill>
+                <a:latin typeface="LeituraSans-Grot 2"/>
+                <a:cs typeface="LeituraSans-Grot 2"/>
+              </a:rPr>
+              <a:t>Nasa</a:t>
+            </a:r>
+            <a:r>
+              <a:rPr lang="en-US" sz="2400" dirty="0" smtClean="0">
+                <a:solidFill>
+                  <a:srgbClr val="000000"/>
+                </a:solidFill>
+                <a:latin typeface="LeituraSans-Grot 2"/>
+                <a:cs typeface="LeituraSans-Grot 2"/>
+              </a:rPr>
+              <a:t> </a:t>
+            </a:r>
+            <a:r>
+              <a:rPr lang="en-US" sz="2400" dirty="0">
+                <a:solidFill>
+                  <a:srgbClr val="000000"/>
+                </a:solidFill>
+                <a:latin typeface="LeituraSans-Grot 2"/>
+                <a:cs typeface="LeituraSans-Grot 2"/>
+              </a:rPr>
+              <a:t>Formal Methods </a:t>
+            </a:r>
+            <a:r>
+              <a:rPr lang="en-US" sz="2400" dirty="0" smtClean="0">
+                <a:solidFill>
+                  <a:srgbClr val="000000"/>
+                </a:solidFill>
+                <a:latin typeface="LeituraSans-Grot 2"/>
+                <a:cs typeface="LeituraSans-Grot 2"/>
+              </a:rPr>
+              <a:t>2015</a:t>
+            </a:r>
+            <a:br>
+              <a:rPr lang="en-US" sz="2400" dirty="0" smtClean="0">
+                <a:solidFill>
+                  <a:srgbClr val="000000"/>
+                </a:solidFill>
+                <a:latin typeface="LeituraSans-Grot 2"/>
+                <a:cs typeface="LeituraSans-Grot 2"/>
+              </a:rPr>
+            </a:br>
+            <a:r>
+              <a:rPr lang="en-US" sz="2400" dirty="0" smtClean="0">
+                <a:solidFill>
+                  <a:srgbClr val="000000"/>
+                </a:solidFill>
+                <a:latin typeface="LeituraSans-Grot 2"/>
+                <a:cs typeface="LeituraSans-Grot 2"/>
+                <a:hlinkClick r:id="rId5"/>
+              </a:rPr>
+              <a:t>http</a:t>
+            </a:r>
+            <a:r>
+              <a:rPr lang="en-US" sz="2400" dirty="0">
+                <a:solidFill>
+                  <a:srgbClr val="000000"/>
+                </a:solidFill>
+                <a:latin typeface="LeituraSans-Grot 2"/>
+                <a:cs typeface="LeituraSans-Grot 2"/>
+                <a:hlinkClick r:id="rId5"/>
+              </a:rPr>
+              <a:t>://www.cs.cmu.edu/~agroce/nfm15.</a:t>
+            </a:r>
+            <a:r>
+              <a:rPr lang="en-US" sz="2400" dirty="0" smtClean="0">
+                <a:solidFill>
+                  <a:srgbClr val="000000"/>
+                </a:solidFill>
+                <a:latin typeface="LeituraSans-Grot 2"/>
+                <a:cs typeface="LeituraSans-Grot 2"/>
+                <a:hlinkClick r:id="rId5"/>
+              </a:rPr>
+              <a:t>pdf</a:t>
+            </a:r>
+            <a:endParaRPr lang="en-US" sz="2400" dirty="0" smtClean="0">
+              <a:solidFill>
+                <a:srgbClr val="000000"/>
+              </a:solidFill>
+              <a:latin typeface="LeituraSans-Grot 2"/>
+              <a:cs typeface="LeituraSans-Grot 2"/>
+            </a:endParaRPr>
+          </a:p>
+          <a:p>
+            <a:pPr marL="571500" indent="-571500">
+              <a:buFont typeface="Arial"/>
+              <a:buChar char="•"/>
+              <a:defRPr/>
+            </a:pPr>
+            <a:endParaRPr lang="en-US" sz="2400" dirty="0" smtClean="0">
+              <a:solidFill>
+                <a:srgbClr val="000000"/>
+              </a:solidFill>
+              <a:latin typeface="LeituraSans-Grot 2"/>
+              <a:cs typeface="LeituraSans-Grot 2"/>
+            </a:endParaRPr>
+          </a:p>
+          <a:p>
+            <a:pPr marL="571500" indent="-571500">
+              <a:buFont typeface="Arial"/>
+              <a:buChar char="•"/>
+              <a:defRPr/>
+            </a:pPr>
+            <a:r>
+              <a:rPr lang="en-US" sz="2400" dirty="0" smtClean="0">
+                <a:solidFill>
+                  <a:srgbClr val="000000"/>
+                </a:solidFill>
+                <a:latin typeface="LeituraSans-Grot 2"/>
+                <a:cs typeface="LeituraSans-Grot 2"/>
+              </a:rPr>
+              <a:t>ISSTA 2015, ACM Digital Library link: </a:t>
+            </a:r>
+            <a:r>
+              <a:rPr lang="en-US" sz="2400" dirty="0" smtClean="0">
+                <a:solidFill>
+                  <a:srgbClr val="000000"/>
+                </a:solidFill>
+                <a:latin typeface="LeituraSans-Grot 2"/>
+                <a:cs typeface="LeituraSans-Grot 2"/>
+                <a:hlinkClick r:id="rId6"/>
+              </a:rPr>
+              <a:t>http</a:t>
+            </a:r>
+            <a:r>
+              <a:rPr lang="en-US" sz="2400" dirty="0">
+                <a:solidFill>
+                  <a:srgbClr val="000000"/>
+                </a:solidFill>
+                <a:latin typeface="LeituraSans-Grot 2"/>
+                <a:cs typeface="LeituraSans-Grot 2"/>
+                <a:hlinkClick r:id="rId6"/>
+              </a:rPr>
+              <a:t>://dl.acm.org/citation.cfm?id=</a:t>
+            </a:r>
+            <a:r>
+              <a:rPr lang="en-US" sz="2400" dirty="0" smtClean="0">
+                <a:solidFill>
+                  <a:srgbClr val="000000"/>
+                </a:solidFill>
+                <a:latin typeface="LeituraSans-Grot 2"/>
+                <a:cs typeface="LeituraSans-Grot 2"/>
+                <a:hlinkClick r:id="rId6"/>
+              </a:rPr>
+              <a:t>2784769</a:t>
+            </a:r>
+            <a:endParaRPr lang="en-US" sz="2400" dirty="0" smtClean="0">
+              <a:solidFill>
+                <a:srgbClr val="000000"/>
+              </a:solidFill>
+              <a:latin typeface="LeituraSans-Grot 2"/>
+              <a:cs typeface="LeituraSans-Grot 2"/>
+            </a:endParaRPr>
+          </a:p>
+          <a:p>
+            <a:pPr marL="571500" indent="-571500">
+              <a:buFont typeface="Arial"/>
+              <a:buChar char="•"/>
+              <a:defRPr/>
+            </a:pPr>
+            <a:endParaRPr lang="en-US" sz="2400" dirty="0" smtClean="0">
+              <a:solidFill>
+                <a:srgbClr val="000000"/>
+              </a:solidFill>
+              <a:latin typeface="LeituraSans-Grot 2"/>
+              <a:cs typeface="LeituraSans-Grot 2"/>
+            </a:endParaRPr>
+          </a:p>
+          <a:p>
+            <a:pPr marL="571500" indent="-571500">
+              <a:buFont typeface="Arial"/>
+              <a:buChar char="•"/>
+              <a:defRPr/>
+            </a:pPr>
+            <a:r>
+              <a:rPr lang="en-US" sz="2400" dirty="0">
+                <a:solidFill>
+                  <a:srgbClr val="000000"/>
+                </a:solidFill>
+                <a:latin typeface="LeituraSans-Grot 2"/>
+                <a:cs typeface="LeituraSans-Grot 2"/>
+              </a:rPr>
+              <a:t>TSTL for Java (work in progress by </a:t>
+            </a:r>
+            <a:r>
+              <a:rPr lang="en-US" sz="2400" dirty="0" err="1">
+                <a:solidFill>
+                  <a:srgbClr val="000000"/>
+                </a:solidFill>
+                <a:latin typeface="LeituraSans-Grot 2"/>
+                <a:cs typeface="LeituraSans-Grot 2"/>
+              </a:rPr>
+              <a:t>flipturnapps</a:t>
+            </a:r>
+            <a:r>
+              <a:rPr lang="en-US" sz="2400" dirty="0">
+                <a:solidFill>
+                  <a:srgbClr val="000000"/>
+                </a:solidFill>
+                <a:latin typeface="LeituraSans-Grot 2"/>
+                <a:cs typeface="LeituraSans-Grot 2"/>
+              </a:rPr>
+              <a:t> team): </a:t>
+            </a:r>
+            <a:r>
+              <a:rPr lang="en-US" sz="2400" dirty="0">
+                <a:solidFill>
+                  <a:srgbClr val="000000"/>
+                </a:solidFill>
+                <a:latin typeface="LeituraSans-Grot 2"/>
+                <a:cs typeface="LeituraSans-Grot 2"/>
+                <a:hlinkClick r:id="rId7"/>
+              </a:rPr>
+              <a:t>https://github.com/flipturnapps/TSTL-Java</a:t>
+            </a:r>
+            <a:endParaRPr lang="en-US" sz="2400" dirty="0">
+              <a:solidFill>
+                <a:srgbClr val="000000"/>
+              </a:solidFill>
+              <a:latin typeface="LeituraSans-Grot 2"/>
+              <a:cs typeface="LeituraSans-Grot 2"/>
+            </a:endParaRPr>
+          </a:p>
+          <a:p>
+            <a:pPr marL="571500" indent="-571500">
+              <a:buFont typeface="Arial"/>
+              <a:buChar char="•"/>
+              <a:defRPr/>
+            </a:pPr>
+            <a:endParaRPr lang="en-US" sz="2400" dirty="0" smtClean="0">
+              <a:solidFill>
+                <a:srgbClr val="000000"/>
+              </a:solidFill>
+              <a:latin typeface="LeituraSans-Grot 2"/>
+              <a:cs typeface="LeituraSans-Grot 2"/>
+            </a:endParaRPr>
+          </a:p>
+          <a:p>
+            <a:pPr>
+              <a:defRPr/>
+            </a:pPr>
+            <a:endParaRPr lang="en-US" sz="2400" dirty="0" smtClean="0">
+              <a:solidFill>
+                <a:srgbClr val="000000"/>
+              </a:solidFill>
+              <a:latin typeface="LeituraSans-Grot 2"/>
+              <a:cs typeface="LeituraSans-Grot 2"/>
+            </a:endParaRPr>
+          </a:p>
+        </p:txBody>
+      </p:sp>
+      <p:sp>
+        <p:nvSpPr>
+          <p:cNvPr id="15" name="TextBox 14"/>
+          <p:cNvSpPr txBox="1"/>
+          <p:nvPr/>
+        </p:nvSpPr>
+        <p:spPr>
+          <a:xfrm>
+            <a:off x="21793200" y="24003000"/>
+            <a:ext cx="9975850" cy="8771630"/>
+          </a:xfrm>
+          <a:prstGeom prst="rect">
+            <a:avLst/>
+          </a:prstGeom>
+          <a:noFill/>
+        </p:spPr>
+        <p:txBody>
+          <a:bodyPr>
+            <a:spAutoFit/>
+          </a:bodyPr>
+          <a:lstStyle/>
+          <a:p>
+            <a:pPr>
+              <a:defRPr/>
+            </a:pPr>
+            <a:r>
+              <a:rPr lang="en-US" sz="4000" dirty="0" smtClean="0">
+                <a:solidFill>
+                  <a:srgbClr val="000000"/>
+                </a:solidFill>
+                <a:latin typeface="LeituraSans-Grot 3"/>
+                <a:cs typeface="LeituraSans-Grot 3"/>
+              </a:rPr>
+              <a:t>Opportunities for TSTL industry adoption</a:t>
+            </a:r>
+            <a:br>
+              <a:rPr lang="en-US" sz="4000" dirty="0" smtClean="0">
+                <a:solidFill>
+                  <a:srgbClr val="000000"/>
+                </a:solidFill>
+                <a:latin typeface="LeituraSans-Grot 3"/>
+                <a:cs typeface="LeituraSans-Grot 3"/>
+              </a:rPr>
+            </a:br>
+            <a:endParaRPr lang="en-US" sz="4400" dirty="0" smtClean="0">
+              <a:solidFill>
+                <a:srgbClr val="000000"/>
+              </a:solidFill>
+              <a:latin typeface="LeituraSans-Grot 3"/>
+              <a:cs typeface="LeituraSans-Grot 3"/>
+            </a:endParaRPr>
+          </a:p>
+          <a:p>
+            <a:pPr marL="571500" indent="-571500">
+              <a:buFont typeface="Arial"/>
+              <a:buChar char="•"/>
+              <a:defRPr/>
+            </a:pPr>
+            <a:r>
+              <a:rPr lang="en-US" sz="2400" dirty="0" smtClean="0">
+                <a:solidFill>
+                  <a:srgbClr val="000000"/>
+                </a:solidFill>
+                <a:latin typeface="LeituraSans-Grot 2"/>
+                <a:cs typeface="LeituraSans-Grot 2"/>
+              </a:rPr>
+              <a:t>Game Testing: Games are often state based systems with several API calls / methods within. TSTL can be very useful for testing such games where often a game state is maintained internally. TSTL has been used to test games like dominion.</a:t>
+            </a:r>
+          </a:p>
+          <a:p>
+            <a:pPr marL="571500" indent="-571500">
+              <a:buFont typeface="Arial"/>
+              <a:buChar char="•"/>
+              <a:defRPr/>
+            </a:pPr>
+            <a:endParaRPr lang="en-US" sz="2400" dirty="0" smtClean="0">
+              <a:solidFill>
+                <a:srgbClr val="000000"/>
+              </a:solidFill>
+              <a:latin typeface="LeituraSans-Grot 2"/>
+              <a:cs typeface="LeituraSans-Grot 2"/>
+            </a:endParaRPr>
+          </a:p>
+          <a:p>
+            <a:pPr marL="571500" indent="-571500">
+              <a:buFont typeface="Arial"/>
+              <a:buChar char="•"/>
+              <a:defRPr/>
+            </a:pPr>
+            <a:endParaRPr lang="en-US" sz="2400" dirty="0">
+              <a:solidFill>
+                <a:srgbClr val="000000"/>
+              </a:solidFill>
+              <a:latin typeface="LeituraSans-Grot 2"/>
+              <a:cs typeface="LeituraSans-Grot 2"/>
+            </a:endParaRPr>
+          </a:p>
+          <a:p>
+            <a:pPr marL="571500" indent="-571500">
+              <a:buFont typeface="Arial"/>
+              <a:buChar char="•"/>
+              <a:defRPr/>
+            </a:pPr>
+            <a:endParaRPr lang="en-US" sz="2400" dirty="0" smtClean="0">
+              <a:solidFill>
+                <a:srgbClr val="000000"/>
+              </a:solidFill>
+              <a:latin typeface="LeituraSans-Grot 2"/>
+              <a:cs typeface="LeituraSans-Grot 2"/>
+            </a:endParaRPr>
+          </a:p>
+          <a:p>
+            <a:pPr marL="571500" indent="-571500">
+              <a:buFont typeface="Arial"/>
+              <a:buChar char="•"/>
+              <a:defRPr/>
+            </a:pPr>
+            <a:endParaRPr lang="en-US" sz="2400" dirty="0">
+              <a:solidFill>
+                <a:srgbClr val="000000"/>
+              </a:solidFill>
+              <a:latin typeface="LeituraSans-Grot 2"/>
+              <a:cs typeface="LeituraSans-Grot 2"/>
+            </a:endParaRPr>
+          </a:p>
+          <a:p>
+            <a:pPr marL="571500" indent="-571500">
+              <a:buFont typeface="Arial"/>
+              <a:buChar char="•"/>
+              <a:defRPr/>
+            </a:pPr>
+            <a:endParaRPr lang="en-US" sz="2400" dirty="0" smtClean="0">
+              <a:solidFill>
+                <a:srgbClr val="000000"/>
+              </a:solidFill>
+              <a:latin typeface="LeituraSans-Grot 2"/>
+              <a:cs typeface="LeituraSans-Grot 2"/>
+            </a:endParaRPr>
+          </a:p>
+          <a:p>
+            <a:pPr marL="571500" indent="-571500">
+              <a:buFont typeface="Arial"/>
+              <a:buChar char="•"/>
+              <a:defRPr/>
+            </a:pPr>
+            <a:endParaRPr lang="en-US" sz="2400" dirty="0">
+              <a:solidFill>
+                <a:srgbClr val="000000"/>
+              </a:solidFill>
+              <a:latin typeface="LeituraSans-Grot 2"/>
+              <a:cs typeface="LeituraSans-Grot 2"/>
+            </a:endParaRPr>
+          </a:p>
+          <a:p>
+            <a:pPr>
+              <a:defRPr/>
+            </a:pPr>
+            <a:endParaRPr lang="en-US" sz="2400" dirty="0">
+              <a:solidFill>
+                <a:srgbClr val="000000"/>
+              </a:solidFill>
+              <a:latin typeface="LeituraSans-Grot 2"/>
+              <a:cs typeface="LeituraSans-Grot 2"/>
+            </a:endParaRPr>
+          </a:p>
+          <a:p>
+            <a:pPr marL="571500" indent="-571500">
+              <a:buFont typeface="Arial"/>
+              <a:buChar char="•"/>
+              <a:defRPr/>
+            </a:pPr>
+            <a:r>
+              <a:rPr lang="en-US" sz="2400" dirty="0" smtClean="0">
+                <a:solidFill>
+                  <a:srgbClr val="000000"/>
+                </a:solidFill>
+                <a:latin typeface="LeituraSans-Grot 2"/>
+                <a:cs typeface="LeituraSans-Grot 2"/>
+              </a:rPr>
+              <a:t>Testing programming libraries: We tested </a:t>
+            </a:r>
+            <a:r>
+              <a:rPr lang="en-US" sz="2400" dirty="0" err="1" smtClean="0">
+                <a:solidFill>
+                  <a:srgbClr val="000000"/>
+                </a:solidFill>
+                <a:latin typeface="LeituraSans-Grot 2"/>
+                <a:cs typeface="LeituraSans-Grot 2"/>
+              </a:rPr>
+              <a:t>numpy</a:t>
+            </a:r>
+            <a:r>
+              <a:rPr lang="en-US" sz="2400" dirty="0" smtClean="0">
+                <a:solidFill>
+                  <a:srgbClr val="000000"/>
+                </a:solidFill>
+                <a:latin typeface="LeituraSans-Grot 2"/>
+                <a:cs typeface="LeituraSans-Grot 2"/>
+              </a:rPr>
+              <a:t>, </a:t>
+            </a:r>
+            <a:r>
+              <a:rPr lang="en-US" sz="2400" dirty="0" err="1" smtClean="0">
+                <a:solidFill>
+                  <a:srgbClr val="000000"/>
+                </a:solidFill>
+                <a:latin typeface="LeituraSans-Grot 2"/>
+                <a:cs typeface="LeituraSans-Grot 2"/>
+              </a:rPr>
+              <a:t>arcpy</a:t>
+            </a:r>
+            <a:r>
+              <a:rPr lang="en-US" sz="2400" dirty="0" smtClean="0">
+                <a:solidFill>
+                  <a:srgbClr val="000000"/>
+                </a:solidFill>
+                <a:latin typeface="LeituraSans-Grot 2"/>
+                <a:cs typeface="LeituraSans-Grot 2"/>
+              </a:rPr>
+              <a:t>, </a:t>
+            </a:r>
+            <a:r>
+              <a:rPr lang="en-US" sz="2400" dirty="0" err="1" smtClean="0">
+                <a:solidFill>
+                  <a:srgbClr val="000000"/>
+                </a:solidFill>
+                <a:latin typeface="LeituraSans-Grot 2"/>
+                <a:cs typeface="LeituraSans-Grot 2"/>
+              </a:rPr>
+              <a:t>biopython</a:t>
+            </a:r>
+            <a:r>
+              <a:rPr lang="en-US" sz="2400" dirty="0" smtClean="0">
+                <a:solidFill>
+                  <a:srgbClr val="000000"/>
+                </a:solidFill>
+                <a:latin typeface="LeituraSans-Grot 2"/>
+                <a:cs typeface="LeituraSans-Grot 2"/>
+              </a:rPr>
+              <a:t> amongst other libraries.</a:t>
+            </a:r>
+            <a:endParaRPr lang="en-US" sz="2400" dirty="0">
+              <a:solidFill>
+                <a:srgbClr val="000000"/>
+              </a:solidFill>
+              <a:latin typeface="LeituraSans-Grot 2"/>
+              <a:cs typeface="LeituraSans-Grot 2"/>
+            </a:endParaRPr>
+          </a:p>
+          <a:p>
+            <a:pPr marL="571500" indent="-571500">
+              <a:buFont typeface="Arial"/>
+              <a:buChar char="•"/>
+              <a:defRPr/>
+            </a:pPr>
+            <a:r>
+              <a:rPr lang="en-US" sz="2400" dirty="0" smtClean="0">
+                <a:solidFill>
+                  <a:srgbClr val="000000"/>
+                </a:solidFill>
+                <a:latin typeface="LeituraSans-Grot 2"/>
+                <a:cs typeface="LeituraSans-Grot 2"/>
+              </a:rPr>
+              <a:t>Compiler Testing: TSTL can be used for testing compiler source code.</a:t>
+            </a:r>
+          </a:p>
+          <a:p>
+            <a:pPr marL="571500" indent="-571500">
+              <a:buFont typeface="Arial"/>
+              <a:buChar char="•"/>
+              <a:defRPr/>
+            </a:pPr>
+            <a:r>
+              <a:rPr lang="en-US" sz="2400" dirty="0" smtClean="0">
+                <a:solidFill>
+                  <a:srgbClr val="000000"/>
+                </a:solidFill>
+                <a:latin typeface="LeituraSans-Grot 2"/>
+                <a:cs typeface="LeituraSans-Grot 2"/>
+              </a:rPr>
+              <a:t>Testing any state based system. Several software systems in different domains are state based systems.</a:t>
+            </a:r>
+          </a:p>
+          <a:p>
+            <a:pPr marL="571500" indent="-571500">
+              <a:buFont typeface="Arial"/>
+              <a:buChar char="•"/>
+              <a:defRPr/>
+            </a:pPr>
+            <a:endParaRPr lang="en-US" sz="2400" dirty="0" smtClean="0">
+              <a:solidFill>
+                <a:srgbClr val="000000"/>
+              </a:solidFill>
+              <a:latin typeface="LeituraSans-Grot 2"/>
+              <a:cs typeface="LeituraSans-Grot 2"/>
+            </a:endParaRPr>
+          </a:p>
+          <a:p>
+            <a:pPr>
+              <a:defRPr/>
+            </a:pPr>
+            <a:endParaRPr lang="en-US" sz="2400" dirty="0" smtClean="0">
+              <a:solidFill>
+                <a:srgbClr val="000000"/>
+              </a:solidFill>
+              <a:latin typeface="LeituraSans-Grot 2"/>
+              <a:cs typeface="LeituraSans-Grot 2"/>
+            </a:endParaRPr>
+          </a:p>
+          <a:p>
+            <a:pPr marL="571500" indent="-571500">
+              <a:buFont typeface="Arial"/>
+              <a:buChar char="•"/>
+              <a:defRPr/>
+            </a:pPr>
+            <a:endParaRPr lang="en-US" sz="2400" dirty="0" smtClean="0">
+              <a:solidFill>
+                <a:srgbClr val="000000"/>
+              </a:solidFill>
+              <a:latin typeface="LeituraSans-Grot 2"/>
+              <a:cs typeface="LeituraSans-Grot 2"/>
+            </a:endParaRPr>
+          </a:p>
+        </p:txBody>
+      </p:sp>
+      <p:pic>
+        <p:nvPicPr>
+          <p:cNvPr id="2" name="Picture 1" descr="Dominion_game.jpg"/>
+          <p:cNvPicPr>
+            <a:picLocks noChangeAspect="1"/>
+          </p:cNvPicPr>
+          <p:nvPr/>
+        </p:nvPicPr>
+        <p:blipFill>
+          <a:blip r:embed="rId8" cstate="print">
+            <a:extLst>
+              <a:ext uri="{28A0092B-C50C-407E-A947-70E740481C1C}">
+                <a14:useLocalDpi xmlns:a14="http://schemas.microsoft.com/office/drawing/2010/main" val="0"/>
+              </a:ext>
+            </a:extLst>
+          </a:blip>
+          <a:stretch>
+            <a:fillRect/>
+          </a:stretch>
+        </p:blipFill>
+        <p:spPr>
+          <a:xfrm>
+            <a:off x="25527000" y="26974800"/>
+            <a:ext cx="2133600" cy="2137876"/>
           </a:xfrm>
           <a:prstGeom prst="rect">
             <a:avLst/>

</xml_diff>

<commit_message>
Added team/contributor names in footer
</commit_message>
<xml_diff>
--- a/pycon-poster.pptx
+++ b/pycon-poster.pptx
@@ -5357,25 +5357,8 @@
                 <a:latin typeface="LeituraSans-Grot 2"/>
                 <a:cs typeface="LeituraSans-Grot 2"/>
               </a:rPr>
-              <a:t>ool to generate visual graph of possible </a:t>
-            </a:r>
-            <a:r>
-              <a:rPr lang="en-US" sz="2400" smtClean="0">
-                <a:solidFill>
-                  <a:srgbClr val="000000"/>
-                </a:solidFill>
-                <a:latin typeface="LeituraSans-Grot 2"/>
-                <a:cs typeface="LeituraSans-Grot 2"/>
-              </a:rPr>
-              <a:t>action sequence(s).</a:t>
-            </a:r>
-            <a:endParaRPr lang="en-US" sz="2400" dirty="0" smtClean="0">
-              <a:solidFill>
-                <a:srgbClr val="000000"/>
-              </a:solidFill>
-              <a:latin typeface="LeituraSans-Grot 2"/>
-              <a:cs typeface="LeituraSans-Grot 2"/>
-            </a:endParaRPr>
+              <a:t>ool to generate visual graph of possible action sequence(s).</a:t>
+            </a:r>
           </a:p>
         </p:txBody>
       </p:sp>
@@ -5642,7 +5625,7 @@
         <p:spPr>
           <a:xfrm>
             <a:off x="1524000" y="39281100"/>
-            <a:ext cx="7620000" cy="2476500"/>
+            <a:ext cx="7620000" cy="2705100"/>
           </a:xfrm>
           <a:prstGeom prst="rect">
             <a:avLst/>
@@ -5691,7 +5674,7 @@
         <p:spPr bwMode="auto">
           <a:xfrm>
             <a:off x="1752600" y="39687500"/>
-            <a:ext cx="2667000" cy="1569660"/>
+            <a:ext cx="7239000" cy="2062103"/>
           </a:xfrm>
           <a:prstGeom prst="rect">
             <a:avLst/>
@@ -5721,7 +5704,7 @@
           </a:extLst>
         </p:spPr>
         <p:txBody>
-          <a:bodyPr>
+          <a:bodyPr wrap="square">
             <a:spAutoFit/>
           </a:bodyPr>
           <a:lstStyle>
@@ -5835,14 +5818,103 @@
           <a:p>
             <a:pPr eaLnBrk="1" hangingPunct="1"/>
             <a:r>
-              <a:rPr lang="en-US" sz="3200" dirty="0" smtClean="0">
+              <a:rPr lang="en-US" sz="3200" smtClean="0">
                 <a:solidFill>
                   <a:srgbClr val="000000"/>
                 </a:solidFill>
                 <a:latin typeface="LeituraSans-Grot 3" charset="0"/>
                 <a:cs typeface="LeituraSans-Grot 3" charset="0"/>
               </a:rPr>
-              <a:t>Contributors/Acknowledgements:</a:t>
+              <a:t>TSTL Team </a:t>
+            </a:r>
+            <a:r>
+              <a:rPr lang="en-US" sz="3200" dirty="0" smtClean="0">
+                <a:solidFill>
+                  <a:srgbClr val="000000"/>
+                </a:solidFill>
+                <a:latin typeface="LeituraSans-Grot 3" charset="0"/>
+                <a:cs typeface="LeituraSans-Grot 3" charset="0"/>
+              </a:rPr>
+              <a:t>/ Contributors:</a:t>
+            </a:r>
+            <a:br>
+              <a:rPr lang="en-US" sz="3200" dirty="0" smtClean="0">
+                <a:solidFill>
+                  <a:srgbClr val="000000"/>
+                </a:solidFill>
+                <a:latin typeface="LeituraSans-Grot 3" charset="0"/>
+                <a:cs typeface="LeituraSans-Grot 3" charset="0"/>
+              </a:rPr>
+            </a:br>
+            <a:r>
+              <a:rPr lang="en-US" sz="3200" dirty="0" smtClean="0">
+                <a:solidFill>
+                  <a:srgbClr val="000000"/>
+                </a:solidFill>
+                <a:latin typeface="LeituraSans-Grot 3" charset="0"/>
+                <a:cs typeface="LeituraSans-Grot 3" charset="0"/>
+              </a:rPr>
+              <a:t>Alex </a:t>
+            </a:r>
+            <a:r>
+              <a:rPr lang="en-US" sz="3200" dirty="0" err="1" smtClean="0">
+                <a:solidFill>
+                  <a:srgbClr val="000000"/>
+                </a:solidFill>
+                <a:latin typeface="LeituraSans-Grot 3" charset="0"/>
+                <a:cs typeface="LeituraSans-Grot 3" charset="0"/>
+              </a:rPr>
+              <a:t>Groce</a:t>
+            </a:r>
+            <a:r>
+              <a:rPr lang="en-US" sz="3200" dirty="0" smtClean="0">
+                <a:solidFill>
+                  <a:srgbClr val="000000"/>
+                </a:solidFill>
+                <a:latin typeface="LeituraSans-Grot 3" charset="0"/>
+                <a:cs typeface="LeituraSans-Grot 3" charset="0"/>
+              </a:rPr>
+              <a:t>,  Josie Holmes, Pranjal Mittal, </a:t>
+            </a:r>
+            <a:r>
+              <a:rPr lang="en-US" sz="3200" dirty="0" err="1" smtClean="0">
+                <a:solidFill>
+                  <a:srgbClr val="000000"/>
+                </a:solidFill>
+                <a:latin typeface="LeituraSans-Grot 3" charset="0"/>
+                <a:cs typeface="LeituraSans-Grot 3" charset="0"/>
+              </a:rPr>
+              <a:t>Pooria</a:t>
+            </a:r>
+            <a:r>
+              <a:rPr lang="en-US" sz="3200" dirty="0" smtClean="0">
+                <a:solidFill>
+                  <a:srgbClr val="000000"/>
+                </a:solidFill>
+                <a:latin typeface="LeituraSans-Grot 3" charset="0"/>
+                <a:cs typeface="LeituraSans-Grot 3" charset="0"/>
+              </a:rPr>
+              <a:t> </a:t>
+            </a:r>
+            <a:r>
+              <a:rPr lang="en-US" sz="3200" dirty="0" err="1" smtClean="0">
+                <a:solidFill>
+                  <a:srgbClr val="000000"/>
+                </a:solidFill>
+                <a:latin typeface="LeituraSans-Grot 3" charset="0"/>
+                <a:cs typeface="LeituraSans-Grot 3" charset="0"/>
+              </a:rPr>
+              <a:t>Azimi</a:t>
+            </a:r>
+            <a:r>
+              <a:rPr lang="en-US" sz="3200" dirty="0" smtClean="0">
+                <a:solidFill>
+                  <a:srgbClr val="000000"/>
+                </a:solidFill>
+                <a:latin typeface="LeituraSans-Grot 3" charset="0"/>
+                <a:cs typeface="LeituraSans-Grot 3" charset="0"/>
+              </a:rPr>
+              <a:t>, Jervis Pinto, Dr. James O’Brien </a:t>
             </a:r>
             <a:endParaRPr lang="en-US" sz="3200" dirty="0">
               <a:solidFill>

</xml_diff>

<commit_message>
poster edits from alex
</commit_message>
<xml_diff>
--- a/pycon-poster.pptx
+++ b/pycon-poster.pptx
@@ -4127,17 +4127,17 @@
                 <a:latin typeface="LeituraSans-Grot 3" charset="0"/>
                 <a:cs typeface="LeituraSans-Grot 3" charset="0"/>
               </a:rPr>
-              <a:t>Pranjal Mittal, MS CS Student; Alex </a:t>
-            </a:r>
-            <a:r>
-              <a:rPr lang="en-US" sz="7500" dirty="0" err="1" smtClean="0">
+              <a:t>Pranjal Mittal, MS CS </a:t>
+            </a:r>
+            <a:r>
+              <a:rPr lang="en-US" sz="7500" dirty="0" smtClean="0">
                 <a:solidFill>
                   <a:srgbClr val="000000"/>
                 </a:solidFill>
                 <a:latin typeface="LeituraSans-Grot 3" charset="0"/>
                 <a:cs typeface="LeituraSans-Grot 3" charset="0"/>
               </a:rPr>
-              <a:t>Groce</a:t>
+              <a:t>Student, </a:t>
             </a:r>
             <a:r>
               <a:rPr lang="en-US" sz="7500" dirty="0" smtClean="0">
@@ -4147,7 +4147,17 @@
                 <a:latin typeface="LeituraSans-Grot 3" charset="0"/>
                 <a:cs typeface="LeituraSans-Grot 3" charset="0"/>
               </a:rPr>
-              <a:t>, Associate Professor; </a:t>
+              <a:t>Alex Groce, Associate </a:t>
+            </a:r>
+            <a:r>
+              <a:rPr lang="en-US" sz="7500" dirty="0" smtClean="0">
+                <a:solidFill>
+                  <a:srgbClr val="000000"/>
+                </a:solidFill>
+                <a:latin typeface="LeituraSans-Grot 3" charset="0"/>
+                <a:cs typeface="LeituraSans-Grot 3" charset="0"/>
+              </a:rPr>
+              <a:t>Professor </a:t>
             </a:r>
             <a:endParaRPr lang="en-US" sz="7500" dirty="0">
               <a:solidFill>
@@ -4377,7 +4387,7 @@
         <p:spPr>
           <a:xfrm>
             <a:off x="1066800" y="8077200"/>
-            <a:ext cx="9975850" cy="26591893"/>
+            <a:ext cx="9975850" cy="28900217"/>
           </a:xfrm>
           <a:prstGeom prst="rect">
             <a:avLst/>
@@ -4436,7 +4446,17 @@
                 <a:latin typeface="LeituraSans-Grot 2"/>
                 <a:cs typeface="LeituraSans-Grot 2"/>
               </a:rPr>
-              <a:t>is arduous. </a:t>
+              <a:t>is </a:t>
+            </a:r>
+            <a:r>
+              <a:rPr lang="en-US" sz="3000" dirty="0" smtClean="0">
+                <a:solidFill>
+                  <a:srgbClr val="000000"/>
+                </a:solidFill>
+                <a:latin typeface="LeituraSans-Grot 2"/>
+                <a:cs typeface="LeituraSans-Grot 2"/>
+              </a:rPr>
+              <a:t>an unpleasant task.  The </a:t>
             </a:r>
             <a:r>
               <a:rPr lang="en-US" sz="3000" dirty="0">
@@ -4446,7 +4466,67 @@
                 <a:latin typeface="LeituraSans-Grot 2"/>
                 <a:cs typeface="LeituraSans-Grot 2"/>
               </a:rPr>
-              <a:t>The lack of tools for automated testing is an obstacle to adopting effective automated test generation methods, including random testing. TSTL is a domain-specific language for testing, written in Python, &amp; allowing embedded Python code, that makes it easy to produce test harnesses, usable with many different test generation methods </a:t>
+              <a:t>lack of tools for automated testing is an obstacle to </a:t>
+            </a:r>
+            <a:r>
+              <a:rPr lang="en-US" sz="3000" dirty="0" smtClean="0">
+                <a:solidFill>
+                  <a:srgbClr val="000000"/>
+                </a:solidFill>
+                <a:latin typeface="LeituraSans-Grot 2"/>
+                <a:cs typeface="LeituraSans-Grot 2"/>
+              </a:rPr>
+              <a:t>the adoption of effective </a:t>
+            </a:r>
+            <a:r>
+              <a:rPr lang="en-US" sz="3000" dirty="0">
+                <a:solidFill>
+                  <a:srgbClr val="000000"/>
+                </a:solidFill>
+                <a:latin typeface="LeituraSans-Grot 2"/>
+                <a:cs typeface="LeituraSans-Grot 2"/>
+              </a:rPr>
+              <a:t>automated test generation methods, including random testing. </a:t>
+            </a:r>
+            <a:r>
+              <a:rPr lang="en-US" sz="3000" dirty="0" smtClean="0">
+                <a:solidFill>
+                  <a:srgbClr val="000000"/>
+                </a:solidFill>
+                <a:latin typeface="LeituraSans-Grot 2"/>
+                <a:cs typeface="LeituraSans-Grot 2"/>
+              </a:rPr>
+              <a:t> TSTL </a:t>
+            </a:r>
+            <a:r>
+              <a:rPr lang="en-US" sz="3000" dirty="0">
+                <a:solidFill>
+                  <a:srgbClr val="000000"/>
+                </a:solidFill>
+                <a:latin typeface="LeituraSans-Grot 2"/>
+                <a:cs typeface="LeituraSans-Grot 2"/>
+              </a:rPr>
+              <a:t>is a domain-specific language for testing, written in Python, </a:t>
+            </a:r>
+            <a:r>
+              <a:rPr lang="en-US" sz="3000" dirty="0" smtClean="0">
+                <a:solidFill>
+                  <a:srgbClr val="000000"/>
+                </a:solidFill>
+                <a:latin typeface="LeituraSans-Grot 2"/>
+                <a:cs typeface="LeituraSans-Grot 2"/>
+              </a:rPr>
+              <a:t>for Python </a:t>
+            </a:r>
+            <a:r>
+              <a:rPr lang="en-US" sz="3000" dirty="0">
+                <a:solidFill>
+                  <a:srgbClr val="000000"/>
+                </a:solidFill>
+                <a:latin typeface="LeituraSans-Grot 2"/>
+                <a:cs typeface="LeituraSans-Grot 2"/>
+              </a:rPr>
+              <a:t>code, that makes it easy to produce test harnesses, usable with many different test generation methods </a:t>
             </a:r>
             <a:r>
               <a:rPr lang="en-US" sz="3000" dirty="0" smtClean="0">
@@ -4483,8 +4563,15 @@
                 <a:latin typeface="LeituraSans-Grot 3"/>
                 <a:cs typeface="LeituraSans-Grot 3"/>
               </a:rPr>
-              <a:t>Problem</a:t>
-            </a:r>
+              <a:t>The Problem</a:t>
+            </a:r>
+            <a:endParaRPr lang="en-US" sz="5400" dirty="0" smtClean="0">
+              <a:solidFill>
+                <a:srgbClr val="000000"/>
+              </a:solidFill>
+              <a:latin typeface="LeituraSans-Grot 3"/>
+              <a:cs typeface="LeituraSans-Grot 3"/>
+            </a:endParaRPr>
           </a:p>
           <a:p>
             <a:pPr>
@@ -4498,7 +4585,37 @@
                 <a:latin typeface="LeituraSans-Grot 2"/>
                 <a:cs typeface="LeituraSans-Grot 2"/>
               </a:rPr>
-              <a:t>Automated testing often requires a user to write a test harness —- essentially a program that defines (or generates) the set of valid tests for the Software Under Test (SUT). Such harnesses are common to random testing, many kinds of model checking, and various machine-learning influenced approaches. </a:t>
+              <a:t>Automated testing often requires a user to write a test harness —- essentially a program that defines (or generates) the set of valid tests for the Software Under Test (SUT). </a:t>
+            </a:r>
+            <a:r>
+              <a:rPr lang="en-US" sz="3000" dirty="0" smtClean="0">
+                <a:solidFill>
+                  <a:srgbClr val="000000"/>
+                </a:solidFill>
+                <a:latin typeface="LeituraSans-Grot 2"/>
+                <a:cs typeface="LeituraSans-Grot 2"/>
+              </a:rPr>
+              <a:t>  Such </a:t>
+            </a:r>
+            <a:r>
+              <a:rPr lang="en-US" sz="3000" dirty="0">
+                <a:solidFill>
+                  <a:srgbClr val="000000"/>
+                </a:solidFill>
+                <a:latin typeface="LeituraSans-Grot 2"/>
+                <a:cs typeface="LeituraSans-Grot 2"/>
+              </a:rPr>
+              <a:t>harnesses are common to random testing, many kinds of model checking, and various machine-learning influenced </a:t>
+            </a:r>
+            <a:r>
+              <a:rPr lang="en-US" sz="3000" dirty="0" smtClean="0">
+                <a:solidFill>
+                  <a:srgbClr val="000000"/>
+                </a:solidFill>
+                <a:latin typeface="LeituraSans-Grot 2"/>
+                <a:cs typeface="LeituraSans-Grot 2"/>
+              </a:rPr>
+              <a:t>approaches to testing. </a:t>
             </a:r>
             <a:endParaRPr lang="en-US" sz="3000" dirty="0" smtClean="0">
               <a:solidFill>
@@ -4542,7 +4659,27 @@
                 <a:latin typeface="LeituraSans-Grot 2"/>
                 <a:cs typeface="LeituraSans-Grot 2"/>
               </a:rPr>
-              <a:t>, these harnesses themselves are complex software artifacts and it is all too easy to spend valuable testing time hunting down bugs in the test harness and not the System Under Test. Harness code is often highly repetitive (choosing between a set of available API calls to make, and assigning values to parameters in those calls, for example) and is almost always tightly coupled to one particular test generation method</a:t>
+              <a:t>, these harnesses themselves are complex software artifacts and it is all too easy to spend valuable testing time hunting down bugs in the test harness and not the System Under Test. </a:t>
+            </a:r>
+            <a:r>
+              <a:rPr lang="en-US" sz="3000" dirty="0" smtClean="0">
+                <a:solidFill>
+                  <a:srgbClr val="000000"/>
+                </a:solidFill>
+                <a:latin typeface="LeituraSans-Grot 2"/>
+                <a:cs typeface="LeituraSans-Grot 2"/>
+              </a:rPr>
+              <a:t> Harness </a:t>
+            </a:r>
+            <a:r>
+              <a:rPr lang="en-US" sz="3000" dirty="0">
+                <a:solidFill>
+                  <a:srgbClr val="000000"/>
+                </a:solidFill>
+                <a:latin typeface="LeituraSans-Grot 2"/>
+                <a:cs typeface="LeituraSans-Grot 2"/>
+              </a:rPr>
+              <a:t>code is often highly repetitive (choosing between a set of available API calls to make, and assigning values to parameters in those calls, for example) and is almost always tightly coupled to one particular test generation method</a:t>
             </a:r>
             <a:r>
               <a:rPr lang="en-US" sz="3000" dirty="0" smtClean="0">
@@ -4579,7 +4716,27 @@
                 <a:latin typeface="LeituraSans-Grot 3"/>
                 <a:cs typeface="LeituraSans-Grot 3"/>
               </a:rPr>
-              <a:t>Solving the problem: TSTL</a:t>
+              <a:t>Solving </a:t>
+            </a:r>
+            <a:r>
+              <a:rPr lang="en-US" sz="5400" dirty="0" smtClean="0">
+                <a:solidFill>
+                  <a:srgbClr val="000000"/>
+                </a:solidFill>
+                <a:latin typeface="LeituraSans-Grot 3"/>
+                <a:cs typeface="LeituraSans-Grot 3"/>
+              </a:rPr>
+              <a:t>the Problem: </a:t>
+            </a:r>
+            <a:r>
+              <a:rPr lang="en-US" sz="5400" dirty="0" smtClean="0">
+                <a:solidFill>
+                  <a:srgbClr val="000000"/>
+                </a:solidFill>
+                <a:latin typeface="LeituraSans-Grot 3"/>
+                <a:cs typeface="LeituraSans-Grot 3"/>
+              </a:rPr>
+              <a:t>TSTL</a:t>
             </a:r>
           </a:p>
           <a:p>
@@ -4604,7 +4761,47 @@
                 <a:latin typeface="LeituraSans-Grot 2"/>
                 <a:cs typeface="LeituraSans-Grot 2"/>
               </a:rPr>
-              <a:t>language written in Python, embedding Python, intended to make these testing difficulties less onerous and decouple testing technology from the System Under Test. This will enable reuse of advanced testing techniques and tools without rewriting test </a:t>
+              <a:t>language written in Python, embedding Python, intended to </a:t>
+            </a:r>
+            <a:r>
+              <a:rPr lang="en-US" sz="3000" dirty="0" smtClean="0">
+                <a:solidFill>
+                  <a:srgbClr val="000000"/>
+                </a:solidFill>
+                <a:latin typeface="LeituraSans-Grot 2"/>
+                <a:cs typeface="LeituraSans-Grot 2"/>
+              </a:rPr>
+              <a:t>ease harness construction and </a:t>
+            </a:r>
+            <a:r>
+              <a:rPr lang="en-US" sz="3000" dirty="0">
+                <a:solidFill>
+                  <a:srgbClr val="000000"/>
+                </a:solidFill>
+                <a:latin typeface="LeituraSans-Grot 2"/>
+                <a:cs typeface="LeituraSans-Grot 2"/>
+              </a:rPr>
+              <a:t>decouple testing technology from the System Under Test. </a:t>
+            </a:r>
+            <a:r>
+              <a:rPr lang="en-US" sz="3000" dirty="0" smtClean="0">
+                <a:solidFill>
+                  <a:srgbClr val="000000"/>
+                </a:solidFill>
+                <a:latin typeface="LeituraSans-Grot 2"/>
+                <a:cs typeface="LeituraSans-Grot 2"/>
+              </a:rPr>
+              <a:t>TSTL enables </a:t>
+            </a:r>
+            <a:r>
+              <a:rPr lang="en-US" sz="3000" dirty="0">
+                <a:solidFill>
+                  <a:srgbClr val="000000"/>
+                </a:solidFill>
+                <a:latin typeface="LeituraSans-Grot 2"/>
+                <a:cs typeface="LeituraSans-Grot 2"/>
+              </a:rPr>
+              <a:t>reuse of advanced testing techniques and tools without rewriting test </a:t>
             </a:r>
             <a:r>
               <a:rPr lang="en-US" sz="3000" dirty="0" smtClean="0">
@@ -4647,17 +4844,7 @@
                 <a:latin typeface="LeituraSans-Grot 2"/>
                 <a:cs typeface="LeituraSans-Grot 2"/>
               </a:rPr>
-              <a:t>System Under Test (</a:t>
-            </a:r>
-            <a:r>
-              <a:rPr lang="en-US" sz="3000" b="1" dirty="0" smtClean="0">
-                <a:solidFill>
-                  <a:srgbClr val="000000"/>
-                </a:solidFill>
-                <a:latin typeface="LeituraSans-Grot 2"/>
-                <a:cs typeface="LeituraSans-Grot 2"/>
-              </a:rPr>
-              <a:t>Declarative): </a:t>
+              <a:t>System Under Test (Declarative): </a:t>
             </a:r>
             <a:r>
               <a:rPr lang="en-US" sz="3000" dirty="0" smtClean="0">
@@ -4707,37 +4894,7 @@
                 <a:latin typeface="LeituraSans-Grot 2"/>
                 <a:cs typeface="LeituraSans-Grot 2"/>
               </a:rPr>
-              <a:t>, with few lines of code </a:t>
-            </a:r>
-            <a:r>
-              <a:rPr lang="en-US" sz="3000" dirty="0">
-                <a:solidFill>
-                  <a:srgbClr val="000000"/>
-                </a:solidFill>
-                <a:latin typeface="LeituraSans-Grot 2"/>
-                <a:cs typeface="LeituraSans-Grot 2"/>
-              </a:rPr>
-              <a:t>in files with a .</a:t>
-            </a:r>
-            <a:r>
-              <a:rPr lang="en-US" sz="3000" dirty="0" err="1">
-                <a:solidFill>
-                  <a:srgbClr val="000000"/>
-                </a:solidFill>
-                <a:latin typeface="LeituraSans-Grot 2"/>
-                <a:cs typeface="LeituraSans-Grot 2"/>
-              </a:rPr>
-              <a:t>tstl</a:t>
-            </a:r>
-            <a:r>
-              <a:rPr lang="en-US" sz="3000" dirty="0">
-                <a:solidFill>
-                  <a:srgbClr val="000000"/>
-                </a:solidFill>
-                <a:latin typeface="LeituraSans-Grot 2"/>
-                <a:cs typeface="LeituraSans-Grot 2"/>
-              </a:rPr>
-              <a:t> </a:t>
+              <a:t>, with few lines </a:t>
             </a:r>
             <a:r>
               <a:rPr lang="en-US" sz="3000" dirty="0" smtClean="0">
@@ -4747,41 +4904,20 @@
                 <a:latin typeface="LeituraSans-Grot 2"/>
                 <a:cs typeface="LeituraSans-Grot 2"/>
               </a:rPr>
-              <a:t>extension</a:t>
-            </a:r>
-            <a:r>
-              <a:rPr lang="en-US" sz="3000" dirty="0" smtClean="0">
-                <a:solidFill>
-                  <a:srgbClr val="000000"/>
-                </a:solidFill>
-                <a:latin typeface="LeituraSans-Grot 2"/>
-                <a:cs typeface="LeituraSans-Grot 2"/>
-              </a:rPr>
-              <a:t>, </a:t>
-            </a:r>
-            <a:r>
-              <a:rPr lang="en-US" sz="3000" dirty="0" err="1" smtClean="0">
-                <a:solidFill>
-                  <a:srgbClr val="000000"/>
-                </a:solidFill>
-                <a:latin typeface="LeituraSans-Grot 2"/>
-                <a:cs typeface="LeituraSans-Grot 2"/>
-              </a:rPr>
-              <a:t>a.k.a</a:t>
-            </a:r>
-            <a:r>
-              <a:rPr lang="en-US" sz="3000" dirty="0" smtClean="0">
-                <a:solidFill>
-                  <a:srgbClr val="000000"/>
-                </a:solidFill>
-                <a:latin typeface="LeituraSans-Grot 2"/>
-                <a:cs typeface="LeituraSans-Grot 2"/>
-              </a:rPr>
-              <a:t> ACT files.</a:t>
-            </a:r>
-          </a:p>
-          <a:p>
-            <a:pPr>
+              <a:t>of code, mostly in Python itself</a:t>
+            </a:r>
+            <a:endParaRPr lang="en-US" sz="3000" dirty="0">
+              <a:solidFill>
+                <a:srgbClr val="000000"/>
+              </a:solidFill>
+              <a:latin typeface="LeituraSans-Grot 2"/>
+              <a:cs typeface="LeituraSans-Grot 2"/>
+            </a:endParaRPr>
+          </a:p>
+          <a:p>
+            <a:pPr marL="571500" indent="-571500">
+              <a:buFont typeface="Arial"/>
+              <a:buChar char="•"/>
               <a:defRPr/>
             </a:pPr>
             <a:endParaRPr lang="en-US" sz="3000" dirty="0" smtClean="0">
@@ -4816,20 +4952,20 @@
                 <a:latin typeface="LeituraSans-Grot 2"/>
                 <a:cs typeface="LeituraSans-Grot 2"/>
               </a:rPr>
-              <a:t>: Complies </a:t>
-            </a:r>
-            <a:r>
-              <a:rPr lang="en-US" sz="3000" dirty="0">
-                <a:solidFill>
-                  <a:srgbClr val="000000"/>
-                </a:solidFill>
-                <a:latin typeface="LeituraSans-Grot 2"/>
-                <a:cs typeface="LeituraSans-Grot 2"/>
-              </a:rPr>
-              <a:t>this .</a:t>
-            </a:r>
-            <a:r>
-              <a:rPr lang="en-US" sz="3000" dirty="0" err="1">
+              <a:t>: </a:t>
+            </a:r>
+            <a:r>
+              <a:rPr lang="en-US" sz="3000" dirty="0" smtClean="0">
+                <a:solidFill>
+                  <a:srgbClr val="000000"/>
+                </a:solidFill>
+                <a:latin typeface="LeituraSans-Grot 2"/>
+                <a:cs typeface="LeituraSans-Grot 2"/>
+              </a:rPr>
+              <a:t> The compiler takes a .</a:t>
+            </a:r>
+            <a:r>
+              <a:rPr lang="en-US" sz="3000" dirty="0" err="1" smtClean="0">
                 <a:solidFill>
                   <a:srgbClr val="000000"/>
                 </a:solidFill>
@@ -4839,16 +4975,6 @@
               <a:t>tstl</a:t>
             </a:r>
             <a:r>
-              <a:rPr lang="en-US" sz="3000" dirty="0">
-                <a:solidFill>
-                  <a:srgbClr val="000000"/>
-                </a:solidFill>
-                <a:latin typeface="LeituraSans-Grot 2"/>
-                <a:cs typeface="LeituraSans-Grot 2"/>
-              </a:rPr>
-              <a:t> file and generates a </a:t>
-            </a:r>
-            <a:r>
               <a:rPr lang="en-US" sz="3000" dirty="0" smtClean="0">
                 <a:solidFill>
                   <a:srgbClr val="000000"/>
@@ -4856,117 +4982,15 @@
                 <a:latin typeface="LeituraSans-Grot 2"/>
                 <a:cs typeface="LeituraSans-Grot 2"/>
               </a:rPr>
-              <a:t>python harness (there is java version too) </a:t>
-            </a:r>
-            <a:r>
-              <a:rPr lang="en-US" sz="3000" dirty="0">
-                <a:solidFill>
-                  <a:srgbClr val="000000"/>
-                </a:solidFill>
-                <a:latin typeface="LeituraSans-Grot 2"/>
-                <a:cs typeface="LeituraSans-Grot 2"/>
-              </a:rPr>
-              <a:t>in the </a:t>
-            </a:r>
-            <a:r>
-              <a:rPr lang="en-US" sz="3000" dirty="0" err="1">
-                <a:solidFill>
-                  <a:srgbClr val="000000"/>
-                </a:solidFill>
-                <a:latin typeface="LeituraSans-Grot 2"/>
-                <a:cs typeface="LeituraSans-Grot 2"/>
-              </a:rPr>
-              <a:t>sut.py</a:t>
-            </a:r>
-            <a:r>
-              <a:rPr lang="en-US" sz="3000" dirty="0">
-                <a:solidFill>
-                  <a:srgbClr val="000000"/>
-                </a:solidFill>
-                <a:latin typeface="LeituraSans-Grot 2"/>
-                <a:cs typeface="LeituraSans-Grot 2"/>
-              </a:rPr>
-              <a:t> </a:t>
-            </a:r>
-            <a:r>
-              <a:rPr lang="en-US" sz="3000" dirty="0" smtClean="0">
-                <a:solidFill>
-                  <a:srgbClr val="000000"/>
-                </a:solidFill>
-                <a:latin typeface="LeituraSans-Grot 2"/>
-                <a:cs typeface="LeituraSans-Grot 2"/>
-              </a:rPr>
-              <a:t>file. Essentially transforms set </a:t>
-            </a:r>
-            <a:r>
-              <a:rPr lang="en-US" sz="3000" dirty="0">
-                <a:solidFill>
-                  <a:srgbClr val="000000"/>
-                </a:solidFill>
-                <a:latin typeface="LeituraSans-Grot 2"/>
-                <a:cs typeface="LeituraSans-Grot 2"/>
-              </a:rPr>
-              <a:t>of valid </a:t>
-            </a:r>
-            <a:r>
-              <a:rPr lang="en-US" sz="3000" dirty="0" smtClean="0">
-                <a:solidFill>
-                  <a:srgbClr val="000000"/>
-                </a:solidFill>
-                <a:latin typeface="LeituraSans-Grot 2"/>
-                <a:cs typeface="LeituraSans-Grot 2"/>
-              </a:rPr>
-              <a:t>tests/properties/input pools defined in &lt;system&gt;.</a:t>
-            </a:r>
-            <a:r>
-              <a:rPr lang="en-US" sz="3000" dirty="0" err="1" smtClean="0">
-                <a:solidFill>
-                  <a:srgbClr val="000000"/>
-                </a:solidFill>
-                <a:latin typeface="LeituraSans-Grot 2"/>
-                <a:cs typeface="LeituraSans-Grot 2"/>
-              </a:rPr>
-              <a:t>tstl</a:t>
-            </a:r>
-            <a:r>
-              <a:rPr lang="en-US" sz="3000" dirty="0" smtClean="0">
-                <a:solidFill>
-                  <a:srgbClr val="000000"/>
-                </a:solidFill>
-                <a:latin typeface="LeituraSans-Grot 2"/>
-                <a:cs typeface="LeituraSans-Grot 2"/>
-              </a:rPr>
-              <a:t> file </a:t>
-            </a:r>
-            <a:r>
-              <a:rPr lang="en-US" sz="3000" dirty="0">
-                <a:solidFill>
-                  <a:srgbClr val="000000"/>
-                </a:solidFill>
-                <a:latin typeface="LeituraSans-Grot 2"/>
-                <a:cs typeface="LeituraSans-Grot 2"/>
-              </a:rPr>
-              <a:t>into a graph to explore by choosing valid actions</a:t>
-            </a:r>
-            <a:r>
-              <a:rPr lang="en-US" sz="3000" dirty="0" smtClean="0">
-                <a:solidFill>
-                  <a:srgbClr val="000000"/>
-                </a:solidFill>
-                <a:latin typeface="LeituraSans-Grot 2"/>
-                <a:cs typeface="LeituraSans-Grot 2"/>
-              </a:rPr>
-              <a:t>.</a:t>
-            </a:r>
-            <a:br>
-              <a:rPr lang="en-US" sz="3000" dirty="0" smtClean="0">
-                <a:solidFill>
-                  <a:srgbClr val="000000"/>
-                </a:solidFill>
-                <a:latin typeface="LeituraSans-Grot 2"/>
-                <a:cs typeface="LeituraSans-Grot 2"/>
-              </a:rPr>
-            </a:br>
+              <a:t> files and produces a class that is a standalone interface to the System Under Test, defining its valid tests</a:t>
+            </a:r>
+          </a:p>
+          <a:p>
+            <a:pPr marL="571500" indent="-571500">
+              <a:buFont typeface="Arial"/>
+              <a:buChar char="•"/>
+              <a:defRPr/>
+            </a:pPr>
             <a:endParaRPr lang="en-US" sz="3000" dirty="0" smtClean="0">
               <a:solidFill>
                 <a:srgbClr val="000000"/>
@@ -5029,7 +5053,7 @@
                 <a:latin typeface="LeituraSans-Grot 2"/>
                 <a:cs typeface="LeituraSans-Grot 2"/>
               </a:rPr>
-              <a:t>file is a TSTL-generated Python interface for testing that can be tested by any Python test generator that uses its interface to choose actions, restart tests, and check properties</a:t>
+              <a:t>file is a TSTL-generated Python interface for testing that can be tested by any Python test generator that uses </a:t>
             </a:r>
             <a:r>
               <a:rPr lang="en-US" sz="3000" dirty="0" smtClean="0">
@@ -5039,9 +5063,19 @@
                 <a:latin typeface="LeituraSans-Grot 2"/>
                 <a:cs typeface="LeituraSans-Grot 2"/>
               </a:rPr>
-              <a:t>.</a:t>
-            </a:r>
-            <a:br>
+              <a:t>the well-defined TSTL interface; </a:t>
+            </a:r>
+            <a:r>
+              <a:rPr lang="en-US" sz="3000" dirty="0" err="1" smtClean="0">
+                <a:solidFill>
+                  <a:srgbClr val="000000"/>
+                </a:solidFill>
+                <a:latin typeface="LeituraSans-Grot 2"/>
+                <a:cs typeface="LeituraSans-Grot 2"/>
+              </a:rPr>
+              <a:t>sut.py</a:t>
+            </a:r>
+            <a:r>
               <a:rPr lang="en-US" sz="3000" dirty="0" smtClean="0">
                 <a:solidFill>
                   <a:srgbClr val="000000"/>
@@ -5049,7 +5083,15 @@
                 <a:latin typeface="LeituraSans-Grot 2"/>
                 <a:cs typeface="LeituraSans-Grot 2"/>
               </a:rPr>
-            </a:br>
+              <a:t> automatically supports common testing activities, such as replaying regression tests, checking code coverage, and collecting logging information</a:t>
+            </a:r>
+          </a:p>
+          <a:p>
+            <a:pPr marL="571500" indent="-571500">
+              <a:buFont typeface="Arial"/>
+              <a:buChar char="•"/>
+              <a:defRPr/>
+            </a:pPr>
             <a:endParaRPr lang="en-US" sz="3000" dirty="0" smtClean="0">
               <a:solidFill>
                 <a:srgbClr val="000000"/>
@@ -5102,8 +5144,86 @@
                 <a:latin typeface="LeituraSans-Grot 2"/>
                 <a:cs typeface="LeituraSans-Grot 2"/>
               </a:rPr>
-              <a:t>. Generators distributed with TSTL include a heavily-developed random testing tool, and simple BFS and DFS based explicit-state model checkers.</a:t>
-            </a:r>
+              <a:t>. Generators distributed with TSTL include a </a:t>
+            </a:r>
+            <a:r>
+              <a:rPr lang="en-US" sz="3000" dirty="0" smtClean="0">
+                <a:solidFill>
+                  <a:srgbClr val="000000"/>
+                </a:solidFill>
+                <a:latin typeface="LeituraSans-Grot 2"/>
+                <a:cs typeface="LeituraSans-Grot 2"/>
+              </a:rPr>
+              <a:t>powerful random </a:t>
+            </a:r>
+            <a:r>
+              <a:rPr lang="en-US" sz="3000" dirty="0">
+                <a:solidFill>
+                  <a:srgbClr val="000000"/>
+                </a:solidFill>
+                <a:latin typeface="LeituraSans-Grot 2"/>
+                <a:cs typeface="LeituraSans-Grot 2"/>
+              </a:rPr>
+              <a:t>testing </a:t>
+            </a:r>
+            <a:r>
+              <a:rPr lang="en-US" sz="3000" dirty="0" smtClean="0">
+                <a:solidFill>
+                  <a:srgbClr val="000000"/>
+                </a:solidFill>
+                <a:latin typeface="LeituraSans-Grot 2"/>
+                <a:cs typeface="LeituraSans-Grot 2"/>
+              </a:rPr>
+              <a:t>tool, incorporating state-of-the-art research methods for better testing and automated debugging</a:t>
+            </a:r>
+          </a:p>
+          <a:p>
+            <a:pPr marL="571500" indent="-571500">
+              <a:buFont typeface="Arial"/>
+              <a:buChar char="•"/>
+              <a:defRPr/>
+            </a:pPr>
+            <a:endParaRPr lang="en-US" sz="3000" dirty="0">
+              <a:solidFill>
+                <a:srgbClr val="000000"/>
+              </a:solidFill>
+              <a:latin typeface="LeituraSans-Grot 2"/>
+              <a:cs typeface="LeituraSans-Grot 2"/>
+            </a:endParaRPr>
+          </a:p>
+          <a:p>
+            <a:pPr marL="571500" indent="-571500">
+              <a:buFont typeface="Arial"/>
+              <a:buChar char="•"/>
+              <a:defRPr/>
+            </a:pPr>
+            <a:r>
+              <a:rPr lang="en-US" sz="3000" b="1" dirty="0" smtClean="0">
+                <a:solidFill>
+                  <a:srgbClr val="000000"/>
+                </a:solidFill>
+                <a:latin typeface="LeituraSans-Grot 2"/>
+                <a:cs typeface="LeituraSans-Grot 2"/>
+              </a:rPr>
+              <a:t>Utilities</a:t>
+            </a:r>
+            <a:r>
+              <a:rPr lang="en-US" sz="3000" dirty="0" smtClean="0">
+                <a:solidFill>
+                  <a:srgbClr val="000000"/>
+                </a:solidFill>
+                <a:latin typeface="LeituraSans-Grot 2"/>
+                <a:cs typeface="LeituraSans-Grot 2"/>
+              </a:rPr>
+              <a:t> are tools for producing graphs of the behavior of a tested system (see right), standalone test cases that do not depend on TSTL, etc.</a:t>
+            </a:r>
+            <a:endParaRPr lang="en-US" sz="3000" b="1" dirty="0">
+              <a:solidFill>
+                <a:srgbClr val="000000"/>
+              </a:solidFill>
+              <a:latin typeface="LeituraSans-Grot 2"/>
+              <a:cs typeface="LeituraSans-Grot 2"/>
+            </a:endParaRPr>
           </a:p>
           <a:p>
             <a:pPr marL="571500" indent="-571500">
@@ -5130,7 +5250,7 @@
         <p:spPr>
           <a:xfrm>
             <a:off x="21793200" y="18745200"/>
-            <a:ext cx="9975850" cy="4770537"/>
+            <a:ext cx="9975850" cy="5509200"/>
           </a:xfrm>
           <a:prstGeom prst="rect">
             <a:avLst/>
@@ -5178,17 +5298,17 @@
                 <a:latin typeface="LeituraSans-Grot 2"/>
                 <a:cs typeface="LeituraSans-Grot 2"/>
               </a:rPr>
-              <a:t>TSTL Keywords: pool, </a:t>
-            </a:r>
-            <a:r>
-              <a:rPr lang="en-US" sz="2400" dirty="0" err="1" smtClean="0">
-                <a:solidFill>
-                  <a:srgbClr val="000000"/>
-                </a:solidFill>
-                <a:latin typeface="LeituraSans-Grot 2"/>
-                <a:cs typeface="LeituraSans-Grot 2"/>
-              </a:rPr>
-              <a:t>init</a:t>
+              <a:t>Test consists of actions that assign values to </a:t>
+            </a:r>
+            <a:r>
+              <a:rPr lang="en-US" sz="2400" i="1" dirty="0" smtClean="0">
+                <a:solidFill>
+                  <a:srgbClr val="000000"/>
+                </a:solidFill>
+                <a:latin typeface="LeituraSans-Grot 2"/>
+                <a:cs typeface="LeituraSans-Grot 2"/>
+              </a:rPr>
+              <a:t>pools</a:t>
             </a:r>
             <a:r>
               <a:rPr lang="en-US" sz="2400" dirty="0" smtClean="0">
@@ -5198,7 +5318,7 @@
                 <a:latin typeface="LeituraSans-Grot 2"/>
                 <a:cs typeface="LeituraSans-Grot 2"/>
               </a:rPr>
-              <a:t>, log</a:t>
+              <a:t> of values</a:t>
             </a:r>
           </a:p>
           <a:p>
@@ -5215,7 +5335,7 @@
                 <a:latin typeface="LeituraSans-Grot 2"/>
                 <a:cs typeface="LeituraSans-Grot 2"/>
               </a:rPr>
-              <a:t>Literal Code: Raw/embedded Python code.</a:t>
+              <a:t>Actions defined by writing Python code</a:t>
             </a:r>
           </a:p>
           <a:p>
@@ -5232,7 +5352,7 @@
                 <a:latin typeface="LeituraSans-Grot 2"/>
                 <a:cs typeface="LeituraSans-Grot 2"/>
               </a:rPr>
-              <a:t>Pool Variable: Used to define value pools. A pool variable can take a range of values.</a:t>
+              <a:t>TSTL automatically produces valid test sequences</a:t>
             </a:r>
           </a:p>
           <a:p>
@@ -5241,53 +5361,6 @@
               <a:buChar char="•"/>
               <a:defRPr/>
             </a:pPr>
-            <a:r>
-              <a:rPr lang="en-US" sz="2400" dirty="0" smtClean="0">
-                <a:solidFill>
-                  <a:srgbClr val="000000"/>
-                </a:solidFill>
-                <a:latin typeface="LeituraSans-Grot 2"/>
-                <a:cs typeface="LeituraSans-Grot 2"/>
-              </a:rPr>
-              <a:t>Pool Variable with a REF: Used for differential testing.</a:t>
-            </a:r>
-          </a:p>
-          <a:p>
-            <a:pPr marL="571500" indent="-571500">
-              <a:buFont typeface="Arial"/>
-              <a:buChar char="•"/>
-              <a:defRPr/>
-            </a:pPr>
-            <a:r>
-              <a:rPr lang="en-US" sz="2400" dirty="0" smtClean="0">
-                <a:solidFill>
-                  <a:srgbClr val="000000"/>
-                </a:solidFill>
-                <a:latin typeface="LeituraSans-Grot 2"/>
-                <a:cs typeface="LeituraSans-Grot 2"/>
-              </a:rPr>
-              <a:t>Action Line: Any line where an action is performed. Usually the ones with assignment :=</a:t>
-            </a:r>
-            <a:r>
-              <a:rPr lang="en-US" sz="2400" dirty="0">
-                <a:solidFill>
-                  <a:srgbClr val="000000"/>
-                </a:solidFill>
-                <a:latin typeface="LeituraSans-Grot 2"/>
-                <a:cs typeface="LeituraSans-Grot 2"/>
-              </a:rPr>
-              <a:t> </a:t>
-            </a:r>
-            <a:r>
-              <a:rPr lang="en-US" sz="2400" dirty="0" smtClean="0">
-                <a:solidFill>
-                  <a:srgbClr val="000000"/>
-                </a:solidFill>
-                <a:latin typeface="LeituraSans-Grot 2"/>
-                <a:cs typeface="LeituraSans-Grot 2"/>
-              </a:rPr>
-              <a:t>or ones where a method of the API is called without assignment.</a:t>
-            </a:r>
             <a:endParaRPr lang="en-US" sz="2400" dirty="0">
               <a:solidFill>
                 <a:srgbClr val="000000"/>
@@ -5330,7 +5403,7 @@
                 <a:latin typeface="LeituraSans-Grot 2"/>
                 <a:cs typeface="LeituraSans-Grot 2"/>
               </a:rPr>
-              <a:t> to show resulting coverage from running a test generator or model checker on the complied SUT</a:t>
+              <a:t> to collect/use code coverage</a:t>
             </a:r>
           </a:p>
           <a:p>
@@ -5340,16 +5413,6 @@
               <a:defRPr/>
             </a:pPr>
             <a:r>
-              <a:rPr lang="en-US" sz="2400" dirty="0">
-                <a:solidFill>
-                  <a:srgbClr val="000000"/>
-                </a:solidFill>
-                <a:latin typeface="LeituraSans-Grot 2"/>
-                <a:cs typeface="LeituraSans-Grot 2"/>
-              </a:rPr>
-              <a:t>T</a:t>
-            </a:r>
-            <a:r>
               <a:rPr lang="en-US" sz="2400" dirty="0" smtClean="0">
                 <a:solidFill>
                   <a:srgbClr val="000000"/>
@@ -5357,8 +5420,107 @@
                 <a:latin typeface="LeituraSans-Grot 2"/>
                 <a:cs typeface="LeituraSans-Grot 2"/>
               </a:rPr>
-              <a:t>ool to generate visual graph of possible action sequence(s).</a:t>
-            </a:r>
+              <a:t>Automatic reduction of test cases</a:t>
+            </a:r>
+          </a:p>
+          <a:p>
+            <a:pPr marL="571500" indent="-571500">
+              <a:buFont typeface="Arial"/>
+              <a:buChar char="•"/>
+              <a:defRPr/>
+            </a:pPr>
+            <a:r>
+              <a:rPr lang="en-US" sz="2400" dirty="0" smtClean="0">
+                <a:solidFill>
+                  <a:srgbClr val="000000"/>
+                </a:solidFill>
+                <a:latin typeface="LeituraSans-Grot 2"/>
+                <a:cs typeface="LeituraSans-Grot 2"/>
+              </a:rPr>
+              <a:t>Automatic coverage-based fault localization</a:t>
+            </a:r>
+          </a:p>
+          <a:p>
+            <a:pPr marL="571500" indent="-571500">
+              <a:buFont typeface="Arial"/>
+              <a:buChar char="•"/>
+              <a:defRPr/>
+            </a:pPr>
+            <a:r>
+              <a:rPr lang="en-US" sz="2400" dirty="0" smtClean="0">
+                <a:solidFill>
+                  <a:srgbClr val="000000"/>
+                </a:solidFill>
+                <a:latin typeface="LeituraSans-Grot 2"/>
+                <a:cs typeface="LeituraSans-Grot 2"/>
+              </a:rPr>
+              <a:t>Automatic test normalization to help deal with large numbers of similar failing tests</a:t>
+            </a:r>
+          </a:p>
+          <a:p>
+            <a:pPr marL="571500" indent="-571500">
+              <a:buFont typeface="Arial"/>
+              <a:buChar char="•"/>
+              <a:defRPr/>
+            </a:pPr>
+            <a:endParaRPr lang="en-US" sz="2400" dirty="0">
+              <a:solidFill>
+                <a:srgbClr val="000000"/>
+              </a:solidFill>
+              <a:latin typeface="LeituraSans-Grot 2"/>
+              <a:cs typeface="LeituraSans-Grot 2"/>
+            </a:endParaRPr>
+          </a:p>
+          <a:p>
+            <a:pPr marL="571500" indent="-571500">
+              <a:buFont typeface="Arial"/>
+              <a:buChar char="•"/>
+              <a:defRPr/>
+            </a:pPr>
+            <a:r>
+              <a:rPr lang="en-US" sz="2400" dirty="0" smtClean="0">
+                <a:solidFill>
+                  <a:srgbClr val="000000"/>
+                </a:solidFill>
+                <a:latin typeface="LeituraSans-Grot 2"/>
+                <a:cs typeface="LeituraSans-Grot 2"/>
+              </a:rPr>
+              <a:t>Allows the ideas of </a:t>
+            </a:r>
+            <a:r>
+              <a:rPr lang="en-US" sz="2400" dirty="0" err="1" smtClean="0">
+                <a:solidFill>
+                  <a:srgbClr val="000000"/>
+                </a:solidFill>
+                <a:latin typeface="LeituraSans-Grot 2"/>
+                <a:cs typeface="LeituraSans-Grot 2"/>
+              </a:rPr>
+              <a:t>QuickCheck</a:t>
+            </a:r>
+            <a:r>
+              <a:rPr lang="en-US" sz="2400" dirty="0" smtClean="0">
+                <a:solidFill>
+                  <a:srgbClr val="000000"/>
+                </a:solidFill>
+                <a:latin typeface="LeituraSans-Grot 2"/>
+                <a:cs typeface="LeituraSans-Grot 2"/>
+              </a:rPr>
+              <a:t>/Hypothesis to be applied in a state-based, API-call-centered domain</a:t>
+            </a:r>
+          </a:p>
+          <a:p>
+            <a:pPr marL="571500" indent="-571500">
+              <a:buFont typeface="Arial"/>
+              <a:buChar char="•"/>
+              <a:defRPr/>
+            </a:pPr>
+            <a:endParaRPr lang="en-US" sz="2400" dirty="0" smtClean="0">
+              <a:solidFill>
+                <a:srgbClr val="000000"/>
+              </a:solidFill>
+              <a:latin typeface="LeituraSans-Grot 2"/>
+              <a:cs typeface="LeituraSans-Grot 2"/>
+            </a:endParaRPr>
           </a:p>
         </p:txBody>
       </p:sp>
@@ -5524,10 +5686,10 @@
                 <a:latin typeface="LeituraSans-Grot 2" charset="0"/>
                 <a:cs typeface="LeituraSans-Grot 2" charset="0"/>
               </a:rPr>
-              <a:t>Example: (</a:t>
-            </a:r>
-            <a:r>
-              <a:rPr lang="en-US" sz="2400" dirty="0" err="1" smtClean="0">
+              <a:t>Example: </a:t>
+            </a:r>
+            <a:r>
+              <a:rPr lang="en-US" sz="2400" b="1" dirty="0" err="1" smtClean="0">
                 <a:solidFill>
                   <a:schemeClr val="bg2"/>
                 </a:solidFill>
@@ -5537,24 +5699,24 @@
               <a:t>stack.tstl</a:t>
             </a:r>
             <a:r>
-              <a:rPr lang="en-US" sz="2400" dirty="0" smtClean="0">
+              <a:rPr lang="en-US" sz="2400" dirty="0">
                 <a:solidFill>
                   <a:schemeClr val="bg2"/>
                 </a:solidFill>
                 <a:latin typeface="LeituraSans-Grot 2" charset="0"/>
                 <a:cs typeface="LeituraSans-Grot 2" charset="0"/>
               </a:rPr>
-              <a:t>) Declarative TSTL script for testing a stack implementation which can be used with a test generator to generate automated tests for stack API. Stack API contains: __</a:t>
-            </a:r>
-            <a:r>
-              <a:rPr lang="en-US" sz="2400" dirty="0" err="1" smtClean="0">
+              <a:t> </a:t>
+            </a:r>
+            <a:r>
+              <a:rPr lang="en-US" sz="2400" dirty="0" smtClean="0">
                 <a:solidFill>
                   <a:schemeClr val="bg2"/>
                 </a:solidFill>
                 <a:latin typeface="LeituraSans-Grot 2" charset="0"/>
                 <a:cs typeface="LeituraSans-Grot 2" charset="0"/>
               </a:rPr>
-              <a:t>init</a:t>
+              <a:t>--</a:t>
             </a:r>
             <a:r>
               <a:rPr lang="en-US" sz="2400" dirty="0" smtClean="0">
@@ -5564,17 +5726,17 @@
                 <a:latin typeface="LeituraSans-Grot 2" charset="0"/>
                 <a:cs typeface="LeituraSans-Grot 2" charset="0"/>
               </a:rPr>
-              <a:t>__, __</a:t>
-            </a:r>
-            <a:r>
-              <a:rPr lang="en-US" sz="2400" dirty="0" err="1" smtClean="0">
+              <a:t> </a:t>
+            </a:r>
+            <a:r>
+              <a:rPr lang="en-US" sz="2400" dirty="0">
                 <a:solidFill>
                   <a:schemeClr val="bg2"/>
                 </a:solidFill>
                 <a:latin typeface="LeituraSans-Grot 2" charset="0"/>
                 <a:cs typeface="LeituraSans-Grot 2" charset="0"/>
               </a:rPr>
-              <a:t>str</a:t>
+              <a:t>d</a:t>
             </a:r>
             <a:r>
               <a:rPr lang="en-US" sz="2400" dirty="0" smtClean="0">
@@ -5584,17 +5746,17 @@
                 <a:latin typeface="LeituraSans-Grot 2" charset="0"/>
                 <a:cs typeface="LeituraSans-Grot 2" charset="0"/>
               </a:rPr>
-              <a:t>__, push, pop, peek, </a:t>
-            </a:r>
-            <a:r>
-              <a:rPr lang="en-US" sz="2400" dirty="0" err="1" smtClean="0">
+              <a:t>eclarative </a:t>
+            </a:r>
+            <a:r>
+              <a:rPr lang="en-US" sz="2400" dirty="0" smtClean="0">
                 <a:solidFill>
                   <a:schemeClr val="bg2"/>
                 </a:solidFill>
                 <a:latin typeface="LeituraSans-Grot 2" charset="0"/>
                 <a:cs typeface="LeituraSans-Grot 2" charset="0"/>
               </a:rPr>
-              <a:t>etc</a:t>
+              <a:t>TSTL script for testing a stack </a:t>
             </a:r>
             <a:r>
               <a:rPr lang="en-US" sz="2400" dirty="0" smtClean="0">
@@ -5604,7 +5766,117 @@
                 <a:latin typeface="LeituraSans-Grot 2" charset="0"/>
                 <a:cs typeface="LeituraSans-Grot 2" charset="0"/>
               </a:rPr>
-              <a:t> methods and size property.</a:t>
+              <a:t>implementation; </a:t>
+            </a:r>
+            <a:r>
+              <a:rPr lang="en-US" sz="2400" dirty="0" smtClean="0">
+                <a:solidFill>
+                  <a:schemeClr val="bg2"/>
+                </a:solidFill>
+                <a:latin typeface="LeituraSans-Grot 2" charset="0"/>
+                <a:cs typeface="LeituraSans-Grot 2" charset="0"/>
+              </a:rPr>
+              <a:t>can be used with a test generator to generate automated tests </a:t>
+            </a:r>
+            <a:r>
+              <a:rPr lang="en-US" sz="2400" dirty="0" smtClean="0">
+                <a:solidFill>
+                  <a:schemeClr val="bg2"/>
+                </a:solidFill>
+                <a:latin typeface="LeituraSans-Grot 2" charset="0"/>
+                <a:cs typeface="LeituraSans-Grot 2" charset="0"/>
+              </a:rPr>
+              <a:t>for </a:t>
+            </a:r>
+            <a:r>
+              <a:rPr lang="en-US" sz="2400" dirty="0" smtClean="0">
+                <a:solidFill>
+                  <a:schemeClr val="bg2"/>
+                </a:solidFill>
+                <a:latin typeface="LeituraSans-Grot 2" charset="0"/>
+                <a:cs typeface="LeituraSans-Grot 2" charset="0"/>
+              </a:rPr>
+              <a:t>stack API. </a:t>
+            </a:r>
+            <a:r>
+              <a:rPr lang="en-US" sz="2400" dirty="0" smtClean="0">
+                <a:solidFill>
+                  <a:schemeClr val="bg2"/>
+                </a:solidFill>
+                <a:latin typeface="LeituraSans-Grot 2" charset="0"/>
+                <a:cs typeface="LeituraSans-Grot 2" charset="0"/>
+              </a:rPr>
+              <a:t> Stack </a:t>
+            </a:r>
+            <a:r>
+              <a:rPr lang="en-US" sz="2400" dirty="0" smtClean="0">
+                <a:solidFill>
+                  <a:schemeClr val="bg2"/>
+                </a:solidFill>
+                <a:latin typeface="LeituraSans-Grot 2" charset="0"/>
+                <a:cs typeface="LeituraSans-Grot 2" charset="0"/>
+              </a:rPr>
+              <a:t>API contains: __</a:t>
+            </a:r>
+            <a:r>
+              <a:rPr lang="en-US" sz="2400" dirty="0" err="1" smtClean="0">
+                <a:solidFill>
+                  <a:schemeClr val="bg2"/>
+                </a:solidFill>
+                <a:latin typeface="LeituraSans-Grot 2" charset="0"/>
+                <a:cs typeface="LeituraSans-Grot 2" charset="0"/>
+              </a:rPr>
+              <a:t>init</a:t>
+            </a:r>
+            <a:r>
+              <a:rPr lang="en-US" sz="2400" dirty="0" smtClean="0">
+                <a:solidFill>
+                  <a:schemeClr val="bg2"/>
+                </a:solidFill>
+                <a:latin typeface="LeituraSans-Grot 2" charset="0"/>
+                <a:cs typeface="LeituraSans-Grot 2" charset="0"/>
+              </a:rPr>
+              <a:t>__, __</a:t>
+            </a:r>
+            <a:r>
+              <a:rPr lang="en-US" sz="2400" dirty="0" err="1" smtClean="0">
+                <a:solidFill>
+                  <a:schemeClr val="bg2"/>
+                </a:solidFill>
+                <a:latin typeface="LeituraSans-Grot 2" charset="0"/>
+                <a:cs typeface="LeituraSans-Grot 2" charset="0"/>
+              </a:rPr>
+              <a:t>str</a:t>
+            </a:r>
+            <a:r>
+              <a:rPr lang="en-US" sz="2400" dirty="0" smtClean="0">
+                <a:solidFill>
+                  <a:schemeClr val="bg2"/>
+                </a:solidFill>
+                <a:latin typeface="LeituraSans-Grot 2" charset="0"/>
+                <a:cs typeface="LeituraSans-Grot 2" charset="0"/>
+              </a:rPr>
+              <a:t>__, push, pop, peek, </a:t>
+            </a:r>
+            <a:r>
+              <a:rPr lang="en-US" sz="2400" dirty="0" smtClean="0">
+                <a:solidFill>
+                  <a:schemeClr val="bg2"/>
+                </a:solidFill>
+                <a:latin typeface="LeituraSans-Grot 2" charset="0"/>
+                <a:cs typeface="LeituraSans-Grot 2" charset="0"/>
+              </a:rPr>
+              <a:t>etc. </a:t>
+            </a:r>
+            <a:r>
+              <a:rPr lang="en-US" sz="2400" dirty="0" smtClean="0">
+                <a:solidFill>
+                  <a:schemeClr val="bg2"/>
+                </a:solidFill>
+                <a:latin typeface="LeituraSans-Grot 2" charset="0"/>
+                <a:cs typeface="LeituraSans-Grot 2" charset="0"/>
+              </a:rPr>
+              <a:t>methods and size property.</a:t>
             </a:r>
             <a:endParaRPr lang="en-US" sz="2400" dirty="0">
               <a:solidFill>
@@ -6104,16 +6376,6 @@
               <a:defRPr/>
             </a:pPr>
             <a:r>
-              <a:rPr lang="en-US" sz="2400" dirty="0" err="1" smtClean="0">
-                <a:solidFill>
-                  <a:srgbClr val="000000"/>
-                </a:solidFill>
-                <a:latin typeface="LeituraSans-Grot 2"/>
-                <a:cs typeface="LeituraSans-Grot 2"/>
-              </a:rPr>
-              <a:t>Nasa</a:t>
-            </a:r>
-            <a:r>
               <a:rPr lang="en-US" sz="2400" dirty="0" smtClean="0">
                 <a:solidFill>
                   <a:srgbClr val="000000"/>
@@ -6121,19 +6383,39 @@
                 <a:latin typeface="LeituraSans-Grot 2"/>
                 <a:cs typeface="LeituraSans-Grot 2"/>
               </a:rPr>
+              <a:t>NASA </a:t>
+            </a:r>
+            <a:r>
+              <a:rPr lang="en-US" sz="2400" dirty="0">
+                <a:solidFill>
+                  <a:srgbClr val="000000"/>
+                </a:solidFill>
+                <a:latin typeface="LeituraSans-Grot 2"/>
+                <a:cs typeface="LeituraSans-Grot 2"/>
+              </a:rPr>
+              <a:t>Formal Methods </a:t>
+            </a:r>
+            <a:r>
+              <a:rPr lang="en-US" sz="2400" dirty="0" smtClean="0">
+                <a:solidFill>
+                  <a:srgbClr val="000000"/>
+                </a:solidFill>
+                <a:latin typeface="LeituraSans-Grot 2"/>
+                <a:cs typeface="LeituraSans-Grot 2"/>
+              </a:rPr>
+              <a:t>2015</a:t>
+            </a:r>
+            <a:r>
+              <a:rPr lang="en-US" sz="2400" dirty="0">
+                <a:solidFill>
+                  <a:srgbClr val="000000"/>
+                </a:solidFill>
+                <a:latin typeface="LeituraSans-Grot 2"/>
+                <a:cs typeface="LeituraSans-Grot 2"/>
+              </a:rPr>
               <a:t> </a:t>
             </a:r>
             <a:r>
-              <a:rPr lang="en-US" sz="2400" dirty="0">
-                <a:solidFill>
-                  <a:srgbClr val="000000"/>
-                </a:solidFill>
-                <a:latin typeface="LeituraSans-Grot 2"/>
-                <a:cs typeface="LeituraSans-Grot 2"/>
-              </a:rPr>
-              <a:t>Formal Methods </a:t>
-            </a:r>
-            <a:r>
               <a:rPr lang="en-US" sz="2400" dirty="0" smtClean="0">
                 <a:solidFill>
                   <a:srgbClr val="000000"/>
@@ -6141,17 +6423,8 @@
                 <a:latin typeface="LeituraSans-Grot 2"/>
                 <a:cs typeface="LeituraSans-Grot 2"/>
               </a:rPr>
-              <a:t>2015</a:t>
-            </a:r>
-            <a:br>
-              <a:rPr lang="en-US" sz="2400" dirty="0" smtClean="0">
-                <a:solidFill>
-                  <a:srgbClr val="000000"/>
-                </a:solidFill>
-                <a:latin typeface="LeituraSans-Grot 2"/>
-                <a:cs typeface="LeituraSans-Grot 2"/>
-              </a:rPr>
-            </a:br>
+              <a:t>Paper </a:t>
+            </a:r>
             <a:r>
               <a:rPr lang="en-US" sz="2400" dirty="0" smtClean="0">
                 <a:solidFill>
@@ -6221,7 +6494,27 @@
                 <a:latin typeface="LeituraSans-Grot 2"/>
                 <a:cs typeface="LeituraSans-Grot 2"/>
               </a:rPr>
-              <a:t>ISSTA 2015, ACM Digital Library link: </a:t>
+              <a:t>ISSTA </a:t>
+            </a:r>
+            <a:r>
+              <a:rPr lang="en-US" sz="2400" dirty="0" smtClean="0">
+                <a:solidFill>
+                  <a:srgbClr val="000000"/>
+                </a:solidFill>
+                <a:latin typeface="LeituraSans-Grot 2"/>
+                <a:cs typeface="LeituraSans-Grot 2"/>
+              </a:rPr>
+              <a:t>2015 Tool Paper, </a:t>
+            </a:r>
+            <a:r>
+              <a:rPr lang="en-US" sz="2400" dirty="0" smtClean="0">
+                <a:solidFill>
+                  <a:srgbClr val="000000"/>
+                </a:solidFill>
+                <a:latin typeface="LeituraSans-Grot 2"/>
+                <a:cs typeface="LeituraSans-Grot 2"/>
+              </a:rPr>
+              <a:t>ACM Digital Library link: </a:t>
             </a:r>
             <a:r>
               <a:rPr lang="en-US" sz="2400" dirty="0" smtClean="0">
@@ -6295,7 +6588,7 @@
               <a:t>TSTL for Java (work in progress by </a:t>
             </a:r>
             <a:r>
-              <a:rPr lang="en-US" sz="2400" dirty="0" err="1">
+              <a:rPr lang="en-US" sz="2400" dirty="0" err="1" smtClean="0">
                 <a:solidFill>
                   <a:srgbClr val="000000"/>
                 </a:solidFill>
@@ -6305,6 +6598,16 @@
               <a:t>flipturnapps</a:t>
             </a:r>
             <a:r>
+              <a:rPr lang="en-US" sz="2400" dirty="0" smtClean="0">
+                <a:solidFill>
+                  <a:srgbClr val="000000"/>
+                </a:solidFill>
+                <a:latin typeface="LeituraSans-Grot 2"/>
+                <a:cs typeface="LeituraSans-Grot 2"/>
+              </a:rPr>
+              <a:t>)</a:t>
+            </a:r>
+            <a:r>
               <a:rPr lang="en-US" sz="2400" dirty="0">
                 <a:solidFill>
                   <a:srgbClr val="000000"/>
@@ -6312,7 +6615,7 @@
                 <a:latin typeface="LeituraSans-Grot 2"/>
                 <a:cs typeface="LeituraSans-Grot 2"/>
               </a:rPr>
-              <a:t> team): </a:t>
+              <a:t>: </a:t>
             </a:r>
             <a:r>
               <a:rPr lang="en-US" sz="2400" dirty="0">
@@ -6427,7 +6730,47 @@
                 <a:latin typeface="LeituraSans-Grot 2"/>
                 <a:cs typeface="LeituraSans-Grot 2"/>
               </a:rPr>
-              <a:t>Game Testing: Games are often state based systems with several API calls / methods within. TSTL can be very useful for testing such games where often a game state is maintained internally. TSTL has been used to test games like dominion.</a:t>
+              <a:t>Game Testing: Games are often state based systems with several API calls / </a:t>
+            </a:r>
+            <a:r>
+              <a:rPr lang="en-US" sz="2400" dirty="0" smtClean="0">
+                <a:solidFill>
+                  <a:srgbClr val="000000"/>
+                </a:solidFill>
+                <a:latin typeface="LeituraSans-Grot 2"/>
+                <a:cs typeface="LeituraSans-Grot 2"/>
+              </a:rPr>
+              <a:t>methods for changing state. </a:t>
+            </a:r>
+            <a:r>
+              <a:rPr lang="en-US" sz="2400" dirty="0" smtClean="0">
+                <a:solidFill>
+                  <a:srgbClr val="000000"/>
+                </a:solidFill>
+                <a:latin typeface="LeituraSans-Grot 2"/>
+                <a:cs typeface="LeituraSans-Grot 2"/>
+              </a:rPr>
+              <a:t>TSTL can be very useful for testing such </a:t>
+            </a:r>
+            <a:r>
+              <a:rPr lang="en-US" sz="2400" dirty="0" smtClean="0">
+                <a:solidFill>
+                  <a:srgbClr val="000000"/>
+                </a:solidFill>
+                <a:latin typeface="LeituraSans-Grot 2"/>
+                <a:cs typeface="LeituraSans-Grot 2"/>
+              </a:rPr>
+              <a:t>games.  TSTL has tested the card game Dominion</a:t>
+            </a:r>
+            <a:r>
+              <a:rPr lang="en-US" sz="2400" dirty="0" smtClean="0">
+                <a:solidFill>
+                  <a:srgbClr val="000000"/>
+                </a:solidFill>
+                <a:latin typeface="LeituraSans-Grot 2"/>
+                <a:cs typeface="LeituraSans-Grot 2"/>
+              </a:rPr>
+              <a:t>.</a:t>
             </a:r>
           </a:p>
           <a:p>
@@ -6532,6 +6875,20 @@
               <a:buChar char="•"/>
               <a:defRPr/>
             </a:pPr>
+            <a:endParaRPr lang="en-US" sz="2400" dirty="0" smtClean="0">
+              <a:solidFill>
+                <a:srgbClr val="000000"/>
+              </a:solidFill>
+              <a:latin typeface="LeituraSans-Grot 2"/>
+              <a:cs typeface="LeituraSans-Grot 2"/>
+            </a:endParaRPr>
+          </a:p>
+          <a:p>
+            <a:pPr marL="571500" indent="-571500">
+              <a:buFont typeface="Arial"/>
+              <a:buChar char="•"/>
+              <a:defRPr/>
+            </a:pPr>
             <a:r>
               <a:rPr lang="en-US" sz="2400" dirty="0" smtClean="0">
                 <a:solidFill>
@@ -6540,7 +6897,27 @@
                 <a:latin typeface="LeituraSans-Grot 2"/>
                 <a:cs typeface="LeituraSans-Grot 2"/>
               </a:rPr>
-              <a:t>Testing programming libraries: We tested </a:t>
+              <a:t>Testing </a:t>
+            </a:r>
+            <a:r>
+              <a:rPr lang="en-US" sz="2400" dirty="0" smtClean="0">
+                <a:solidFill>
+                  <a:srgbClr val="000000"/>
+                </a:solidFill>
+                <a:latin typeface="LeituraSans-Grot 2"/>
+                <a:cs typeface="LeituraSans-Grot 2"/>
+              </a:rPr>
+              <a:t>programming libraries: </a:t>
+            </a:r>
+            <a:r>
+              <a:rPr lang="en-US" sz="2400" dirty="0" smtClean="0">
+                <a:solidFill>
+                  <a:srgbClr val="000000"/>
+                </a:solidFill>
+                <a:latin typeface="LeituraSans-Grot 2"/>
+                <a:cs typeface="LeituraSans-Grot 2"/>
+              </a:rPr>
+              <a:t>in use for testing </a:t>
             </a:r>
             <a:r>
               <a:rPr lang="en-US" sz="2400" dirty="0" err="1" smtClean="0">
@@ -6600,7 +6977,41 @@
                 <a:latin typeface="LeituraSans-Grot 2"/>
                 <a:cs typeface="LeituraSans-Grot 2"/>
               </a:rPr>
-              <a:t> amongst other libraries.</a:t>
+              <a:t>, Z3Py, and other critical </a:t>
+            </a:r>
+            <a:r>
+              <a:rPr lang="en-US" sz="2400" smtClean="0">
+                <a:solidFill>
+                  <a:srgbClr val="000000"/>
+                </a:solidFill>
+                <a:latin typeface="LeituraSans-Grot 2"/>
+                <a:cs typeface="LeituraSans-Grot 2"/>
+              </a:rPr>
+              <a:t>Python libraries</a:t>
+            </a:r>
+            <a:endParaRPr lang="en-US" sz="2400" dirty="0" smtClean="0">
+              <a:solidFill>
+                <a:srgbClr val="000000"/>
+              </a:solidFill>
+              <a:latin typeface="LeituraSans-Grot 2"/>
+              <a:cs typeface="LeituraSans-Grot 2"/>
+            </a:endParaRPr>
+          </a:p>
+          <a:p>
+            <a:pPr marL="571500" indent="-571500">
+              <a:buFont typeface="Arial"/>
+              <a:buChar char="•"/>
+              <a:defRPr/>
+            </a:pPr>
+            <a:r>
+              <a:rPr lang="en-US" sz="2400" dirty="0" smtClean="0">
+                <a:solidFill>
+                  <a:srgbClr val="000000"/>
+                </a:solidFill>
+                <a:latin typeface="LeituraSans-Grot 2"/>
+                <a:cs typeface="LeituraSans-Grot 2"/>
+              </a:rPr>
+              <a:t>Grammar-based test generation:  TSTL can produce strings from arbitrary grammars, and call the system</a:t>
             </a:r>
             <a:endParaRPr lang="en-US" sz="2400" dirty="0">
               <a:solidFill>
@@ -6624,15 +7035,8 @@
                 <a:latin typeface="LeituraSans-Grot 2"/>
                 <a:cs typeface="LeituraSans-Grot 2"/>
               </a:rPr>
-              <a:t>Compiler Testing: TSTL can be used for testing compiler source code.</a:t>
-            </a:r>
-          </a:p>
-          <a:p>
-            <a:pPr marL="571500" indent="-571500">
-              <a:buFont typeface="Arial"/>
-              <a:buChar char="•"/>
-              <a:defRPr/>
-            </a:pPr>
+              <a:t>Testing </a:t>
+            </a:r>
             <a:r>
               <a:rPr lang="en-US" sz="2400" dirty="0" smtClean="0">
                 <a:solidFill>
@@ -6641,8 +7045,45 @@
                 <a:latin typeface="LeituraSans-Grot 2"/>
                 <a:cs typeface="LeituraSans-Grot 2"/>
               </a:rPr>
-              <a:t>Testing any state based system. Several software systems in different domains are state based systems.</a:t>
-            </a:r>
+              <a:t>any state based </a:t>
+            </a:r>
+            <a:r>
+              <a:rPr lang="en-US" sz="2400" dirty="0" smtClean="0">
+                <a:solidFill>
+                  <a:srgbClr val="000000"/>
+                </a:solidFill>
+                <a:latin typeface="LeituraSans-Grot 2"/>
+                <a:cs typeface="LeituraSans-Grot 2"/>
+              </a:rPr>
+              <a:t>system: many </a:t>
+            </a:r>
+            <a:r>
+              <a:rPr lang="en-US" sz="2400" dirty="0" smtClean="0">
+                <a:solidFill>
+                  <a:srgbClr val="000000"/>
+                </a:solidFill>
+                <a:latin typeface="LeituraSans-Grot 2"/>
+                <a:cs typeface="LeituraSans-Grot 2"/>
+              </a:rPr>
+              <a:t>software systems in different domains are state based </a:t>
+            </a:r>
+            <a:r>
+              <a:rPr lang="en-US" sz="2400" dirty="0" smtClean="0">
+                <a:solidFill>
+                  <a:srgbClr val="000000"/>
+                </a:solidFill>
+                <a:latin typeface="LeituraSans-Grot 2"/>
+                <a:cs typeface="LeituraSans-Grot 2"/>
+              </a:rPr>
+              <a:t>systems</a:t>
+            </a:r>
+            <a:endParaRPr lang="en-US" sz="2400" dirty="0" smtClean="0">
+              <a:solidFill>
+                <a:srgbClr val="000000"/>
+              </a:solidFill>
+              <a:latin typeface="LeituraSans-Grot 2"/>
+              <a:cs typeface="LeituraSans-Grot 2"/>
+            </a:endParaRPr>
           </a:p>
           <a:p>
             <a:pPr marL="571500" indent="-571500">
@@ -6716,6 +7157,290 @@
           </a:prstGeom>
         </p:spPr>
       </p:pic>
+      <p:sp>
+        <p:nvSpPr>
+          <p:cNvPr id="17" name="TextBox 17"/>
+          <p:cNvSpPr txBox="1">
+            <a:spLocks noChangeArrowheads="1"/>
+          </p:cNvSpPr>
+          <p:nvPr/>
+        </p:nvSpPr>
+        <p:spPr bwMode="auto">
+          <a:xfrm>
+            <a:off x="22174200" y="36423600"/>
+            <a:ext cx="9906000" cy="1015663"/>
+          </a:xfrm>
+          <a:prstGeom prst="rect">
+            <a:avLst/>
+          </a:prstGeom>
+          <a:noFill/>
+          <a:ln>
+            <a:noFill/>
+          </a:ln>
+          <a:extLst>
+            <a:ext uri="{909E8E84-426E-40dd-AFC4-6F175D3DCCD1}">
+              <a14:hiddenFill xmlns:a14="http://schemas.microsoft.com/office/drawing/2010/main">
+                <a:solidFill>
+                  <a:srgbClr val="FFFFFF"/>
+                </a:solidFill>
+              </a14:hiddenFill>
+            </a:ext>
+            <a:ext uri="{91240B29-F687-4f45-9708-019B960494DF}">
+              <a14:hiddenLine xmlns:a14="http://schemas.microsoft.com/office/drawing/2010/main" w="9525">
+                <a:solidFill>
+                  <a:srgbClr val="000000"/>
+                </a:solidFill>
+                <a:miter lim="800000"/>
+                <a:headEnd/>
+                <a:tailEnd/>
+              </a14:hiddenLine>
+            </a:ext>
+          </a:extLst>
+        </p:spPr>
+        <p:txBody>
+          <a:bodyPr wrap="square">
+            <a:spAutoFit/>
+          </a:bodyPr>
+          <a:lstStyle>
+            <a:lvl1pPr eaLnBrk="0" hangingPunct="0">
+              <a:defRPr sz="1900">
+                <a:solidFill>
+                  <a:schemeClr val="tx1"/>
+                </a:solidFill>
+                <a:latin typeface="Times New Roman" charset="0"/>
+                <a:ea typeface="ＭＳ Ｐゴシック" charset="0"/>
+                <a:cs typeface="ＭＳ Ｐゴシック" charset="0"/>
+              </a:defRPr>
+            </a:lvl1pPr>
+            <a:lvl2pPr marL="742950" indent="-285750" eaLnBrk="0" hangingPunct="0">
+              <a:defRPr sz="1900">
+                <a:solidFill>
+                  <a:schemeClr val="tx1"/>
+                </a:solidFill>
+                <a:latin typeface="Times New Roman" charset="0"/>
+                <a:ea typeface="ＭＳ Ｐゴシック" charset="0"/>
+              </a:defRPr>
+            </a:lvl2pPr>
+            <a:lvl3pPr marL="1143000" indent="-228600" eaLnBrk="0" hangingPunct="0">
+              <a:defRPr sz="1900">
+                <a:solidFill>
+                  <a:schemeClr val="tx1"/>
+                </a:solidFill>
+                <a:latin typeface="Times New Roman" charset="0"/>
+                <a:ea typeface="ＭＳ Ｐゴシック" charset="0"/>
+              </a:defRPr>
+            </a:lvl3pPr>
+            <a:lvl4pPr marL="1600200" indent="-228600" eaLnBrk="0" hangingPunct="0">
+              <a:defRPr sz="1900">
+                <a:solidFill>
+                  <a:schemeClr val="tx1"/>
+                </a:solidFill>
+                <a:latin typeface="Times New Roman" charset="0"/>
+                <a:ea typeface="ＭＳ Ｐゴシック" charset="0"/>
+              </a:defRPr>
+            </a:lvl4pPr>
+            <a:lvl5pPr marL="2057400" indent="-228600" eaLnBrk="0" hangingPunct="0">
+              <a:defRPr sz="1900">
+                <a:solidFill>
+                  <a:schemeClr val="tx1"/>
+                </a:solidFill>
+                <a:latin typeface="Times New Roman" charset="0"/>
+                <a:ea typeface="ＭＳ Ｐゴシック" charset="0"/>
+              </a:defRPr>
+            </a:lvl5pPr>
+            <a:lvl6pPr marL="2514600" indent="-228600" eaLnBrk="0" fontAlgn="base" hangingPunct="0">
+              <a:spcBef>
+                <a:spcPct val="0"/>
+              </a:spcBef>
+              <a:spcAft>
+                <a:spcPct val="0"/>
+              </a:spcAft>
+              <a:defRPr sz="1900">
+                <a:solidFill>
+                  <a:schemeClr val="tx1"/>
+                </a:solidFill>
+                <a:latin typeface="Times New Roman" charset="0"/>
+                <a:ea typeface="ＭＳ Ｐゴシック" charset="0"/>
+              </a:defRPr>
+            </a:lvl6pPr>
+            <a:lvl7pPr marL="2971800" indent="-228600" eaLnBrk="0" fontAlgn="base" hangingPunct="0">
+              <a:spcBef>
+                <a:spcPct val="0"/>
+              </a:spcBef>
+              <a:spcAft>
+                <a:spcPct val="0"/>
+              </a:spcAft>
+              <a:defRPr sz="1900">
+                <a:solidFill>
+                  <a:schemeClr val="tx1"/>
+                </a:solidFill>
+                <a:latin typeface="Times New Roman" charset="0"/>
+                <a:ea typeface="ＭＳ Ｐゴシック" charset="0"/>
+              </a:defRPr>
+            </a:lvl7pPr>
+            <a:lvl8pPr marL="3429000" indent="-228600" eaLnBrk="0" fontAlgn="base" hangingPunct="0">
+              <a:spcBef>
+                <a:spcPct val="0"/>
+              </a:spcBef>
+              <a:spcAft>
+                <a:spcPct val="0"/>
+              </a:spcAft>
+              <a:defRPr sz="1900">
+                <a:solidFill>
+                  <a:schemeClr val="tx1"/>
+                </a:solidFill>
+                <a:latin typeface="Times New Roman" charset="0"/>
+                <a:ea typeface="ＭＳ Ｐゴシック" charset="0"/>
+              </a:defRPr>
+            </a:lvl8pPr>
+            <a:lvl9pPr marL="3886200" indent="-228600" eaLnBrk="0" fontAlgn="base" hangingPunct="0">
+              <a:spcBef>
+                <a:spcPct val="0"/>
+              </a:spcBef>
+              <a:spcAft>
+                <a:spcPct val="0"/>
+              </a:spcAft>
+              <a:defRPr sz="1900">
+                <a:solidFill>
+                  <a:schemeClr val="tx1"/>
+                </a:solidFill>
+                <a:latin typeface="Times New Roman" charset="0"/>
+                <a:ea typeface="ＭＳ Ｐゴシック" charset="0"/>
+              </a:defRPr>
+            </a:lvl9pPr>
+          </a:lstStyle>
+          <a:p>
+            <a:pPr eaLnBrk="1" hangingPunct="1"/>
+            <a:r>
+              <a:rPr lang="en-US" sz="1800" dirty="0" smtClean="0">
+                <a:solidFill>
+                  <a:schemeClr val="bg2"/>
+                </a:solidFill>
+                <a:latin typeface="LeituraSans-Grot 2" charset="0"/>
+                <a:cs typeface="LeituraSans-Grot 2" charset="0"/>
+              </a:rPr>
+              <a:t>TSTL authors are:  Alex Groce, Jervis Pinto, Josie Holmes, </a:t>
+            </a:r>
+            <a:r>
+              <a:rPr lang="en-US" sz="1800" dirty="0" err="1" smtClean="0">
+                <a:solidFill>
+                  <a:schemeClr val="bg2"/>
+                </a:solidFill>
+                <a:latin typeface="LeituraSans-Grot 2" charset="0"/>
+                <a:cs typeface="LeituraSans-Grot 2" charset="0"/>
+              </a:rPr>
+              <a:t>Pranjal</a:t>
+            </a:r>
+            <a:r>
+              <a:rPr lang="en-US" sz="1800" dirty="0" smtClean="0">
+                <a:solidFill>
+                  <a:schemeClr val="bg2"/>
+                </a:solidFill>
+                <a:latin typeface="LeituraSans-Grot 2" charset="0"/>
+                <a:cs typeface="LeituraSans-Grot 2" charset="0"/>
+              </a:rPr>
+              <a:t> Mittal, and </a:t>
+            </a:r>
+            <a:r>
+              <a:rPr lang="en-US" sz="1800" dirty="0" err="1" smtClean="0">
+                <a:solidFill>
+                  <a:schemeClr val="bg2"/>
+                </a:solidFill>
+                <a:latin typeface="LeituraSans-Grot 2" charset="0"/>
+                <a:cs typeface="LeituraSans-Grot 2" charset="0"/>
+              </a:rPr>
+              <a:t>Pooria</a:t>
+            </a:r>
+            <a:r>
+              <a:rPr lang="en-US" sz="1800" dirty="0" smtClean="0">
+                <a:solidFill>
+                  <a:schemeClr val="bg2"/>
+                </a:solidFill>
+                <a:latin typeface="LeituraSans-Grot 2" charset="0"/>
+                <a:cs typeface="LeituraSans-Grot 2" charset="0"/>
+              </a:rPr>
+              <a:t> </a:t>
+            </a:r>
+            <a:r>
+              <a:rPr lang="en-US" sz="1800" dirty="0" err="1" smtClean="0">
+                <a:solidFill>
+                  <a:schemeClr val="bg2"/>
+                </a:solidFill>
+                <a:latin typeface="LeituraSans-Grot 2" charset="0"/>
+                <a:cs typeface="LeituraSans-Grot 2" charset="0"/>
+              </a:rPr>
+              <a:t>Azimi</a:t>
+            </a:r>
+            <a:r>
+              <a:rPr lang="en-US" sz="1800" dirty="0" smtClean="0">
+                <a:solidFill>
+                  <a:schemeClr val="bg2"/>
+                </a:solidFill>
+                <a:latin typeface="LeituraSans-Grot 2" charset="0"/>
+                <a:cs typeface="LeituraSans-Grot 2" charset="0"/>
+              </a:rPr>
+              <a:t>.  We thank Ned </a:t>
+            </a:r>
+            <a:r>
+              <a:rPr lang="en-US" sz="1800" dirty="0" err="1" smtClean="0">
+                <a:solidFill>
+                  <a:schemeClr val="bg2"/>
+                </a:solidFill>
+                <a:latin typeface="LeituraSans-Grot 2" charset="0"/>
+                <a:cs typeface="LeituraSans-Grot 2" charset="0"/>
+              </a:rPr>
+              <a:t>Batchelder</a:t>
+            </a:r>
+            <a:r>
+              <a:rPr lang="en-US" sz="1800" dirty="0" smtClean="0">
+                <a:solidFill>
+                  <a:schemeClr val="bg2"/>
+                </a:solidFill>
+                <a:latin typeface="LeituraSans-Grot 2" charset="0"/>
+                <a:cs typeface="LeituraSans-Grot 2" charset="0"/>
+              </a:rPr>
+              <a:t> for help with integrating </a:t>
+            </a:r>
+            <a:r>
+              <a:rPr lang="en-US" sz="1800" dirty="0" err="1" smtClean="0">
+                <a:solidFill>
+                  <a:schemeClr val="bg2"/>
+                </a:solidFill>
+                <a:latin typeface="LeituraSans-Grot 2" charset="0"/>
+                <a:cs typeface="LeituraSans-Grot 2" charset="0"/>
+              </a:rPr>
+              <a:t>coverage.py</a:t>
+            </a:r>
+            <a:r>
+              <a:rPr lang="en-US" sz="1800" dirty="0" smtClean="0">
+                <a:solidFill>
+                  <a:schemeClr val="bg2"/>
+                </a:solidFill>
+                <a:latin typeface="LeituraSans-Grot 2" charset="0"/>
+                <a:cs typeface="LeituraSans-Grot 2" charset="0"/>
+              </a:rPr>
+              <a:t>, and students in CS362, 562, and 569 at Oregon State University for comments and suggestions</a:t>
+            </a:r>
+            <a:r>
+              <a:rPr lang="en-US" sz="2400" dirty="0" smtClean="0">
+                <a:solidFill>
+                  <a:schemeClr val="bg2"/>
+                </a:solidFill>
+                <a:latin typeface="LeituraSans-Grot 2" charset="0"/>
+                <a:cs typeface="LeituraSans-Grot 2" charset="0"/>
+              </a:rPr>
+              <a:t>.</a:t>
+            </a:r>
+            <a:endParaRPr lang="en-US" sz="2400" dirty="0">
+              <a:solidFill>
+                <a:schemeClr val="bg2"/>
+              </a:solidFill>
+              <a:latin typeface="LeituraSans-Grot 2" charset="0"/>
+              <a:cs typeface="LeituraSans-Grot 2" charset="0"/>
+            </a:endParaRPr>
+          </a:p>
+        </p:txBody>
+      </p:sp>
     </p:spTree>
   </p:cSld>
   <p:clrMapOvr>

</xml_diff>

<commit_message>
Spell correction, added poster link and tstl main source code link
</commit_message>
<xml_diff>
--- a/pycon-poster.pptx
+++ b/pycon-poster.pptx
@@ -4127,37 +4127,7 @@
                 <a:latin typeface="LeituraSans-Grot 3" charset="0"/>
                 <a:cs typeface="LeituraSans-Grot 3" charset="0"/>
               </a:rPr>
-              <a:t>Pranjal Mittal, MS CS </a:t>
-            </a:r>
-            <a:r>
-              <a:rPr lang="en-US" sz="7500" dirty="0" smtClean="0">
-                <a:solidFill>
-                  <a:srgbClr val="000000"/>
-                </a:solidFill>
-                <a:latin typeface="LeituraSans-Grot 3" charset="0"/>
-                <a:cs typeface="LeituraSans-Grot 3" charset="0"/>
-              </a:rPr>
-              <a:t>Student, </a:t>
-            </a:r>
-            <a:r>
-              <a:rPr lang="en-US" sz="7500" dirty="0" smtClean="0">
-                <a:solidFill>
-                  <a:srgbClr val="000000"/>
-                </a:solidFill>
-                <a:latin typeface="LeituraSans-Grot 3" charset="0"/>
-                <a:cs typeface="LeituraSans-Grot 3" charset="0"/>
-              </a:rPr>
-              <a:t>Alex Groce, Associate </a:t>
-            </a:r>
-            <a:r>
-              <a:rPr lang="en-US" sz="7500" dirty="0" smtClean="0">
-                <a:solidFill>
-                  <a:srgbClr val="000000"/>
-                </a:solidFill>
-                <a:latin typeface="LeituraSans-Grot 3" charset="0"/>
-                <a:cs typeface="LeituraSans-Grot 3" charset="0"/>
-              </a:rPr>
-              <a:t>Professor </a:t>
+              <a:t>Pranjal Mittal, MS CS Student, Alex Groce, Associate Professor </a:t>
             </a:r>
             <a:endParaRPr lang="en-US" sz="7500" dirty="0">
               <a:solidFill>
@@ -4446,17 +4416,7 @@
                 <a:latin typeface="LeituraSans-Grot 2"/>
                 <a:cs typeface="LeituraSans-Grot 2"/>
               </a:rPr>
-              <a:t>is </a:t>
-            </a:r>
-            <a:r>
-              <a:rPr lang="en-US" sz="3000" dirty="0" smtClean="0">
-                <a:solidFill>
-                  <a:srgbClr val="000000"/>
-                </a:solidFill>
-                <a:latin typeface="LeituraSans-Grot 2"/>
-                <a:cs typeface="LeituraSans-Grot 2"/>
-              </a:rPr>
-              <a:t>an unpleasant task.  The </a:t>
+              <a:t>is an unpleasant task.  The </a:t>
             </a:r>
             <a:r>
               <a:rPr lang="en-US" sz="3000" dirty="0">
@@ -4565,12 +4525,62 @@
               </a:rPr>
               <a:t>The Problem</a:t>
             </a:r>
-            <a:endParaRPr lang="en-US" sz="5400" dirty="0" smtClean="0">
+          </a:p>
+          <a:p>
+            <a:pPr>
+              <a:defRPr/>
+            </a:pPr>
+            <a:r>
+              <a:rPr lang="en-US" sz="3000" dirty="0">
+                <a:solidFill>
+                  <a:srgbClr val="000000"/>
+                </a:solidFill>
+                <a:latin typeface="LeituraSans-Grot 2"/>
+                <a:cs typeface="LeituraSans-Grot 2"/>
+              </a:rPr>
+              <a:t>Automated testing often requires a user to write a test harness —- essentially a program that defines (or generates) the set of valid tests for the Software Under Test (SUT). </a:t>
+            </a:r>
+            <a:r>
+              <a:rPr lang="en-US" sz="3000" dirty="0" smtClean="0">
+                <a:solidFill>
+                  <a:srgbClr val="000000"/>
+                </a:solidFill>
+                <a:latin typeface="LeituraSans-Grot 2"/>
+                <a:cs typeface="LeituraSans-Grot 2"/>
+              </a:rPr>
+              <a:t>  Such </a:t>
+            </a:r>
+            <a:r>
+              <a:rPr lang="en-US" sz="3000" dirty="0">
+                <a:solidFill>
+                  <a:srgbClr val="000000"/>
+                </a:solidFill>
+                <a:latin typeface="LeituraSans-Grot 2"/>
+                <a:cs typeface="LeituraSans-Grot 2"/>
+              </a:rPr>
+              <a:t>harnesses are common to random testing, many kinds of model checking, and various machine-learning influenced </a:t>
+            </a:r>
+            <a:r>
+              <a:rPr lang="en-US" sz="3000" dirty="0" smtClean="0">
+                <a:solidFill>
+                  <a:srgbClr val="000000"/>
+                </a:solidFill>
+                <a:latin typeface="LeituraSans-Grot 2"/>
+                <a:cs typeface="LeituraSans-Grot 2"/>
+              </a:rPr>
+              <a:t>approaches to testing. </a:t>
+            </a:r>
+          </a:p>
+          <a:p>
+            <a:pPr>
+              <a:defRPr/>
+            </a:pPr>
+            <a:endParaRPr lang="en-US" sz="3000" dirty="0">
               <a:solidFill>
                 <a:srgbClr val="000000"/>
               </a:solidFill>
-              <a:latin typeface="LeituraSans-Grot 3"/>
-              <a:cs typeface="LeituraSans-Grot 3"/>
+              <a:latin typeface="LeituraSans-Grot 2"/>
+              <a:cs typeface="LeituraSans-Grot 2"/>
             </a:endParaRPr>
           </a:p>
           <a:p>
@@ -4578,6 +4588,16 @@
               <a:defRPr/>
             </a:pPr>
             <a:r>
+              <a:rPr lang="en-US" sz="3000" dirty="0" smtClean="0">
+                <a:solidFill>
+                  <a:srgbClr val="000000"/>
+                </a:solidFill>
+                <a:latin typeface="LeituraSans-Grot 2"/>
+                <a:cs typeface="LeituraSans-Grot 2"/>
+              </a:rPr>
+              <a:t>Unfortunately</a:t>
+            </a:r>
+            <a:r>
               <a:rPr lang="en-US" sz="3000" dirty="0">
                 <a:solidFill>
                   <a:srgbClr val="000000"/>
@@ -4585,7 +4605,7 @@
                 <a:latin typeface="LeituraSans-Grot 2"/>
                 <a:cs typeface="LeituraSans-Grot 2"/>
               </a:rPr>
-              <a:t>Automated testing often requires a user to write a test harness —- essentially a program that defines (or generates) the set of valid tests for the Software Under Test (SUT). </a:t>
+              <a:t>, these harnesses themselves are complex software artifacts and it is all too easy to spend valuable testing time hunting down bugs in the test harness and not the System Under Test. </a:t>
             </a:r>
             <a:r>
               <a:rPr lang="en-US" sz="3000" dirty="0" smtClean="0">
@@ -4595,7 +4615,7 @@
                 <a:latin typeface="LeituraSans-Grot 2"/>
                 <a:cs typeface="LeituraSans-Grot 2"/>
               </a:rPr>
-              <a:t>  Such </a:t>
+              <a:t> Harness </a:t>
             </a:r>
             <a:r>
               <a:rPr lang="en-US" sz="3000" dirty="0">
@@ -4605,7 +4625,7 @@
                 <a:latin typeface="LeituraSans-Grot 2"/>
                 <a:cs typeface="LeituraSans-Grot 2"/>
               </a:rPr>
-              <a:t>harnesses are common to random testing, many kinds of model checking, and various machine-learning influenced </a:t>
+              <a:t>code is often highly repetitive (choosing between a set of available API calls to make, and assigning values to parameters in those calls, for example) and is almost always tightly coupled to one particular test generation method</a:t>
             </a:r>
             <a:r>
               <a:rPr lang="en-US" sz="3000" dirty="0" smtClean="0">
@@ -4615,8 +4635,13 @@
                 <a:latin typeface="LeituraSans-Grot 2"/>
                 <a:cs typeface="LeituraSans-Grot 2"/>
               </a:rPr>
-              <a:t>approaches to testing. </a:t>
-            </a:r>
+              <a:t>.</a:t>
+            </a:r>
+          </a:p>
+          <a:p>
+            <a:pPr>
+              <a:defRPr/>
+            </a:pPr>
             <a:endParaRPr lang="en-US" sz="3000" dirty="0" smtClean="0">
               <a:solidFill>
                 <a:srgbClr val="000000"/>
@@ -4629,85 +4654,6 @@
             <a:pPr>
               <a:defRPr/>
             </a:pPr>
-            <a:endParaRPr lang="en-US" sz="3000" dirty="0">
-              <a:solidFill>
-                <a:srgbClr val="000000"/>
-              </a:solidFill>
-              <a:latin typeface="LeituraSans-Grot 2"/>
-              <a:cs typeface="LeituraSans-Grot 2"/>
-            </a:endParaRPr>
-          </a:p>
-          <a:p>
-            <a:pPr>
-              <a:defRPr/>
-            </a:pPr>
-            <a:r>
-              <a:rPr lang="en-US" sz="3000" dirty="0" smtClean="0">
-                <a:solidFill>
-                  <a:srgbClr val="000000"/>
-                </a:solidFill>
-                <a:latin typeface="LeituraSans-Grot 2"/>
-                <a:cs typeface="LeituraSans-Grot 2"/>
-              </a:rPr>
-              <a:t>Unfortunately</a:t>
-            </a:r>
-            <a:r>
-              <a:rPr lang="en-US" sz="3000" dirty="0">
-                <a:solidFill>
-                  <a:srgbClr val="000000"/>
-                </a:solidFill>
-                <a:latin typeface="LeituraSans-Grot 2"/>
-                <a:cs typeface="LeituraSans-Grot 2"/>
-              </a:rPr>
-              <a:t>, these harnesses themselves are complex software artifacts and it is all too easy to spend valuable testing time hunting down bugs in the test harness and not the System Under Test. </a:t>
-            </a:r>
-            <a:r>
-              <a:rPr lang="en-US" sz="3000" dirty="0" smtClean="0">
-                <a:solidFill>
-                  <a:srgbClr val="000000"/>
-                </a:solidFill>
-                <a:latin typeface="LeituraSans-Grot 2"/>
-                <a:cs typeface="LeituraSans-Grot 2"/>
-              </a:rPr>
-              <a:t> Harness </a:t>
-            </a:r>
-            <a:r>
-              <a:rPr lang="en-US" sz="3000" dirty="0">
-                <a:solidFill>
-                  <a:srgbClr val="000000"/>
-                </a:solidFill>
-                <a:latin typeface="LeituraSans-Grot 2"/>
-                <a:cs typeface="LeituraSans-Grot 2"/>
-              </a:rPr>
-              <a:t>code is often highly repetitive (choosing between a set of available API calls to make, and assigning values to parameters in those calls, for example) and is almost always tightly coupled to one particular test generation method</a:t>
-            </a:r>
-            <a:r>
-              <a:rPr lang="en-US" sz="3000" dirty="0" smtClean="0">
-                <a:solidFill>
-                  <a:srgbClr val="000000"/>
-                </a:solidFill>
-                <a:latin typeface="LeituraSans-Grot 2"/>
-                <a:cs typeface="LeituraSans-Grot 2"/>
-              </a:rPr>
-              <a:t>.</a:t>
-            </a:r>
-          </a:p>
-          <a:p>
-            <a:pPr>
-              <a:defRPr/>
-            </a:pPr>
-            <a:endParaRPr lang="en-US" sz="3000" dirty="0" smtClean="0">
-              <a:solidFill>
-                <a:srgbClr val="000000"/>
-              </a:solidFill>
-              <a:latin typeface="LeituraSans-Grot 2"/>
-              <a:cs typeface="LeituraSans-Grot 2"/>
-            </a:endParaRPr>
-          </a:p>
-          <a:p>
-            <a:pPr>
-              <a:defRPr/>
-            </a:pPr>
             <a:r>
               <a:rPr lang="en-US" sz="5400" dirty="0" smtClean="0">
                 <a:solidFill>
@@ -4716,27 +4662,7 @@
                 <a:latin typeface="LeituraSans-Grot 3"/>
                 <a:cs typeface="LeituraSans-Grot 3"/>
               </a:rPr>
-              <a:t>Solving </a:t>
-            </a:r>
-            <a:r>
-              <a:rPr lang="en-US" sz="5400" dirty="0" smtClean="0">
-                <a:solidFill>
-                  <a:srgbClr val="000000"/>
-                </a:solidFill>
-                <a:latin typeface="LeituraSans-Grot 3"/>
-                <a:cs typeface="LeituraSans-Grot 3"/>
-              </a:rPr>
-              <a:t>the Problem: </a:t>
-            </a:r>
-            <a:r>
-              <a:rPr lang="en-US" sz="5400" dirty="0" smtClean="0">
-                <a:solidFill>
-                  <a:srgbClr val="000000"/>
-                </a:solidFill>
-                <a:latin typeface="LeituraSans-Grot 3"/>
-                <a:cs typeface="LeituraSans-Grot 3"/>
-              </a:rPr>
-              <a:t>TSTL</a:t>
+              <a:t>Solving the Problem: TSTL</a:t>
             </a:r>
           </a:p>
           <a:p>
@@ -4894,17 +4820,7 @@
                 <a:latin typeface="LeituraSans-Grot 2"/>
                 <a:cs typeface="LeituraSans-Grot 2"/>
               </a:rPr>
-              <a:t>, with few lines </a:t>
-            </a:r>
-            <a:r>
-              <a:rPr lang="en-US" sz="3000" dirty="0" smtClean="0">
-                <a:solidFill>
-                  <a:srgbClr val="000000"/>
-                </a:solidFill>
-                <a:latin typeface="LeituraSans-Grot 2"/>
-                <a:cs typeface="LeituraSans-Grot 2"/>
-              </a:rPr>
-              <a:t>of code, mostly in Python itself</a:t>
+              <a:t>, with few lines of code, mostly in Python itself</a:t>
             </a:r>
             <a:endParaRPr lang="en-US" sz="3000" dirty="0">
               <a:solidFill>
@@ -4952,17 +4868,7 @@
                 <a:latin typeface="LeituraSans-Grot 2"/>
                 <a:cs typeface="LeituraSans-Grot 2"/>
               </a:rPr>
-              <a:t>: </a:t>
-            </a:r>
-            <a:r>
-              <a:rPr lang="en-US" sz="3000" dirty="0" smtClean="0">
-                <a:solidFill>
-                  <a:srgbClr val="000000"/>
-                </a:solidFill>
-                <a:latin typeface="LeituraSans-Grot 2"/>
-                <a:cs typeface="LeituraSans-Grot 2"/>
-              </a:rPr>
-              <a:t> The compiler takes a .</a:t>
+              <a:t>:  The compiler takes a .</a:t>
             </a:r>
             <a:r>
               <a:rPr lang="en-US" sz="3000" dirty="0" err="1" smtClean="0">
@@ -5716,37 +5622,37 @@
                 <a:latin typeface="LeituraSans-Grot 2" charset="0"/>
                 <a:cs typeface="LeituraSans-Grot 2" charset="0"/>
               </a:rPr>
-              <a:t>--</a:t>
-            </a:r>
-            <a:r>
-              <a:rPr lang="en-US" sz="2400" dirty="0" smtClean="0">
+              <a:t>-- </a:t>
+            </a:r>
+            <a:r>
+              <a:rPr lang="en-US" sz="2400" dirty="0">
                 <a:solidFill>
                   <a:schemeClr val="bg2"/>
                 </a:solidFill>
                 <a:latin typeface="LeituraSans-Grot 2" charset="0"/>
                 <a:cs typeface="LeituraSans-Grot 2" charset="0"/>
               </a:rPr>
-              <a:t> </a:t>
-            </a:r>
-            <a:r>
-              <a:rPr lang="en-US" sz="2400" dirty="0">
+              <a:t>d</a:t>
+            </a:r>
+            <a:r>
+              <a:rPr lang="en-US" sz="2400" dirty="0" smtClean="0">
                 <a:solidFill>
                   <a:schemeClr val="bg2"/>
                 </a:solidFill>
                 <a:latin typeface="LeituraSans-Grot 2" charset="0"/>
                 <a:cs typeface="LeituraSans-Grot 2" charset="0"/>
               </a:rPr>
-              <a:t>d</a:t>
-            </a:r>
-            <a:r>
-              <a:rPr lang="en-US" sz="2400" dirty="0" smtClean="0">
+              <a:t>eclarative TSTL script for testing a stack implementation; can be used with a test generator to generate automated tests for stack API.  Stack API contains: __</a:t>
+            </a:r>
+            <a:r>
+              <a:rPr lang="en-US" sz="2400" dirty="0" err="1" smtClean="0">
                 <a:solidFill>
                   <a:schemeClr val="bg2"/>
                 </a:solidFill>
                 <a:latin typeface="LeituraSans-Grot 2" charset="0"/>
                 <a:cs typeface="LeituraSans-Grot 2" charset="0"/>
               </a:rPr>
-              <a:t>eclarative </a:t>
+              <a:t>init</a:t>
             </a:r>
             <a:r>
               <a:rPr lang="en-US" sz="2400" dirty="0" smtClean="0">
@@ -5756,17 +5662,17 @@
                 <a:latin typeface="LeituraSans-Grot 2" charset="0"/>
                 <a:cs typeface="LeituraSans-Grot 2" charset="0"/>
               </a:rPr>
-              <a:t>TSTL script for testing a stack </a:t>
-            </a:r>
-            <a:r>
-              <a:rPr lang="en-US" sz="2400" dirty="0" smtClean="0">
+              <a:t>__, __</a:t>
+            </a:r>
+            <a:r>
+              <a:rPr lang="en-US" sz="2400" dirty="0" err="1" smtClean="0">
                 <a:solidFill>
                   <a:schemeClr val="bg2"/>
                 </a:solidFill>
                 <a:latin typeface="LeituraSans-Grot 2" charset="0"/>
                 <a:cs typeface="LeituraSans-Grot 2" charset="0"/>
               </a:rPr>
-              <a:t>implementation; </a:t>
+              <a:t>str</a:t>
             </a:r>
             <a:r>
               <a:rPr lang="en-US" sz="2400" dirty="0" smtClean="0">
@@ -5776,107 +5682,7 @@
                 <a:latin typeface="LeituraSans-Grot 2" charset="0"/>
                 <a:cs typeface="LeituraSans-Grot 2" charset="0"/>
               </a:rPr>
-              <a:t>can be used with a test generator to generate automated tests </a:t>
-            </a:r>
-            <a:r>
-              <a:rPr lang="en-US" sz="2400" dirty="0" smtClean="0">
-                <a:solidFill>
-                  <a:schemeClr val="bg2"/>
-                </a:solidFill>
-                <a:latin typeface="LeituraSans-Grot 2" charset="0"/>
-                <a:cs typeface="LeituraSans-Grot 2" charset="0"/>
-              </a:rPr>
-              <a:t>for </a:t>
-            </a:r>
-            <a:r>
-              <a:rPr lang="en-US" sz="2400" dirty="0" smtClean="0">
-                <a:solidFill>
-                  <a:schemeClr val="bg2"/>
-                </a:solidFill>
-                <a:latin typeface="LeituraSans-Grot 2" charset="0"/>
-                <a:cs typeface="LeituraSans-Grot 2" charset="0"/>
-              </a:rPr>
-              <a:t>stack API. </a:t>
-            </a:r>
-            <a:r>
-              <a:rPr lang="en-US" sz="2400" dirty="0" smtClean="0">
-                <a:solidFill>
-                  <a:schemeClr val="bg2"/>
-                </a:solidFill>
-                <a:latin typeface="LeituraSans-Grot 2" charset="0"/>
-                <a:cs typeface="LeituraSans-Grot 2" charset="0"/>
-              </a:rPr>
-              <a:t> Stack </a:t>
-            </a:r>
-            <a:r>
-              <a:rPr lang="en-US" sz="2400" dirty="0" smtClean="0">
-                <a:solidFill>
-                  <a:schemeClr val="bg2"/>
-                </a:solidFill>
-                <a:latin typeface="LeituraSans-Grot 2" charset="0"/>
-                <a:cs typeface="LeituraSans-Grot 2" charset="0"/>
-              </a:rPr>
-              <a:t>API contains: __</a:t>
-            </a:r>
-            <a:r>
-              <a:rPr lang="en-US" sz="2400" dirty="0" err="1" smtClean="0">
-                <a:solidFill>
-                  <a:schemeClr val="bg2"/>
-                </a:solidFill>
-                <a:latin typeface="LeituraSans-Grot 2" charset="0"/>
-                <a:cs typeface="LeituraSans-Grot 2" charset="0"/>
-              </a:rPr>
-              <a:t>init</a:t>
-            </a:r>
-            <a:r>
-              <a:rPr lang="en-US" sz="2400" dirty="0" smtClean="0">
-                <a:solidFill>
-                  <a:schemeClr val="bg2"/>
-                </a:solidFill>
-                <a:latin typeface="LeituraSans-Grot 2" charset="0"/>
-                <a:cs typeface="LeituraSans-Grot 2" charset="0"/>
-              </a:rPr>
-              <a:t>__, __</a:t>
-            </a:r>
-            <a:r>
-              <a:rPr lang="en-US" sz="2400" dirty="0" err="1" smtClean="0">
-                <a:solidFill>
-                  <a:schemeClr val="bg2"/>
-                </a:solidFill>
-                <a:latin typeface="LeituraSans-Grot 2" charset="0"/>
-                <a:cs typeface="LeituraSans-Grot 2" charset="0"/>
-              </a:rPr>
-              <a:t>str</a:t>
-            </a:r>
-            <a:r>
-              <a:rPr lang="en-US" sz="2400" dirty="0" smtClean="0">
-                <a:solidFill>
-                  <a:schemeClr val="bg2"/>
-                </a:solidFill>
-                <a:latin typeface="LeituraSans-Grot 2" charset="0"/>
-                <a:cs typeface="LeituraSans-Grot 2" charset="0"/>
-              </a:rPr>
-              <a:t>__, push, pop, peek, </a:t>
-            </a:r>
-            <a:r>
-              <a:rPr lang="en-US" sz="2400" dirty="0" smtClean="0">
-                <a:solidFill>
-                  <a:schemeClr val="bg2"/>
-                </a:solidFill>
-                <a:latin typeface="LeituraSans-Grot 2" charset="0"/>
-                <a:cs typeface="LeituraSans-Grot 2" charset="0"/>
-              </a:rPr>
-              <a:t>etc. </a:t>
-            </a:r>
-            <a:r>
-              <a:rPr lang="en-US" sz="2400" dirty="0" smtClean="0">
-                <a:solidFill>
-                  <a:schemeClr val="bg2"/>
-                </a:solidFill>
-                <a:latin typeface="LeituraSans-Grot 2" charset="0"/>
-                <a:cs typeface="LeituraSans-Grot 2" charset="0"/>
-              </a:rPr>
-              <a:t>methods and size property.</a:t>
+              <a:t>__, push, pop, peek, etc. methods and size property.</a:t>
             </a:r>
             <a:endParaRPr lang="en-US" sz="2400" dirty="0">
               <a:solidFill>
@@ -6116,37 +5922,37 @@
                 <a:latin typeface="LeituraSans-Grot 3" charset="0"/>
                 <a:cs typeface="LeituraSans-Grot 3" charset="0"/>
               </a:rPr>
-              <a:t>Alex Groce, </a:t>
-            </a:r>
-            <a:r>
-              <a:rPr lang="en-US" sz="2400" dirty="0" smtClean="0">
+              <a:t>Alex Groce, Josie Holmes, </a:t>
+            </a:r>
+            <a:r>
+              <a:rPr lang="en-US" sz="2400" dirty="0" err="1" smtClean="0">
                 <a:solidFill>
                   <a:srgbClr val="000000"/>
                 </a:solidFill>
                 <a:latin typeface="LeituraSans-Grot 3" charset="0"/>
                 <a:cs typeface="LeituraSans-Grot 3" charset="0"/>
               </a:rPr>
-              <a:t>Josie Holmes, </a:t>
-            </a:r>
-            <a:r>
-              <a:rPr lang="en-US" sz="2400" dirty="0" err="1" smtClean="0">
+              <a:t>Pranjal</a:t>
+            </a:r>
+            <a:r>
+              <a:rPr lang="en-US" sz="2400" dirty="0" smtClean="0">
                 <a:solidFill>
                   <a:srgbClr val="000000"/>
                 </a:solidFill>
                 <a:latin typeface="LeituraSans-Grot 3" charset="0"/>
                 <a:cs typeface="LeituraSans-Grot 3" charset="0"/>
               </a:rPr>
-              <a:t>Pranjal</a:t>
-            </a:r>
-            <a:r>
-              <a:rPr lang="en-US" sz="2400" dirty="0" smtClean="0">
+              <a:t> Mittal, </a:t>
+            </a:r>
+            <a:r>
+              <a:rPr lang="en-US" sz="2400" dirty="0" err="1" smtClean="0">
                 <a:solidFill>
                   <a:srgbClr val="000000"/>
                 </a:solidFill>
                 <a:latin typeface="LeituraSans-Grot 3" charset="0"/>
                 <a:cs typeface="LeituraSans-Grot 3" charset="0"/>
               </a:rPr>
-              <a:t> Mittal</a:t>
+              <a:t>Pooria</a:t>
             </a:r>
             <a:r>
               <a:rPr lang="en-US" sz="2400" dirty="0" smtClean="0">
@@ -6156,7 +5962,7 @@
                 <a:latin typeface="LeituraSans-Grot 3" charset="0"/>
                 <a:cs typeface="LeituraSans-Grot 3" charset="0"/>
               </a:rPr>
-              <a:t>, </a:t>
+              <a:t> </a:t>
             </a:r>
             <a:r>
               <a:rPr lang="en-US" sz="2400" dirty="0" err="1" smtClean="0">
@@ -6166,7 +5972,7 @@
                 <a:latin typeface="LeituraSans-Grot 3" charset="0"/>
                 <a:cs typeface="LeituraSans-Grot 3" charset="0"/>
               </a:rPr>
-              <a:t>Pooria</a:t>
+              <a:t>Azimi</a:t>
             </a:r>
             <a:r>
               <a:rPr lang="en-US" sz="2400" dirty="0" smtClean="0">
@@ -6176,37 +5982,7 @@
                 <a:latin typeface="LeituraSans-Grot 3" charset="0"/>
                 <a:cs typeface="LeituraSans-Grot 3" charset="0"/>
               </a:rPr>
-              <a:t> </a:t>
-            </a:r>
-            <a:r>
-              <a:rPr lang="en-US" sz="2400" dirty="0" err="1" smtClean="0">
-                <a:solidFill>
-                  <a:srgbClr val="000000"/>
-                </a:solidFill>
-                <a:latin typeface="LeituraSans-Grot 3" charset="0"/>
-                <a:cs typeface="LeituraSans-Grot 3" charset="0"/>
-              </a:rPr>
-              <a:t>Azimi</a:t>
-            </a:r>
-            <a:r>
-              <a:rPr lang="en-US" sz="2400" dirty="0" smtClean="0">
-                <a:solidFill>
-                  <a:srgbClr val="000000"/>
-                </a:solidFill>
-                <a:latin typeface="LeituraSans-Grot 3" charset="0"/>
-                <a:cs typeface="LeituraSans-Grot 3" charset="0"/>
-              </a:rPr>
-              <a:t>, Jervis Pinto, Dr. James </a:t>
-            </a:r>
-            <a:r>
-              <a:rPr lang="en-US" sz="2400" dirty="0" smtClean="0">
-                <a:solidFill>
-                  <a:srgbClr val="000000"/>
-                </a:solidFill>
-                <a:latin typeface="LeituraSans-Grot 3" charset="0"/>
-                <a:cs typeface="LeituraSans-Grot 3" charset="0"/>
-              </a:rPr>
-              <a:t>O’Brien; thanks to Ned </a:t>
+              <a:t>, Jervis Pinto, Dr. James O’Brien; thanks to Ned </a:t>
             </a:r>
             <a:r>
               <a:rPr lang="en-US" sz="2400" dirty="0" err="1" smtClean="0">
@@ -6366,16 +6142,798 @@
           </a:p>
         </p:txBody>
       </p:sp>
+      <p:sp>
+        <p:nvSpPr>
+          <p:cNvPr id="14" name="TextBox 13"/>
+          <p:cNvSpPr txBox="1"/>
+          <p:nvPr/>
+        </p:nvSpPr>
+        <p:spPr>
+          <a:xfrm>
+            <a:off x="21793200" y="32080200"/>
+            <a:ext cx="10058400" cy="4401205"/>
+          </a:xfrm>
+          <a:prstGeom prst="rect">
+            <a:avLst/>
+          </a:prstGeom>
+          <a:noFill/>
+        </p:spPr>
+        <p:txBody>
+          <a:bodyPr wrap="square">
+            <a:spAutoFit/>
+          </a:bodyPr>
+          <a:lstStyle/>
+          <a:p>
+            <a:pPr>
+              <a:defRPr/>
+            </a:pPr>
+            <a:r>
+              <a:rPr lang="en-US" sz="4000" dirty="0" smtClean="0">
+                <a:solidFill>
+                  <a:srgbClr val="000000"/>
+                </a:solidFill>
+                <a:latin typeface="LeituraSans-Grot 3"/>
+                <a:cs typeface="LeituraSans-Grot 3"/>
+              </a:rPr>
+              <a:t>Links</a:t>
+            </a:r>
+            <a:endParaRPr lang="en-US" sz="2000" dirty="0" smtClean="0">
+              <a:solidFill>
+                <a:srgbClr val="000000"/>
+              </a:solidFill>
+              <a:latin typeface="LeituraSans-Grot 2"/>
+              <a:cs typeface="LeituraSans-Grot 2"/>
+            </a:endParaRPr>
+          </a:p>
+          <a:p>
+            <a:pPr marL="571500" indent="-571500">
+              <a:buFont typeface="Arial"/>
+              <a:buChar char="•"/>
+              <a:defRPr/>
+            </a:pPr>
+            <a:endParaRPr lang="en-US" sz="2000" dirty="0" smtClean="0">
+              <a:solidFill>
+                <a:srgbClr val="000000"/>
+              </a:solidFill>
+              <a:latin typeface="LeituraSans-Grot 2"/>
+              <a:cs typeface="LeituraSans-Grot 2"/>
+            </a:endParaRPr>
+          </a:p>
+          <a:p>
+            <a:pPr marL="571500" indent="-571500">
+              <a:buFont typeface="Arial"/>
+              <a:buChar char="•"/>
+              <a:defRPr/>
+            </a:pPr>
+            <a:r>
+              <a:rPr lang="en-US" sz="2000" dirty="0" smtClean="0">
+                <a:solidFill>
+                  <a:srgbClr val="000000"/>
+                </a:solidFill>
+                <a:latin typeface="LeituraSans-Grot 2"/>
+                <a:cs typeface="LeituraSans-Grot 2"/>
+              </a:rPr>
+              <a:t>NASA </a:t>
+            </a:r>
+            <a:r>
+              <a:rPr lang="en-US" sz="2000" dirty="0">
+                <a:solidFill>
+                  <a:srgbClr val="000000"/>
+                </a:solidFill>
+                <a:latin typeface="LeituraSans-Grot 2"/>
+                <a:cs typeface="LeituraSans-Grot 2"/>
+              </a:rPr>
+              <a:t>Formal Methods </a:t>
+            </a:r>
+            <a:r>
+              <a:rPr lang="en-US" sz="2000" dirty="0" smtClean="0">
+                <a:solidFill>
+                  <a:srgbClr val="000000"/>
+                </a:solidFill>
+                <a:latin typeface="LeituraSans-Grot 2"/>
+                <a:cs typeface="LeituraSans-Grot 2"/>
+              </a:rPr>
+              <a:t>2015</a:t>
+            </a:r>
+            <a:r>
+              <a:rPr lang="en-US" sz="2000" dirty="0">
+                <a:solidFill>
+                  <a:srgbClr val="000000"/>
+                </a:solidFill>
+                <a:latin typeface="LeituraSans-Grot 2"/>
+                <a:cs typeface="LeituraSans-Grot 2"/>
+              </a:rPr>
+              <a:t> </a:t>
+            </a:r>
+            <a:r>
+              <a:rPr lang="en-US" sz="2000" dirty="0" smtClean="0">
+                <a:solidFill>
+                  <a:srgbClr val="000000"/>
+                </a:solidFill>
+                <a:latin typeface="LeituraSans-Grot 2"/>
+                <a:cs typeface="LeituraSans-Grot 2"/>
+              </a:rPr>
+              <a:t>Paper: </a:t>
+            </a:r>
+            <a:r>
+              <a:rPr lang="en-US" sz="2000" dirty="0" smtClean="0">
+                <a:solidFill>
+                  <a:srgbClr val="000000"/>
+                </a:solidFill>
+                <a:latin typeface="LeituraSans-Grot 2"/>
+                <a:cs typeface="LeituraSans-Grot 2"/>
+                <a:hlinkClick r:id="rId4"/>
+              </a:rPr>
+              <a:t>http</a:t>
+            </a:r>
+            <a:r>
+              <a:rPr lang="en-US" sz="2000" dirty="0">
+                <a:solidFill>
+                  <a:srgbClr val="000000"/>
+                </a:solidFill>
+                <a:latin typeface="LeituraSans-Grot 2"/>
+                <a:cs typeface="LeituraSans-Grot 2"/>
+                <a:hlinkClick r:id="rId4"/>
+              </a:rPr>
+              <a:t>://www.cs.cmu.edu/~agroce/nfm15.</a:t>
+            </a:r>
+            <a:r>
+              <a:rPr lang="en-US" sz="2000" dirty="0" smtClean="0">
+                <a:solidFill>
+                  <a:srgbClr val="000000"/>
+                </a:solidFill>
+                <a:latin typeface="LeituraSans-Grot 2"/>
+                <a:cs typeface="LeituraSans-Grot 2"/>
+                <a:hlinkClick r:id="rId4"/>
+              </a:rPr>
+              <a:t>pdf</a:t>
+            </a:r>
+            <a:endParaRPr lang="en-US" sz="2000" dirty="0" smtClean="0">
+              <a:solidFill>
+                <a:srgbClr val="000000"/>
+              </a:solidFill>
+              <a:latin typeface="LeituraSans-Grot 2"/>
+              <a:cs typeface="LeituraSans-Grot 2"/>
+            </a:endParaRPr>
+          </a:p>
+          <a:p>
+            <a:pPr marL="571500" indent="-571500">
+              <a:buFont typeface="Arial"/>
+              <a:buChar char="•"/>
+              <a:defRPr/>
+            </a:pPr>
+            <a:endParaRPr lang="en-US" sz="2000" dirty="0" smtClean="0">
+              <a:solidFill>
+                <a:srgbClr val="000000"/>
+              </a:solidFill>
+              <a:latin typeface="LeituraSans-Grot 2"/>
+              <a:cs typeface="LeituraSans-Grot 2"/>
+            </a:endParaRPr>
+          </a:p>
+          <a:p>
+            <a:pPr marL="571500" indent="-571500">
+              <a:buFont typeface="Arial"/>
+              <a:buChar char="•"/>
+              <a:defRPr/>
+            </a:pPr>
+            <a:r>
+              <a:rPr lang="en-US" sz="2000" dirty="0" smtClean="0">
+                <a:solidFill>
+                  <a:srgbClr val="000000"/>
+                </a:solidFill>
+                <a:latin typeface="LeituraSans-Grot 2"/>
+                <a:cs typeface="LeituraSans-Grot 2"/>
+              </a:rPr>
+              <a:t>ISSTA 2015 Tool Paper, ACM Digital Library link: </a:t>
+            </a:r>
+            <a:r>
+              <a:rPr lang="en-US" sz="2000" dirty="0" smtClean="0">
+                <a:solidFill>
+                  <a:srgbClr val="000000"/>
+                </a:solidFill>
+                <a:latin typeface="LeituraSans-Grot 2"/>
+                <a:cs typeface="LeituraSans-Grot 2"/>
+                <a:hlinkClick r:id="rId5"/>
+              </a:rPr>
+              <a:t>http://dl.acm.org/citation.cfm?id=2784769</a:t>
+            </a:r>
+            <a:r>
+              <a:rPr lang="en-US" sz="2000" dirty="0" smtClean="0">
+                <a:solidFill>
+                  <a:srgbClr val="000000"/>
+                </a:solidFill>
+                <a:latin typeface="LeituraSans-Grot 2"/>
+                <a:cs typeface="LeituraSans-Grot 2"/>
+              </a:rPr>
+              <a:t/>
+            </a:r>
+            <a:br>
+              <a:rPr lang="en-US" sz="2000" dirty="0" smtClean="0">
+                <a:solidFill>
+                  <a:srgbClr val="000000"/>
+                </a:solidFill>
+                <a:latin typeface="LeituraSans-Grot 2"/>
+                <a:cs typeface="LeituraSans-Grot 2"/>
+              </a:rPr>
+            </a:br>
+            <a:endParaRPr lang="en-US" sz="2000" dirty="0" smtClean="0">
+              <a:solidFill>
+                <a:srgbClr val="000000"/>
+              </a:solidFill>
+              <a:latin typeface="LeituraSans-Grot 2"/>
+              <a:cs typeface="LeituraSans-Grot 2"/>
+            </a:endParaRPr>
+          </a:p>
+          <a:p>
+            <a:pPr marL="571500" indent="-571500">
+              <a:buFont typeface="Arial"/>
+              <a:buChar char="•"/>
+              <a:defRPr/>
+            </a:pPr>
+            <a:r>
+              <a:rPr lang="en-US" sz="2000" dirty="0" smtClean="0">
+                <a:solidFill>
+                  <a:srgbClr val="000000"/>
+                </a:solidFill>
+                <a:latin typeface="LeituraSans-Grot 2"/>
+                <a:cs typeface="LeituraSans-Grot 2"/>
+              </a:rPr>
+              <a:t>TSTL source code: </a:t>
+            </a:r>
+            <a:r>
+              <a:rPr lang="en-US" sz="2000" dirty="0" smtClean="0">
+                <a:solidFill>
+                  <a:srgbClr val="000000"/>
+                </a:solidFill>
+                <a:latin typeface="LeituraSans-Grot 2"/>
+                <a:cs typeface="LeituraSans-Grot 2"/>
+                <a:hlinkClick r:id="rId6"/>
+              </a:rPr>
+              <a:t>https:</a:t>
+            </a:r>
+            <a:r>
+              <a:rPr lang="en-US" sz="2000" dirty="0">
+                <a:solidFill>
+                  <a:srgbClr val="000000"/>
+                </a:solidFill>
+                <a:latin typeface="LeituraSans-Grot 2"/>
+                <a:cs typeface="LeituraSans-Grot 2"/>
+                <a:hlinkClick r:id="rId6"/>
+              </a:rPr>
+              <a:t>//github.com/agroce/</a:t>
+            </a:r>
+            <a:r>
+              <a:rPr lang="en-US" sz="2000" dirty="0" smtClean="0">
+                <a:solidFill>
+                  <a:srgbClr val="000000"/>
+                </a:solidFill>
+                <a:latin typeface="LeituraSans-Grot 2"/>
+                <a:cs typeface="LeituraSans-Grot 2"/>
+                <a:hlinkClick r:id="rId6"/>
+              </a:rPr>
+              <a:t>tstl</a:t>
+            </a:r>
+            <a:endParaRPr lang="en-US" sz="2000" dirty="0" smtClean="0">
+              <a:solidFill>
+                <a:srgbClr val="000000"/>
+              </a:solidFill>
+              <a:latin typeface="LeituraSans-Grot 2"/>
+              <a:cs typeface="LeituraSans-Grot 2"/>
+            </a:endParaRPr>
+          </a:p>
+          <a:p>
+            <a:pPr marL="571500" indent="-571500">
+              <a:buFont typeface="Arial"/>
+              <a:buChar char="•"/>
+              <a:defRPr/>
+            </a:pPr>
+            <a:endParaRPr lang="en-US" sz="2000" dirty="0">
+              <a:solidFill>
+                <a:srgbClr val="000000"/>
+              </a:solidFill>
+              <a:latin typeface="LeituraSans-Grot 2"/>
+              <a:cs typeface="LeituraSans-Grot 2"/>
+            </a:endParaRPr>
+          </a:p>
+          <a:p>
+            <a:pPr marL="571500" indent="-571500">
+              <a:buFont typeface="Arial"/>
+              <a:buChar char="•"/>
+              <a:defRPr/>
+            </a:pPr>
+            <a:r>
+              <a:rPr lang="en-US" sz="2000" dirty="0" smtClean="0">
+                <a:solidFill>
+                  <a:srgbClr val="000000"/>
+                </a:solidFill>
+                <a:latin typeface="LeituraSans-Grot 2"/>
+                <a:cs typeface="LeituraSans-Grot 2"/>
+              </a:rPr>
+              <a:t>TSTL </a:t>
+            </a:r>
+            <a:r>
+              <a:rPr lang="en-US" sz="2000" dirty="0">
+                <a:solidFill>
+                  <a:srgbClr val="000000"/>
+                </a:solidFill>
+                <a:latin typeface="LeituraSans-Grot 2"/>
+                <a:cs typeface="LeituraSans-Grot 2"/>
+              </a:rPr>
+              <a:t>for Java (work in progress by </a:t>
+            </a:r>
+            <a:r>
+              <a:rPr lang="en-US" sz="2000" dirty="0" err="1" smtClean="0">
+                <a:solidFill>
+                  <a:srgbClr val="000000"/>
+                </a:solidFill>
+                <a:latin typeface="LeituraSans-Grot 2"/>
+                <a:cs typeface="LeituraSans-Grot 2"/>
+              </a:rPr>
+              <a:t>flipturnapps</a:t>
+            </a:r>
+            <a:r>
+              <a:rPr lang="en-US" sz="2000" dirty="0" smtClean="0">
+                <a:solidFill>
+                  <a:srgbClr val="000000"/>
+                </a:solidFill>
+                <a:latin typeface="LeituraSans-Grot 2"/>
+                <a:cs typeface="LeituraSans-Grot 2"/>
+              </a:rPr>
+              <a:t>)</a:t>
+            </a:r>
+            <a:r>
+              <a:rPr lang="en-US" sz="2000" dirty="0" smtClean="0">
+                <a:solidFill>
+                  <a:srgbClr val="000000"/>
+                </a:solidFill>
+                <a:latin typeface="LeituraSans-Grot 2"/>
+                <a:cs typeface="LeituraSans-Grot 2"/>
+              </a:rPr>
+              <a:t>:</a:t>
+            </a:r>
+            <a:br>
+              <a:rPr lang="en-US" sz="2000" dirty="0" smtClean="0">
+                <a:solidFill>
+                  <a:srgbClr val="000000"/>
+                </a:solidFill>
+                <a:latin typeface="LeituraSans-Grot 2"/>
+                <a:cs typeface="LeituraSans-Grot 2"/>
+              </a:rPr>
+            </a:br>
+            <a:r>
+              <a:rPr lang="en-US" sz="2000" dirty="0">
+                <a:solidFill>
+                  <a:srgbClr val="000000"/>
+                </a:solidFill>
+                <a:latin typeface="LeituraSans-Grot 2"/>
+                <a:cs typeface="LeituraSans-Grot 2"/>
+                <a:hlinkClick r:id="rId7"/>
+              </a:rPr>
+              <a:t>https://github.com/flipturnapps/TSTL-Java</a:t>
+            </a:r>
+            <a:r>
+              <a:rPr lang="en-US" sz="2000" dirty="0">
+                <a:solidFill>
+                  <a:srgbClr val="000000"/>
+                </a:solidFill>
+                <a:latin typeface="LeituraSans-Grot 2"/>
+                <a:cs typeface="LeituraSans-Grot 2"/>
+              </a:rPr>
+              <a:t/>
+            </a:r>
+            <a:br>
+              <a:rPr lang="en-US" sz="2000" dirty="0">
+                <a:solidFill>
+                  <a:srgbClr val="000000"/>
+                </a:solidFill>
+                <a:latin typeface="LeituraSans-Grot 2"/>
+                <a:cs typeface="LeituraSans-Grot 2"/>
+              </a:rPr>
+            </a:br>
+            <a:endParaRPr lang="en-US" sz="2000" dirty="0" smtClean="0">
+              <a:solidFill>
+                <a:srgbClr val="000000"/>
+              </a:solidFill>
+              <a:latin typeface="LeituraSans-Grot 2"/>
+              <a:cs typeface="LeituraSans-Grot 2"/>
+            </a:endParaRPr>
+          </a:p>
+          <a:p>
+            <a:pPr marL="571500" indent="-571500">
+              <a:buFont typeface="Arial"/>
+              <a:buChar char="•"/>
+              <a:defRPr/>
+            </a:pPr>
+            <a:r>
+              <a:rPr lang="en-US" sz="2000" dirty="0" smtClean="0">
+                <a:solidFill>
+                  <a:srgbClr val="000000"/>
+                </a:solidFill>
+                <a:latin typeface="LeituraSans-Grot 2"/>
+                <a:cs typeface="LeituraSans-Grot 2"/>
+              </a:rPr>
+              <a:t>This poster’s link:</a:t>
+            </a:r>
+            <a:r>
+              <a:rPr lang="en-US" sz="2000" dirty="0">
+                <a:solidFill>
+                  <a:srgbClr val="000000"/>
+                </a:solidFill>
+                <a:latin typeface="LeituraSans-Grot 2"/>
+                <a:cs typeface="LeituraSans-Grot 2"/>
+              </a:rPr>
+              <a:t> </a:t>
+            </a:r>
+            <a:r>
+              <a:rPr lang="en-US" sz="2000" dirty="0" smtClean="0">
+                <a:solidFill>
+                  <a:srgbClr val="000000"/>
+                </a:solidFill>
+                <a:latin typeface="LeituraSans-Grot 2"/>
+                <a:cs typeface="LeituraSans-Grot 2"/>
+                <a:hlinkClick r:id="rId8"/>
+              </a:rPr>
+              <a:t>https://github.com/pramttl/pycon2016-poster-tstl</a:t>
+            </a:r>
+            <a:endParaRPr lang="en-US" sz="2000" dirty="0" smtClean="0">
+              <a:solidFill>
+                <a:srgbClr val="000000"/>
+              </a:solidFill>
+              <a:latin typeface="LeituraSans-Grot 2"/>
+              <a:cs typeface="LeituraSans-Grot 2"/>
+            </a:endParaRPr>
+          </a:p>
+        </p:txBody>
+      </p:sp>
+      <p:sp>
+        <p:nvSpPr>
+          <p:cNvPr id="15" name="TextBox 14"/>
+          <p:cNvSpPr txBox="1"/>
+          <p:nvPr/>
+        </p:nvSpPr>
+        <p:spPr>
+          <a:xfrm>
+            <a:off x="21793200" y="24003000"/>
+            <a:ext cx="9975850" cy="8771630"/>
+          </a:xfrm>
+          <a:prstGeom prst="rect">
+            <a:avLst/>
+          </a:prstGeom>
+          <a:noFill/>
+        </p:spPr>
+        <p:txBody>
+          <a:bodyPr>
+            <a:spAutoFit/>
+          </a:bodyPr>
+          <a:lstStyle/>
+          <a:p>
+            <a:pPr>
+              <a:defRPr/>
+            </a:pPr>
+            <a:r>
+              <a:rPr lang="en-US" sz="4000" dirty="0" smtClean="0">
+                <a:solidFill>
+                  <a:srgbClr val="000000"/>
+                </a:solidFill>
+                <a:latin typeface="LeituraSans-Grot 3"/>
+                <a:cs typeface="LeituraSans-Grot 3"/>
+              </a:rPr>
+              <a:t>Opportunities for TSTL Industry Adoption</a:t>
+            </a:r>
+            <a:br>
+              <a:rPr lang="en-US" sz="4000" dirty="0" smtClean="0">
+                <a:solidFill>
+                  <a:srgbClr val="000000"/>
+                </a:solidFill>
+                <a:latin typeface="LeituraSans-Grot 3"/>
+                <a:cs typeface="LeituraSans-Grot 3"/>
+              </a:rPr>
+            </a:br>
+            <a:endParaRPr lang="en-US" sz="4400" dirty="0" smtClean="0">
+              <a:solidFill>
+                <a:srgbClr val="000000"/>
+              </a:solidFill>
+              <a:latin typeface="LeituraSans-Grot 3"/>
+              <a:cs typeface="LeituraSans-Grot 3"/>
+            </a:endParaRPr>
+          </a:p>
+          <a:p>
+            <a:pPr marL="571500" indent="-571500">
+              <a:buFont typeface="Arial"/>
+              <a:buChar char="•"/>
+              <a:defRPr/>
+            </a:pPr>
+            <a:r>
+              <a:rPr lang="en-US" sz="2400" dirty="0" smtClean="0">
+                <a:solidFill>
+                  <a:srgbClr val="000000"/>
+                </a:solidFill>
+                <a:latin typeface="LeituraSans-Grot 2"/>
+                <a:cs typeface="LeituraSans-Grot 2"/>
+              </a:rPr>
+              <a:t>Game Testing: Games are often state based systems with several API calls / methods for changing state. TSTL can be very useful for testing such games.  TSTL has tested the card game Dominion.</a:t>
+            </a:r>
+          </a:p>
+          <a:p>
+            <a:pPr marL="571500" indent="-571500">
+              <a:buFont typeface="Arial"/>
+              <a:buChar char="•"/>
+              <a:defRPr/>
+            </a:pPr>
+            <a:endParaRPr lang="en-US" sz="2400" dirty="0" smtClean="0">
+              <a:solidFill>
+                <a:srgbClr val="000000"/>
+              </a:solidFill>
+              <a:latin typeface="LeituraSans-Grot 2"/>
+              <a:cs typeface="LeituraSans-Grot 2"/>
+            </a:endParaRPr>
+          </a:p>
+          <a:p>
+            <a:pPr marL="571500" indent="-571500">
+              <a:buFont typeface="Arial"/>
+              <a:buChar char="•"/>
+              <a:defRPr/>
+            </a:pPr>
+            <a:endParaRPr lang="en-US" sz="2400" dirty="0">
+              <a:solidFill>
+                <a:srgbClr val="000000"/>
+              </a:solidFill>
+              <a:latin typeface="LeituraSans-Grot 2"/>
+              <a:cs typeface="LeituraSans-Grot 2"/>
+            </a:endParaRPr>
+          </a:p>
+          <a:p>
+            <a:pPr marL="571500" indent="-571500">
+              <a:buFont typeface="Arial"/>
+              <a:buChar char="•"/>
+              <a:defRPr/>
+            </a:pPr>
+            <a:endParaRPr lang="en-US" sz="2400" dirty="0" smtClean="0">
+              <a:solidFill>
+                <a:srgbClr val="000000"/>
+              </a:solidFill>
+              <a:latin typeface="LeituraSans-Grot 2"/>
+              <a:cs typeface="LeituraSans-Grot 2"/>
+            </a:endParaRPr>
+          </a:p>
+          <a:p>
+            <a:pPr marL="571500" indent="-571500">
+              <a:buFont typeface="Arial"/>
+              <a:buChar char="•"/>
+              <a:defRPr/>
+            </a:pPr>
+            <a:endParaRPr lang="en-US" sz="2400" dirty="0">
+              <a:solidFill>
+                <a:srgbClr val="000000"/>
+              </a:solidFill>
+              <a:latin typeface="LeituraSans-Grot 2"/>
+              <a:cs typeface="LeituraSans-Grot 2"/>
+            </a:endParaRPr>
+          </a:p>
+          <a:p>
+            <a:pPr marL="571500" indent="-571500">
+              <a:buFont typeface="Arial"/>
+              <a:buChar char="•"/>
+              <a:defRPr/>
+            </a:pPr>
+            <a:endParaRPr lang="en-US" sz="2400" dirty="0" smtClean="0">
+              <a:solidFill>
+                <a:srgbClr val="000000"/>
+              </a:solidFill>
+              <a:latin typeface="LeituraSans-Grot 2"/>
+              <a:cs typeface="LeituraSans-Grot 2"/>
+            </a:endParaRPr>
+          </a:p>
+          <a:p>
+            <a:pPr marL="571500" indent="-571500">
+              <a:buFont typeface="Arial"/>
+              <a:buChar char="•"/>
+              <a:defRPr/>
+            </a:pPr>
+            <a:endParaRPr lang="en-US" sz="2400" dirty="0">
+              <a:solidFill>
+                <a:srgbClr val="000000"/>
+              </a:solidFill>
+              <a:latin typeface="LeituraSans-Grot 2"/>
+              <a:cs typeface="LeituraSans-Grot 2"/>
+            </a:endParaRPr>
+          </a:p>
+          <a:p>
+            <a:pPr>
+              <a:defRPr/>
+            </a:pPr>
+            <a:endParaRPr lang="en-US" sz="2400" dirty="0">
+              <a:solidFill>
+                <a:srgbClr val="000000"/>
+              </a:solidFill>
+              <a:latin typeface="LeituraSans-Grot 2"/>
+              <a:cs typeface="LeituraSans-Grot 2"/>
+            </a:endParaRPr>
+          </a:p>
+          <a:p>
+            <a:pPr marL="571500" indent="-571500">
+              <a:buFont typeface="Arial"/>
+              <a:buChar char="•"/>
+              <a:defRPr/>
+            </a:pPr>
+            <a:endParaRPr lang="en-US" sz="2400" dirty="0" smtClean="0">
+              <a:solidFill>
+                <a:srgbClr val="000000"/>
+              </a:solidFill>
+              <a:latin typeface="LeituraSans-Grot 2"/>
+              <a:cs typeface="LeituraSans-Grot 2"/>
+            </a:endParaRPr>
+          </a:p>
+          <a:p>
+            <a:pPr marL="571500" indent="-571500">
+              <a:buFont typeface="Arial"/>
+              <a:buChar char="•"/>
+              <a:defRPr/>
+            </a:pPr>
+            <a:r>
+              <a:rPr lang="en-US" sz="2400" dirty="0" smtClean="0">
+                <a:solidFill>
+                  <a:srgbClr val="000000"/>
+                </a:solidFill>
+                <a:latin typeface="LeituraSans-Grot 2"/>
+                <a:cs typeface="LeituraSans-Grot 2"/>
+              </a:rPr>
+              <a:t>Testing programming libraries: in use for testing </a:t>
+            </a:r>
+            <a:r>
+              <a:rPr lang="en-US" sz="2400" dirty="0" err="1" smtClean="0">
+                <a:solidFill>
+                  <a:srgbClr val="000000"/>
+                </a:solidFill>
+                <a:latin typeface="LeituraSans-Grot 2"/>
+                <a:cs typeface="LeituraSans-Grot 2"/>
+              </a:rPr>
+              <a:t>numpy</a:t>
+            </a:r>
+            <a:r>
+              <a:rPr lang="en-US" sz="2400" dirty="0" smtClean="0">
+                <a:solidFill>
+                  <a:srgbClr val="000000"/>
+                </a:solidFill>
+                <a:latin typeface="LeituraSans-Grot 2"/>
+                <a:cs typeface="LeituraSans-Grot 2"/>
+              </a:rPr>
+              <a:t>, </a:t>
+            </a:r>
+            <a:r>
+              <a:rPr lang="en-US" sz="2400" dirty="0" err="1" smtClean="0">
+                <a:solidFill>
+                  <a:srgbClr val="000000"/>
+                </a:solidFill>
+                <a:latin typeface="LeituraSans-Grot 2"/>
+                <a:cs typeface="LeituraSans-Grot 2"/>
+              </a:rPr>
+              <a:t>arcpy</a:t>
+            </a:r>
+            <a:r>
+              <a:rPr lang="en-US" sz="2400" dirty="0" smtClean="0">
+                <a:solidFill>
+                  <a:srgbClr val="000000"/>
+                </a:solidFill>
+                <a:latin typeface="LeituraSans-Grot 2"/>
+                <a:cs typeface="LeituraSans-Grot 2"/>
+              </a:rPr>
+              <a:t>, </a:t>
+            </a:r>
+            <a:r>
+              <a:rPr lang="en-US" sz="2400" dirty="0" err="1" smtClean="0">
+                <a:solidFill>
+                  <a:srgbClr val="000000"/>
+                </a:solidFill>
+                <a:latin typeface="LeituraSans-Grot 2"/>
+                <a:cs typeface="LeituraSans-Grot 2"/>
+              </a:rPr>
+              <a:t>biopython</a:t>
+            </a:r>
+            <a:r>
+              <a:rPr lang="en-US" sz="2400" dirty="0" smtClean="0">
+                <a:solidFill>
+                  <a:srgbClr val="000000"/>
+                </a:solidFill>
+                <a:latin typeface="LeituraSans-Grot 2"/>
+                <a:cs typeface="LeituraSans-Grot 2"/>
+              </a:rPr>
+              <a:t>, Z3Py, and other critical Python libraries</a:t>
+            </a:r>
+          </a:p>
+          <a:p>
+            <a:pPr marL="571500" indent="-571500">
+              <a:buFont typeface="Arial"/>
+              <a:buChar char="•"/>
+              <a:defRPr/>
+            </a:pPr>
+            <a:r>
+              <a:rPr lang="en-US" sz="2400" dirty="0" smtClean="0">
+                <a:solidFill>
+                  <a:srgbClr val="000000"/>
+                </a:solidFill>
+                <a:latin typeface="LeituraSans-Grot 2"/>
+                <a:cs typeface="LeituraSans-Grot 2"/>
+              </a:rPr>
+              <a:t>Grammar-based test generation:  TSTL can produce strings from arbitrary grammars, and call the system</a:t>
+            </a:r>
+            <a:endParaRPr lang="en-US" sz="2400" dirty="0">
+              <a:solidFill>
+                <a:srgbClr val="000000"/>
+              </a:solidFill>
+              <a:latin typeface="LeituraSans-Grot 2"/>
+              <a:cs typeface="LeituraSans-Grot 2"/>
+            </a:endParaRPr>
+          </a:p>
+          <a:p>
+            <a:pPr marL="571500" indent="-571500">
+              <a:buFont typeface="Arial"/>
+              <a:buChar char="•"/>
+              <a:defRPr/>
+            </a:pPr>
+            <a:r>
+              <a:rPr lang="en-US" sz="2400" dirty="0" smtClean="0">
+                <a:solidFill>
+                  <a:srgbClr val="000000"/>
+                </a:solidFill>
+                <a:latin typeface="LeituraSans-Grot 2"/>
+                <a:cs typeface="LeituraSans-Grot 2"/>
+              </a:rPr>
+              <a:t>Testing any state based system: many software systems in different domains are state based systems</a:t>
+            </a:r>
+          </a:p>
+          <a:p>
+            <a:pPr marL="571500" indent="-571500">
+              <a:buFont typeface="Arial"/>
+              <a:buChar char="•"/>
+              <a:defRPr/>
+            </a:pPr>
+            <a:endParaRPr lang="en-US" sz="2400" dirty="0" smtClean="0">
+              <a:solidFill>
+                <a:srgbClr val="000000"/>
+              </a:solidFill>
+              <a:latin typeface="LeituraSans-Grot 2"/>
+              <a:cs typeface="LeituraSans-Grot 2"/>
+            </a:endParaRPr>
+          </a:p>
+          <a:p>
+            <a:pPr>
+              <a:defRPr/>
+            </a:pPr>
+            <a:endParaRPr lang="en-US" sz="2400" dirty="0" smtClean="0">
+              <a:solidFill>
+                <a:srgbClr val="000000"/>
+              </a:solidFill>
+              <a:latin typeface="LeituraSans-Grot 2"/>
+              <a:cs typeface="LeituraSans-Grot 2"/>
+            </a:endParaRPr>
+          </a:p>
+          <a:p>
+            <a:pPr marL="571500" indent="-571500">
+              <a:buFont typeface="Arial"/>
+              <a:buChar char="•"/>
+              <a:defRPr/>
+            </a:pPr>
+            <a:endParaRPr lang="en-US" sz="2400" dirty="0" smtClean="0">
+              <a:solidFill>
+                <a:srgbClr val="000000"/>
+              </a:solidFill>
+              <a:latin typeface="LeituraSans-Grot 2"/>
+              <a:cs typeface="LeituraSans-Grot 2"/>
+            </a:endParaRPr>
+          </a:p>
+        </p:txBody>
+      </p:sp>
       <p:pic>
         <p:nvPicPr>
-          <p:cNvPr id="20" name="Picture 19" descr="Screen Shot 2016-05-12 at 4.23.58 PM.png"/>
+          <p:cNvPr id="2" name="Picture 1" descr="Dominion_game.jpg"/>
           <p:cNvPicPr>
             <a:picLocks noChangeAspect="1"/>
           </p:cNvPicPr>
           <p:nvPr/>
         </p:nvPicPr>
         <p:blipFill>
-          <a:blip r:embed="rId4">
+          <a:blip r:embed="rId9" cstate="print">
             <a:extLst>
               <a:ext uri="{28A0092B-C50C-407E-A947-70E740481C1C}">
                 <a14:useLocalDpi xmlns:a14="http://schemas.microsoft.com/office/drawing/2010/main" val="0"/>
@@ -6388,862 +6946,24 @@
         </p:blipFill>
         <p:spPr>
           <a:xfrm>
-            <a:off x="11582400" y="18897600"/>
-            <a:ext cx="9601200" cy="6443330"/>
+            <a:off x="25527000" y="26974800"/>
+            <a:ext cx="2133600" cy="2137876"/>
           </a:xfrm>
           <a:prstGeom prst="rect">
             <a:avLst/>
           </a:prstGeom>
         </p:spPr>
       </p:pic>
-      <p:sp>
-        <p:nvSpPr>
-          <p:cNvPr id="14" name="TextBox 13"/>
-          <p:cNvSpPr txBox="1"/>
-          <p:nvPr/>
-        </p:nvSpPr>
-        <p:spPr>
-          <a:xfrm>
-            <a:off x="21793200" y="32080200"/>
-            <a:ext cx="10058400" cy="4832092"/>
-          </a:xfrm>
-          <a:prstGeom prst="rect">
-            <a:avLst/>
-          </a:prstGeom>
-          <a:noFill/>
-        </p:spPr>
-        <p:txBody>
-          <a:bodyPr wrap="square">
-            <a:spAutoFit/>
-          </a:bodyPr>
-          <a:lstStyle/>
-          <a:p>
-            <a:pPr>
-              <a:defRPr/>
-            </a:pPr>
-            <a:r>
-              <a:rPr lang="en-US" sz="4400" dirty="0" smtClean="0">
-                <a:solidFill>
-                  <a:srgbClr val="000000"/>
-                </a:solidFill>
-                <a:latin typeface="LeituraSans-Grot 3"/>
-                <a:cs typeface="LeituraSans-Grot 3"/>
-              </a:rPr>
-              <a:t>Links</a:t>
-            </a:r>
-            <a:endParaRPr lang="en-US" sz="2400" dirty="0" smtClean="0">
-              <a:solidFill>
-                <a:srgbClr val="000000"/>
-              </a:solidFill>
-              <a:latin typeface="LeituraSans-Grot 2"/>
-              <a:cs typeface="LeituraSans-Grot 2"/>
-            </a:endParaRPr>
-          </a:p>
-          <a:p>
-            <a:pPr marL="571500" indent="-571500">
-              <a:buFont typeface="Arial"/>
-              <a:buChar char="•"/>
-              <a:defRPr/>
-            </a:pPr>
-            <a:endParaRPr lang="en-US" sz="2400" dirty="0" smtClean="0">
-              <a:solidFill>
-                <a:srgbClr val="000000"/>
-              </a:solidFill>
-              <a:latin typeface="LeituraSans-Grot 2"/>
-              <a:cs typeface="LeituraSans-Grot 2"/>
-            </a:endParaRPr>
-          </a:p>
-          <a:p>
-            <a:pPr marL="571500" indent="-571500">
-              <a:buFont typeface="Arial"/>
-              <a:buChar char="•"/>
-              <a:defRPr/>
-            </a:pPr>
-            <a:r>
-              <a:rPr lang="en-US" sz="2400" dirty="0" smtClean="0">
-                <a:solidFill>
-                  <a:srgbClr val="000000"/>
-                </a:solidFill>
-                <a:latin typeface="LeituraSans-Grot 2"/>
-                <a:cs typeface="LeituraSans-Grot 2"/>
-              </a:rPr>
-              <a:t>NASA </a:t>
-            </a:r>
-            <a:r>
-              <a:rPr lang="en-US" sz="2400" dirty="0">
-                <a:solidFill>
-                  <a:srgbClr val="000000"/>
-                </a:solidFill>
-                <a:latin typeface="LeituraSans-Grot 2"/>
-                <a:cs typeface="LeituraSans-Grot 2"/>
-              </a:rPr>
-              <a:t>Formal Methods </a:t>
-            </a:r>
-            <a:r>
-              <a:rPr lang="en-US" sz="2400" dirty="0" smtClean="0">
-                <a:solidFill>
-                  <a:srgbClr val="000000"/>
-                </a:solidFill>
-                <a:latin typeface="LeituraSans-Grot 2"/>
-                <a:cs typeface="LeituraSans-Grot 2"/>
-              </a:rPr>
-              <a:t>2015</a:t>
-            </a:r>
-            <a:r>
-              <a:rPr lang="en-US" sz="2400" dirty="0">
-                <a:solidFill>
-                  <a:srgbClr val="000000"/>
-                </a:solidFill>
-                <a:latin typeface="LeituraSans-Grot 2"/>
-                <a:cs typeface="LeituraSans-Grot 2"/>
-              </a:rPr>
-              <a:t> </a:t>
-            </a:r>
-            <a:r>
-              <a:rPr lang="en-US" sz="2400" dirty="0" smtClean="0">
-                <a:solidFill>
-                  <a:srgbClr val="000000"/>
-                </a:solidFill>
-                <a:latin typeface="LeituraSans-Grot 2"/>
-                <a:cs typeface="LeituraSans-Grot 2"/>
-              </a:rPr>
-              <a:t>Paper </a:t>
-            </a:r>
-            <a:r>
-              <a:rPr lang="en-US" sz="2400" dirty="0" smtClean="0">
-                <a:solidFill>
-                  <a:srgbClr val="000000"/>
-                </a:solidFill>
-                <a:latin typeface="LeituraSans-Grot 2"/>
-                <a:cs typeface="LeituraSans-Grot 2"/>
-                <a:hlinkClick r:id="rId5"/>
-              </a:rPr>
-              <a:t>http</a:t>
-            </a:r>
-            <a:r>
-              <a:rPr lang="en-US" sz="2400" dirty="0">
-                <a:solidFill>
-                  <a:srgbClr val="000000"/>
-                </a:solidFill>
-                <a:latin typeface="LeituraSans-Grot 2"/>
-                <a:cs typeface="LeituraSans-Grot 2"/>
-                <a:hlinkClick r:id="rId5"/>
-              </a:rPr>
-              <a:t>://www.cs.cmu.edu/~agroce/nfm15.</a:t>
-            </a:r>
-            <a:r>
-              <a:rPr lang="en-US" sz="2400" dirty="0" smtClean="0">
-                <a:solidFill>
-                  <a:srgbClr val="000000"/>
-                </a:solidFill>
-                <a:latin typeface="LeituraSans-Grot 2"/>
-                <a:cs typeface="LeituraSans-Grot 2"/>
-                <a:hlinkClick r:id="rId5"/>
-              </a:rPr>
-              <a:t>pdf</a:t>
-            </a:r>
-            <a:endParaRPr lang="en-US" sz="2400" dirty="0" smtClean="0">
-              <a:solidFill>
-                <a:srgbClr val="000000"/>
-              </a:solidFill>
-              <a:latin typeface="LeituraSans-Grot 2"/>
-              <a:cs typeface="LeituraSans-Grot 2"/>
-            </a:endParaRPr>
-          </a:p>
-          <a:p>
-            <a:pPr marL="571500" indent="-571500">
-              <a:buFont typeface="Arial"/>
-              <a:buChar char="•"/>
-              <a:defRPr/>
-            </a:pPr>
-            <a:endParaRPr lang="en-US" sz="2400" dirty="0" smtClean="0">
-              <a:solidFill>
-                <a:srgbClr val="000000"/>
-              </a:solidFill>
-              <a:latin typeface="LeituraSans-Grot 2"/>
-              <a:cs typeface="LeituraSans-Grot 2"/>
-            </a:endParaRPr>
-          </a:p>
-          <a:p>
-            <a:pPr marL="571500" indent="-571500">
-              <a:buFont typeface="Arial"/>
-              <a:buChar char="•"/>
-              <a:defRPr/>
-            </a:pPr>
-            <a:r>
-              <a:rPr lang="en-US" sz="2400" dirty="0" smtClean="0">
-                <a:solidFill>
-                  <a:srgbClr val="000000"/>
-                </a:solidFill>
-                <a:latin typeface="LeituraSans-Grot 2"/>
-                <a:cs typeface="LeituraSans-Grot 2"/>
-              </a:rPr>
-              <a:t>ISSTA </a:t>
-            </a:r>
-            <a:r>
-              <a:rPr lang="en-US" sz="2400" dirty="0" smtClean="0">
-                <a:solidFill>
-                  <a:srgbClr val="000000"/>
-                </a:solidFill>
-                <a:latin typeface="LeituraSans-Grot 2"/>
-                <a:cs typeface="LeituraSans-Grot 2"/>
-              </a:rPr>
-              <a:t>2015 Tool Paper, </a:t>
-            </a:r>
-            <a:r>
-              <a:rPr lang="en-US" sz="2400" dirty="0" smtClean="0">
-                <a:solidFill>
-                  <a:srgbClr val="000000"/>
-                </a:solidFill>
-                <a:latin typeface="LeituraSans-Grot 2"/>
-                <a:cs typeface="LeituraSans-Grot 2"/>
-              </a:rPr>
-              <a:t>ACM Digital Library link: </a:t>
-            </a:r>
-            <a:r>
-              <a:rPr lang="en-US" sz="2400" dirty="0" smtClean="0">
-                <a:solidFill>
-                  <a:srgbClr val="000000"/>
-                </a:solidFill>
-                <a:latin typeface="LeituraSans-Grot 2"/>
-                <a:cs typeface="LeituraSans-Grot 2"/>
-                <a:hlinkClick r:id="rId6"/>
-              </a:rPr>
-              <a:t>http</a:t>
-            </a:r>
-            <a:r>
-              <a:rPr lang="en-US" sz="2400" dirty="0">
-                <a:solidFill>
-                  <a:srgbClr val="000000"/>
-                </a:solidFill>
-                <a:latin typeface="LeituraSans-Grot 2"/>
-                <a:cs typeface="LeituraSans-Grot 2"/>
-                <a:hlinkClick r:id="rId6"/>
-              </a:rPr>
-              <a:t>://dl.acm.org/citation.cfm?id=</a:t>
-            </a:r>
-            <a:r>
-              <a:rPr lang="en-US" sz="2400" dirty="0" smtClean="0">
-                <a:solidFill>
-                  <a:srgbClr val="000000"/>
-                </a:solidFill>
-                <a:latin typeface="LeituraSans-Grot 2"/>
-                <a:cs typeface="LeituraSans-Grot 2"/>
-                <a:hlinkClick r:id="rId6"/>
-              </a:rPr>
-              <a:t>2784769</a:t>
-            </a:r>
-            <a:endParaRPr lang="en-US" sz="2400" dirty="0" smtClean="0">
-              <a:solidFill>
-                <a:srgbClr val="000000"/>
-              </a:solidFill>
-              <a:latin typeface="LeituraSans-Grot 2"/>
-              <a:cs typeface="LeituraSans-Grot 2"/>
-            </a:endParaRPr>
-          </a:p>
-          <a:p>
-            <a:pPr marL="571500" indent="-571500">
-              <a:buFont typeface="Arial"/>
-              <a:buChar char="•"/>
-              <a:defRPr/>
-            </a:pPr>
-            <a:endParaRPr lang="en-US" sz="2400" dirty="0" smtClean="0">
-              <a:solidFill>
-                <a:srgbClr val="000000"/>
-              </a:solidFill>
-              <a:latin typeface="LeituraSans-Grot 2"/>
-              <a:cs typeface="LeituraSans-Grot 2"/>
-            </a:endParaRPr>
-          </a:p>
-          <a:p>
-            <a:pPr marL="571500" indent="-571500">
-              <a:buFont typeface="Arial"/>
-              <a:buChar char="•"/>
-              <a:defRPr/>
-            </a:pPr>
-            <a:r>
-              <a:rPr lang="en-US" sz="2400" dirty="0">
-                <a:solidFill>
-                  <a:srgbClr val="000000"/>
-                </a:solidFill>
-                <a:latin typeface="LeituraSans-Grot 2"/>
-                <a:cs typeface="LeituraSans-Grot 2"/>
-              </a:rPr>
-              <a:t>TSTL for Java (work in progress by </a:t>
-            </a:r>
-            <a:r>
-              <a:rPr lang="en-US" sz="2400" dirty="0" err="1" smtClean="0">
-                <a:solidFill>
-                  <a:srgbClr val="000000"/>
-                </a:solidFill>
-                <a:latin typeface="LeituraSans-Grot 2"/>
-                <a:cs typeface="LeituraSans-Grot 2"/>
-              </a:rPr>
-              <a:t>flipturnapps</a:t>
-            </a:r>
-            <a:r>
-              <a:rPr lang="en-US" sz="2400" dirty="0" smtClean="0">
-                <a:solidFill>
-                  <a:srgbClr val="000000"/>
-                </a:solidFill>
-                <a:latin typeface="LeituraSans-Grot 2"/>
-                <a:cs typeface="LeituraSans-Grot 2"/>
-              </a:rPr>
-              <a:t>)</a:t>
-            </a:r>
-            <a:r>
-              <a:rPr lang="en-US" sz="2400" dirty="0">
-                <a:solidFill>
-                  <a:srgbClr val="000000"/>
-                </a:solidFill>
-                <a:latin typeface="LeituraSans-Grot 2"/>
-                <a:cs typeface="LeituraSans-Grot 2"/>
-              </a:rPr>
-              <a:t>: </a:t>
-            </a:r>
-            <a:r>
-              <a:rPr lang="en-US" sz="2400" dirty="0">
-                <a:solidFill>
-                  <a:srgbClr val="000000"/>
-                </a:solidFill>
-                <a:latin typeface="LeituraSans-Grot 2"/>
-                <a:cs typeface="LeituraSans-Grot 2"/>
-                <a:hlinkClick r:id="rId7"/>
-              </a:rPr>
-              <a:t>https://github.com/flipturnapps/TSTL-Java</a:t>
-            </a:r>
-            <a:endParaRPr lang="en-US" sz="2400" dirty="0">
-              <a:solidFill>
-                <a:srgbClr val="000000"/>
-              </a:solidFill>
-              <a:latin typeface="LeituraSans-Grot 2"/>
-              <a:cs typeface="LeituraSans-Grot 2"/>
-            </a:endParaRPr>
-          </a:p>
-          <a:p>
-            <a:pPr marL="571500" indent="-571500">
-              <a:buFont typeface="Arial"/>
-              <a:buChar char="•"/>
-              <a:defRPr/>
-            </a:pPr>
-            <a:endParaRPr lang="en-US" sz="2400" dirty="0" smtClean="0">
-              <a:solidFill>
-                <a:srgbClr val="000000"/>
-              </a:solidFill>
-              <a:latin typeface="LeituraSans-Grot 2"/>
-              <a:cs typeface="LeituraSans-Grot 2"/>
-            </a:endParaRPr>
-          </a:p>
-          <a:p>
-            <a:pPr>
-              <a:defRPr/>
-            </a:pPr>
-            <a:endParaRPr lang="en-US" sz="2400" dirty="0" smtClean="0">
-              <a:solidFill>
-                <a:srgbClr val="000000"/>
-              </a:solidFill>
-              <a:latin typeface="LeituraSans-Grot 2"/>
-              <a:cs typeface="LeituraSans-Grot 2"/>
-            </a:endParaRPr>
-          </a:p>
-        </p:txBody>
-      </p:sp>
-      <p:sp>
-        <p:nvSpPr>
-          <p:cNvPr id="15" name="TextBox 14"/>
-          <p:cNvSpPr txBox="1"/>
-          <p:nvPr/>
-        </p:nvSpPr>
-        <p:spPr>
-          <a:xfrm>
-            <a:off x="21793200" y="24003000"/>
-            <a:ext cx="9975850" cy="8771630"/>
-          </a:xfrm>
-          <a:prstGeom prst="rect">
-            <a:avLst/>
-          </a:prstGeom>
-          <a:noFill/>
-        </p:spPr>
-        <p:txBody>
-          <a:bodyPr>
-            <a:spAutoFit/>
-          </a:bodyPr>
-          <a:lstStyle/>
-          <a:p>
-            <a:pPr>
-              <a:defRPr/>
-            </a:pPr>
-            <a:r>
-              <a:rPr lang="en-US" sz="4000" dirty="0" smtClean="0">
-                <a:solidFill>
-                  <a:srgbClr val="000000"/>
-                </a:solidFill>
-                <a:latin typeface="LeituraSans-Grot 3"/>
-                <a:cs typeface="LeituraSans-Grot 3"/>
-              </a:rPr>
-              <a:t>Opportunities for TSTL </a:t>
-            </a:r>
-            <a:r>
-              <a:rPr lang="en-US" sz="4000" dirty="0" smtClean="0">
-                <a:solidFill>
-                  <a:srgbClr val="000000"/>
-                </a:solidFill>
-                <a:latin typeface="LeituraSans-Grot 3"/>
-                <a:cs typeface="LeituraSans-Grot 3"/>
-              </a:rPr>
-              <a:t>Industry </a:t>
-            </a:r>
-            <a:r>
-              <a:rPr lang="en-US" sz="4000" dirty="0" smtClean="0">
-                <a:solidFill>
-                  <a:srgbClr val="000000"/>
-                </a:solidFill>
-                <a:latin typeface="LeituraSans-Grot 3"/>
-                <a:cs typeface="LeituraSans-Grot 3"/>
-              </a:rPr>
-              <a:t>A</a:t>
-            </a:r>
-            <a:r>
-              <a:rPr lang="en-US" sz="4000" dirty="0" smtClean="0">
-                <a:solidFill>
-                  <a:srgbClr val="000000"/>
-                </a:solidFill>
-                <a:latin typeface="LeituraSans-Grot 3"/>
-                <a:cs typeface="LeituraSans-Grot 3"/>
-              </a:rPr>
-              <a:t>doption</a:t>
-            </a:r>
-            <a:r>
-              <a:rPr lang="en-US" sz="4000" dirty="0" smtClean="0">
-                <a:solidFill>
-                  <a:srgbClr val="000000"/>
-                </a:solidFill>
-                <a:latin typeface="LeituraSans-Grot 3"/>
-                <a:cs typeface="LeituraSans-Grot 3"/>
-              </a:rPr>
-              <a:t/>
-            </a:r>
-            <a:br>
-              <a:rPr lang="en-US" sz="4000" dirty="0" smtClean="0">
-                <a:solidFill>
-                  <a:srgbClr val="000000"/>
-                </a:solidFill>
-                <a:latin typeface="LeituraSans-Grot 3"/>
-                <a:cs typeface="LeituraSans-Grot 3"/>
-              </a:rPr>
-            </a:br>
-            <a:endParaRPr lang="en-US" sz="4400" dirty="0" smtClean="0">
-              <a:solidFill>
-                <a:srgbClr val="000000"/>
-              </a:solidFill>
-              <a:latin typeface="LeituraSans-Grot 3"/>
-              <a:cs typeface="LeituraSans-Grot 3"/>
-            </a:endParaRPr>
-          </a:p>
-          <a:p>
-            <a:pPr marL="571500" indent="-571500">
-              <a:buFont typeface="Arial"/>
-              <a:buChar char="•"/>
-              <a:defRPr/>
-            </a:pPr>
-            <a:r>
-              <a:rPr lang="en-US" sz="2400" dirty="0" smtClean="0">
-                <a:solidFill>
-                  <a:srgbClr val="000000"/>
-                </a:solidFill>
-                <a:latin typeface="LeituraSans-Grot 2"/>
-                <a:cs typeface="LeituraSans-Grot 2"/>
-              </a:rPr>
-              <a:t>Game Testing: Games are often state based systems with several API calls / </a:t>
-            </a:r>
-            <a:r>
-              <a:rPr lang="en-US" sz="2400" dirty="0" smtClean="0">
-                <a:solidFill>
-                  <a:srgbClr val="000000"/>
-                </a:solidFill>
-                <a:latin typeface="LeituraSans-Grot 2"/>
-                <a:cs typeface="LeituraSans-Grot 2"/>
-              </a:rPr>
-              <a:t>methods for changing state. </a:t>
-            </a:r>
-            <a:r>
-              <a:rPr lang="en-US" sz="2400" dirty="0" smtClean="0">
-                <a:solidFill>
-                  <a:srgbClr val="000000"/>
-                </a:solidFill>
-                <a:latin typeface="LeituraSans-Grot 2"/>
-                <a:cs typeface="LeituraSans-Grot 2"/>
-              </a:rPr>
-              <a:t>TSTL can be very useful for testing such </a:t>
-            </a:r>
-            <a:r>
-              <a:rPr lang="en-US" sz="2400" dirty="0" smtClean="0">
-                <a:solidFill>
-                  <a:srgbClr val="000000"/>
-                </a:solidFill>
-                <a:latin typeface="LeituraSans-Grot 2"/>
-                <a:cs typeface="LeituraSans-Grot 2"/>
-              </a:rPr>
-              <a:t>games.  TSTL has tested the card game Dominion</a:t>
-            </a:r>
-            <a:r>
-              <a:rPr lang="en-US" sz="2400" dirty="0" smtClean="0">
-                <a:solidFill>
-                  <a:srgbClr val="000000"/>
-                </a:solidFill>
-                <a:latin typeface="LeituraSans-Grot 2"/>
-                <a:cs typeface="LeituraSans-Grot 2"/>
-              </a:rPr>
-              <a:t>.</a:t>
-            </a:r>
-          </a:p>
-          <a:p>
-            <a:pPr marL="571500" indent="-571500">
-              <a:buFont typeface="Arial"/>
-              <a:buChar char="•"/>
-              <a:defRPr/>
-            </a:pPr>
-            <a:endParaRPr lang="en-US" sz="2400" dirty="0" smtClean="0">
-              <a:solidFill>
-                <a:srgbClr val="000000"/>
-              </a:solidFill>
-              <a:latin typeface="LeituraSans-Grot 2"/>
-              <a:cs typeface="LeituraSans-Grot 2"/>
-            </a:endParaRPr>
-          </a:p>
-          <a:p>
-            <a:pPr marL="571500" indent="-571500">
-              <a:buFont typeface="Arial"/>
-              <a:buChar char="•"/>
-              <a:defRPr/>
-            </a:pPr>
-            <a:endParaRPr lang="en-US" sz="2400" dirty="0">
-              <a:solidFill>
-                <a:srgbClr val="000000"/>
-              </a:solidFill>
-              <a:latin typeface="LeituraSans-Grot 2"/>
-              <a:cs typeface="LeituraSans-Grot 2"/>
-            </a:endParaRPr>
-          </a:p>
-          <a:p>
-            <a:pPr marL="571500" indent="-571500">
-              <a:buFont typeface="Arial"/>
-              <a:buChar char="•"/>
-              <a:defRPr/>
-            </a:pPr>
-            <a:endParaRPr lang="en-US" sz="2400" dirty="0" smtClean="0">
-              <a:solidFill>
-                <a:srgbClr val="000000"/>
-              </a:solidFill>
-              <a:latin typeface="LeituraSans-Grot 2"/>
-              <a:cs typeface="LeituraSans-Grot 2"/>
-            </a:endParaRPr>
-          </a:p>
-          <a:p>
-            <a:pPr marL="571500" indent="-571500">
-              <a:buFont typeface="Arial"/>
-              <a:buChar char="•"/>
-              <a:defRPr/>
-            </a:pPr>
-            <a:endParaRPr lang="en-US" sz="2400" dirty="0">
-              <a:solidFill>
-                <a:srgbClr val="000000"/>
-              </a:solidFill>
-              <a:latin typeface="LeituraSans-Grot 2"/>
-              <a:cs typeface="LeituraSans-Grot 2"/>
-            </a:endParaRPr>
-          </a:p>
-          <a:p>
-            <a:pPr marL="571500" indent="-571500">
-              <a:buFont typeface="Arial"/>
-              <a:buChar char="•"/>
-              <a:defRPr/>
-            </a:pPr>
-            <a:endParaRPr lang="en-US" sz="2400" dirty="0" smtClean="0">
-              <a:solidFill>
-                <a:srgbClr val="000000"/>
-              </a:solidFill>
-              <a:latin typeface="LeituraSans-Grot 2"/>
-              <a:cs typeface="LeituraSans-Grot 2"/>
-            </a:endParaRPr>
-          </a:p>
-          <a:p>
-            <a:pPr marL="571500" indent="-571500">
-              <a:buFont typeface="Arial"/>
-              <a:buChar char="•"/>
-              <a:defRPr/>
-            </a:pPr>
-            <a:endParaRPr lang="en-US" sz="2400" dirty="0">
-              <a:solidFill>
-                <a:srgbClr val="000000"/>
-              </a:solidFill>
-              <a:latin typeface="LeituraSans-Grot 2"/>
-              <a:cs typeface="LeituraSans-Grot 2"/>
-            </a:endParaRPr>
-          </a:p>
-          <a:p>
-            <a:pPr>
-              <a:defRPr/>
-            </a:pPr>
-            <a:endParaRPr lang="en-US" sz="2400" dirty="0">
-              <a:solidFill>
-                <a:srgbClr val="000000"/>
-              </a:solidFill>
-              <a:latin typeface="LeituraSans-Grot 2"/>
-              <a:cs typeface="LeituraSans-Grot 2"/>
-            </a:endParaRPr>
-          </a:p>
-          <a:p>
-            <a:pPr marL="571500" indent="-571500">
-              <a:buFont typeface="Arial"/>
-              <a:buChar char="•"/>
-              <a:defRPr/>
-            </a:pPr>
-            <a:endParaRPr lang="en-US" sz="2400" dirty="0" smtClean="0">
-              <a:solidFill>
-                <a:srgbClr val="000000"/>
-              </a:solidFill>
-              <a:latin typeface="LeituraSans-Grot 2"/>
-              <a:cs typeface="LeituraSans-Grot 2"/>
-            </a:endParaRPr>
-          </a:p>
-          <a:p>
-            <a:pPr marL="571500" indent="-571500">
-              <a:buFont typeface="Arial"/>
-              <a:buChar char="•"/>
-              <a:defRPr/>
-            </a:pPr>
-            <a:r>
-              <a:rPr lang="en-US" sz="2400" dirty="0" smtClean="0">
-                <a:solidFill>
-                  <a:srgbClr val="000000"/>
-                </a:solidFill>
-                <a:latin typeface="LeituraSans-Grot 2"/>
-                <a:cs typeface="LeituraSans-Grot 2"/>
-              </a:rPr>
-              <a:t>Testing </a:t>
-            </a:r>
-            <a:r>
-              <a:rPr lang="en-US" sz="2400" dirty="0" smtClean="0">
-                <a:solidFill>
-                  <a:srgbClr val="000000"/>
-                </a:solidFill>
-                <a:latin typeface="LeituraSans-Grot 2"/>
-                <a:cs typeface="LeituraSans-Grot 2"/>
-              </a:rPr>
-              <a:t>programming libraries: </a:t>
-            </a:r>
-            <a:r>
-              <a:rPr lang="en-US" sz="2400" dirty="0" smtClean="0">
-                <a:solidFill>
-                  <a:srgbClr val="000000"/>
-                </a:solidFill>
-                <a:latin typeface="LeituraSans-Grot 2"/>
-                <a:cs typeface="LeituraSans-Grot 2"/>
-              </a:rPr>
-              <a:t>in use for testing </a:t>
-            </a:r>
-            <a:r>
-              <a:rPr lang="en-US" sz="2400" dirty="0" err="1" smtClean="0">
-                <a:solidFill>
-                  <a:srgbClr val="000000"/>
-                </a:solidFill>
-                <a:latin typeface="LeituraSans-Grot 2"/>
-                <a:cs typeface="LeituraSans-Grot 2"/>
-              </a:rPr>
-              <a:t>numpy</a:t>
-            </a:r>
-            <a:r>
-              <a:rPr lang="en-US" sz="2400" dirty="0" smtClean="0">
-                <a:solidFill>
-                  <a:srgbClr val="000000"/>
-                </a:solidFill>
-                <a:latin typeface="LeituraSans-Grot 2"/>
-                <a:cs typeface="LeituraSans-Grot 2"/>
-              </a:rPr>
-              <a:t>, </a:t>
-            </a:r>
-            <a:r>
-              <a:rPr lang="en-US" sz="2400" dirty="0" err="1" smtClean="0">
-                <a:solidFill>
-                  <a:srgbClr val="000000"/>
-                </a:solidFill>
-                <a:latin typeface="LeituraSans-Grot 2"/>
-                <a:cs typeface="LeituraSans-Grot 2"/>
-              </a:rPr>
-              <a:t>arcpy</a:t>
-            </a:r>
-            <a:r>
-              <a:rPr lang="en-US" sz="2400" dirty="0" smtClean="0">
-                <a:solidFill>
-                  <a:srgbClr val="000000"/>
-                </a:solidFill>
-                <a:latin typeface="LeituraSans-Grot 2"/>
-                <a:cs typeface="LeituraSans-Grot 2"/>
-              </a:rPr>
-              <a:t>, </a:t>
-            </a:r>
-            <a:r>
-              <a:rPr lang="en-US" sz="2400" dirty="0" err="1" smtClean="0">
-                <a:solidFill>
-                  <a:srgbClr val="000000"/>
-                </a:solidFill>
-                <a:latin typeface="LeituraSans-Grot 2"/>
-                <a:cs typeface="LeituraSans-Grot 2"/>
-              </a:rPr>
-              <a:t>biopython</a:t>
-            </a:r>
-            <a:r>
-              <a:rPr lang="en-US" sz="2400" dirty="0" smtClean="0">
-                <a:solidFill>
-                  <a:srgbClr val="000000"/>
-                </a:solidFill>
-                <a:latin typeface="LeituraSans-Grot 2"/>
-                <a:cs typeface="LeituraSans-Grot 2"/>
-              </a:rPr>
-              <a:t>, Z3Py, and other critical Python libraries</a:t>
-            </a:r>
-          </a:p>
-          <a:p>
-            <a:pPr marL="571500" indent="-571500">
-              <a:buFont typeface="Arial"/>
-              <a:buChar char="•"/>
-              <a:defRPr/>
-            </a:pPr>
-            <a:r>
-              <a:rPr lang="en-US" sz="2400" dirty="0" smtClean="0">
-                <a:solidFill>
-                  <a:srgbClr val="000000"/>
-                </a:solidFill>
-                <a:latin typeface="LeituraSans-Grot 2"/>
-                <a:cs typeface="LeituraSans-Grot 2"/>
-              </a:rPr>
-              <a:t>Grammar-based test generation:  TSTL can produce strings from arbitrary grammars, and call the system</a:t>
-            </a:r>
-            <a:endParaRPr lang="en-US" sz="2400" dirty="0">
-              <a:solidFill>
-                <a:srgbClr val="000000"/>
-              </a:solidFill>
-              <a:latin typeface="LeituraSans-Grot 2"/>
-              <a:cs typeface="LeituraSans-Grot 2"/>
-            </a:endParaRPr>
-          </a:p>
-          <a:p>
-            <a:pPr marL="571500" indent="-571500">
-              <a:buFont typeface="Arial"/>
-              <a:buChar char="•"/>
-              <a:defRPr/>
-            </a:pPr>
-            <a:r>
-              <a:rPr lang="en-US" sz="2400" dirty="0" smtClean="0">
-                <a:solidFill>
-                  <a:srgbClr val="000000"/>
-                </a:solidFill>
-                <a:latin typeface="LeituraSans-Grot 2"/>
-                <a:cs typeface="LeituraSans-Grot 2"/>
-              </a:rPr>
-              <a:t>Testing </a:t>
-            </a:r>
-            <a:r>
-              <a:rPr lang="en-US" sz="2400" dirty="0" smtClean="0">
-                <a:solidFill>
-                  <a:srgbClr val="000000"/>
-                </a:solidFill>
-                <a:latin typeface="LeituraSans-Grot 2"/>
-                <a:cs typeface="LeituraSans-Grot 2"/>
-              </a:rPr>
-              <a:t>any state based </a:t>
-            </a:r>
-            <a:r>
-              <a:rPr lang="en-US" sz="2400" dirty="0" smtClean="0">
-                <a:solidFill>
-                  <a:srgbClr val="000000"/>
-                </a:solidFill>
-                <a:latin typeface="LeituraSans-Grot 2"/>
-                <a:cs typeface="LeituraSans-Grot 2"/>
-              </a:rPr>
-              <a:t>system: many </a:t>
-            </a:r>
-            <a:r>
-              <a:rPr lang="en-US" sz="2400" dirty="0" smtClean="0">
-                <a:solidFill>
-                  <a:srgbClr val="000000"/>
-                </a:solidFill>
-                <a:latin typeface="LeituraSans-Grot 2"/>
-                <a:cs typeface="LeituraSans-Grot 2"/>
-              </a:rPr>
-              <a:t>software systems in different domains are state based </a:t>
-            </a:r>
-            <a:r>
-              <a:rPr lang="en-US" sz="2400" dirty="0" smtClean="0">
-                <a:solidFill>
-                  <a:srgbClr val="000000"/>
-                </a:solidFill>
-                <a:latin typeface="LeituraSans-Grot 2"/>
-                <a:cs typeface="LeituraSans-Grot 2"/>
-              </a:rPr>
-              <a:t>systems</a:t>
-            </a:r>
-            <a:endParaRPr lang="en-US" sz="2400" dirty="0" smtClean="0">
-              <a:solidFill>
-                <a:srgbClr val="000000"/>
-              </a:solidFill>
-              <a:latin typeface="LeituraSans-Grot 2"/>
-              <a:cs typeface="LeituraSans-Grot 2"/>
-            </a:endParaRPr>
-          </a:p>
-          <a:p>
-            <a:pPr marL="571500" indent="-571500">
-              <a:buFont typeface="Arial"/>
-              <a:buChar char="•"/>
-              <a:defRPr/>
-            </a:pPr>
-            <a:endParaRPr lang="en-US" sz="2400" dirty="0" smtClean="0">
-              <a:solidFill>
-                <a:srgbClr val="000000"/>
-              </a:solidFill>
-              <a:latin typeface="LeituraSans-Grot 2"/>
-              <a:cs typeface="LeituraSans-Grot 2"/>
-            </a:endParaRPr>
-          </a:p>
-          <a:p>
-            <a:pPr>
-              <a:defRPr/>
-            </a:pPr>
-            <a:endParaRPr lang="en-US" sz="2400" dirty="0" smtClean="0">
-              <a:solidFill>
-                <a:srgbClr val="000000"/>
-              </a:solidFill>
-              <a:latin typeface="LeituraSans-Grot 2"/>
-              <a:cs typeface="LeituraSans-Grot 2"/>
-            </a:endParaRPr>
-          </a:p>
-          <a:p>
-            <a:pPr marL="571500" indent="-571500">
-              <a:buFont typeface="Arial"/>
-              <a:buChar char="•"/>
-              <a:defRPr/>
-            </a:pPr>
-            <a:endParaRPr lang="en-US" sz="2400" dirty="0" smtClean="0">
-              <a:solidFill>
-                <a:srgbClr val="000000"/>
-              </a:solidFill>
-              <a:latin typeface="LeituraSans-Grot 2"/>
-              <a:cs typeface="LeituraSans-Grot 2"/>
-            </a:endParaRPr>
-          </a:p>
-        </p:txBody>
-      </p:sp>
       <p:pic>
         <p:nvPicPr>
-          <p:cNvPr id="2" name="Picture 1" descr="Dominion_game.jpg"/>
+          <p:cNvPr id="3" name="Picture 2" descr="Screen Shot 2016-05-15 at 2.55.43 PM.png"/>
           <p:cNvPicPr>
             <a:picLocks noChangeAspect="1"/>
           </p:cNvPicPr>
           <p:nvPr/>
         </p:nvPicPr>
         <p:blipFill>
-          <a:blip r:embed="rId8" cstate="print">
+          <a:blip r:embed="rId10">
             <a:extLst>
               <a:ext uri="{28A0092B-C50C-407E-A947-70E740481C1C}">
                 <a14:useLocalDpi xmlns:a14="http://schemas.microsoft.com/office/drawing/2010/main" val="0"/>
@@ -7256,8 +6976,8 @@
         </p:blipFill>
         <p:spPr>
           <a:xfrm>
-            <a:off x="25527000" y="26974800"/>
-            <a:ext cx="2133600" cy="2137876"/>
+            <a:off x="11582400" y="19050000"/>
+            <a:ext cx="9525000" cy="6365875"/>
           </a:xfrm>
           <a:prstGeom prst="rect">
             <a:avLst/>

</xml_diff>

<commit_message>
Addition to contributors section
</commit_message>
<xml_diff>
--- a/pycon-poster.pptx
+++ b/pycon-poster.pptx
@@ -5703,7 +5703,7 @@
         <p:spPr>
           <a:xfrm>
             <a:off x="1524000" y="39281100"/>
-            <a:ext cx="7620000" cy="2705100"/>
+            <a:ext cx="7696200" cy="2705100"/>
           </a:xfrm>
           <a:prstGeom prst="rect">
             <a:avLst/>
@@ -5751,8 +5751,8 @@
         </p:nvSpPr>
         <p:spPr bwMode="auto">
           <a:xfrm>
-            <a:off x="1752600" y="39700200"/>
-            <a:ext cx="7239000" cy="1938992"/>
+            <a:off x="1752600" y="39471600"/>
+            <a:ext cx="7239000" cy="2308324"/>
           </a:xfrm>
           <a:prstGeom prst="rect">
             <a:avLst/>
@@ -5903,7 +5903,27 @@
                 <a:latin typeface="LeituraSans-Grot 3" charset="0"/>
                 <a:cs typeface="LeituraSans-Grot 3" charset="0"/>
               </a:rPr>
-              <a:t>TSTL Team / Contributors:</a:t>
+              <a:t>TSTL Team </a:t>
+            </a:r>
+            <a:r>
+              <a:rPr lang="en-US" sz="2400" b="1" dirty="0" smtClean="0">
+                <a:solidFill>
+                  <a:srgbClr val="000000"/>
+                </a:solidFill>
+                <a:latin typeface="LeituraSans-Grot 3" charset="0"/>
+                <a:cs typeface="LeituraSans-Grot 3" charset="0"/>
+              </a:rPr>
+              <a:t>/ </a:t>
+            </a:r>
+            <a:r>
+              <a:rPr lang="en-US" sz="2400" b="1" dirty="0" smtClean="0">
+                <a:solidFill>
+                  <a:srgbClr val="000000"/>
+                </a:solidFill>
+                <a:latin typeface="LeituraSans-Grot 3" charset="0"/>
+                <a:cs typeface="LeituraSans-Grot 3" charset="0"/>
+              </a:rPr>
+              <a:t>Contributors:</a:t>
             </a:r>
             <a:br>
               <a:rPr lang="en-US" sz="2400" b="1" dirty="0" smtClean="0">
@@ -5922,7 +5942,7 @@
                 <a:latin typeface="LeituraSans-Grot 3" charset="0"/>
                 <a:cs typeface="LeituraSans-Grot 3" charset="0"/>
               </a:rPr>
-              <a:t>Alex Groce, Josie Holmes, </a:t>
+              <a:t>Alex Groce, Josie Holmes, Pranjal Mittal, </a:t>
             </a:r>
             <a:r>
               <a:rPr lang="en-US" sz="2400" dirty="0" err="1" smtClean="0">
@@ -5932,7 +5952,7 @@
                 <a:latin typeface="LeituraSans-Grot 3" charset="0"/>
                 <a:cs typeface="LeituraSans-Grot 3" charset="0"/>
               </a:rPr>
-              <a:t>Pranjal</a:t>
+              <a:t>Pooria</a:t>
             </a:r>
             <a:r>
               <a:rPr lang="en-US" sz="2400" dirty="0" smtClean="0">
@@ -5942,7 +5962,7 @@
                 <a:latin typeface="LeituraSans-Grot 3" charset="0"/>
                 <a:cs typeface="LeituraSans-Grot 3" charset="0"/>
               </a:rPr>
-              <a:t> Mittal, </a:t>
+              <a:t> </a:t>
             </a:r>
             <a:r>
               <a:rPr lang="en-US" sz="2400" dirty="0" err="1" smtClean="0">
@@ -5952,7 +5972,7 @@
                 <a:latin typeface="LeituraSans-Grot 3" charset="0"/>
                 <a:cs typeface="LeituraSans-Grot 3" charset="0"/>
               </a:rPr>
-              <a:t>Pooria</a:t>
+              <a:t>Azimi</a:t>
             </a:r>
             <a:r>
               <a:rPr lang="en-US" sz="2400" dirty="0" smtClean="0">
@@ -5962,37 +5982,37 @@
                 <a:latin typeface="LeituraSans-Grot 3" charset="0"/>
                 <a:cs typeface="LeituraSans-Grot 3" charset="0"/>
               </a:rPr>
-              <a:t> </a:t>
-            </a:r>
-            <a:r>
-              <a:rPr lang="en-US" sz="2400" dirty="0" err="1" smtClean="0">
+              <a:t>, Jervis Pinto, Dr. James </a:t>
+            </a:r>
+            <a:r>
+              <a:rPr lang="en-US" sz="2400" dirty="0" smtClean="0">
                 <a:solidFill>
                   <a:srgbClr val="000000"/>
                 </a:solidFill>
                 <a:latin typeface="LeituraSans-Grot 3" charset="0"/>
                 <a:cs typeface="LeituraSans-Grot 3" charset="0"/>
               </a:rPr>
-              <a:t>Azimi</a:t>
-            </a:r>
-            <a:r>
-              <a:rPr lang="en-US" sz="2400" dirty="0" smtClean="0">
+              <a:t>O’Brien, </a:t>
+            </a:r>
+            <a:r>
+              <a:rPr lang="en-US" sz="2400" dirty="0" err="1" smtClean="0">
                 <a:solidFill>
                   <a:srgbClr val="000000"/>
                 </a:solidFill>
                 <a:latin typeface="LeituraSans-Grot 3" charset="0"/>
                 <a:cs typeface="LeituraSans-Grot 3" charset="0"/>
               </a:rPr>
-              <a:t>, Jervis Pinto, Dr. James O’Brien; thanks to Ned </a:t>
-            </a:r>
-            <a:r>
-              <a:rPr lang="en-US" sz="2400" dirty="0" err="1" smtClean="0">
+              <a:t>Hongyan</a:t>
+            </a:r>
+            <a:r>
+              <a:rPr lang="en-US" sz="2400" dirty="0" smtClean="0">
                 <a:solidFill>
                   <a:srgbClr val="000000"/>
                 </a:solidFill>
                 <a:latin typeface="LeituraSans-Grot 3" charset="0"/>
                 <a:cs typeface="LeituraSans-Grot 3" charset="0"/>
               </a:rPr>
-              <a:t>Batchelder</a:t>
+              <a:t> Yi; </a:t>
             </a:r>
             <a:r>
               <a:rPr lang="en-US" sz="2400" dirty="0" smtClean="0">
@@ -6002,7 +6022,7 @@
                 <a:latin typeface="LeituraSans-Grot 3" charset="0"/>
                 <a:cs typeface="LeituraSans-Grot 3" charset="0"/>
               </a:rPr>
-              <a:t> for </a:t>
+              <a:t>thanks to Ned </a:t>
             </a:r>
             <a:r>
               <a:rPr lang="en-US" sz="2400" dirty="0" err="1" smtClean="0">
@@ -6012,7 +6032,7 @@
                 <a:latin typeface="LeituraSans-Grot 3" charset="0"/>
                 <a:cs typeface="LeituraSans-Grot 3" charset="0"/>
               </a:rPr>
-              <a:t>coverage.py</a:t>
+              <a:t>Batchelder</a:t>
             </a:r>
             <a:r>
               <a:rPr lang="en-US" sz="2400" dirty="0" smtClean="0">
@@ -6022,17 +6042,27 @@
                 <a:latin typeface="LeituraSans-Grot 3" charset="0"/>
                 <a:cs typeface="LeituraSans-Grot 3" charset="0"/>
               </a:rPr>
-              <a:t> assistance and to students in OSU CS 362 562, </a:t>
-            </a:r>
-            <a:r>
-              <a:rPr lang="en-US" sz="2400" smtClean="0">
+              <a:t> for </a:t>
+            </a:r>
+            <a:r>
+              <a:rPr lang="en-US" sz="2400" dirty="0" err="1" smtClean="0">
                 <a:solidFill>
                   <a:srgbClr val="000000"/>
                 </a:solidFill>
                 <a:latin typeface="LeituraSans-Grot 3" charset="0"/>
                 <a:cs typeface="LeituraSans-Grot 3" charset="0"/>
               </a:rPr>
-              <a:t>and 569</a:t>
+              <a:t>coverage.py</a:t>
+            </a:r>
+            <a:r>
+              <a:rPr lang="en-US" sz="2400" dirty="0" smtClean="0">
+                <a:solidFill>
+                  <a:srgbClr val="000000"/>
+                </a:solidFill>
+                <a:latin typeface="LeituraSans-Grot 3" charset="0"/>
+                <a:cs typeface="LeituraSans-Grot 3" charset="0"/>
+              </a:rPr>
+              <a:t> assistance and to students in OSU CS 362 562, and 569</a:t>
             </a:r>
             <a:endParaRPr lang="en-US" sz="2400" dirty="0">
               <a:solidFill>
@@ -6479,17 +6509,7 @@
                 <a:latin typeface="LeituraSans-Grot 2"/>
                 <a:cs typeface="LeituraSans-Grot 2"/>
               </a:rPr>
-              <a:t>)</a:t>
-            </a:r>
-            <a:r>
-              <a:rPr lang="en-US" sz="2000" dirty="0" smtClean="0">
-                <a:solidFill>
-                  <a:srgbClr val="000000"/>
-                </a:solidFill>
-                <a:latin typeface="LeituraSans-Grot 2"/>
-                <a:cs typeface="LeituraSans-Grot 2"/>
-              </a:rPr>
-              <a:t>:</a:t>
+              <a:t>):</a:t>
             </a:r>
             <a:br>
               <a:rPr lang="en-US" sz="2000" dirty="0" smtClean="0">

</xml_diff>

<commit_message>
Fixes to flow diagram
</commit_message>
<xml_diff>
--- a/pycon-poster.pptx
+++ b/pycon-poster.pptx
@@ -4436,17 +4436,7 @@
                 <a:latin typeface="LeituraSans-Grot 2"/>
                 <a:cs typeface="LeituraSans-Grot 2"/>
               </a:rPr>
-              <a:t>the adoption of </a:t>
-            </a:r>
-            <a:r>
-              <a:rPr lang="en-US" sz="3000" dirty="0" smtClean="0">
-                <a:solidFill>
-                  <a:srgbClr val="000000"/>
-                </a:solidFill>
-                <a:latin typeface="LeituraSans-Grot 2"/>
-                <a:cs typeface="LeituraSans-Grot 2"/>
-              </a:rPr>
-              <a:t>these methods</a:t>
+              <a:t>the adoption of these methods</a:t>
             </a:r>
             <a:r>
               <a:rPr lang="en-US" sz="3000" dirty="0">
@@ -6052,27 +6042,7 @@
                 <a:latin typeface="LeituraSans-Grot 3" charset="0"/>
                 <a:cs typeface="LeituraSans-Grot 3" charset="0"/>
               </a:rPr>
-              <a:t> assistance and to students in OSU CS </a:t>
-            </a:r>
-            <a:r>
-              <a:rPr lang="en-US" sz="2400" dirty="0" smtClean="0">
-                <a:solidFill>
-                  <a:srgbClr val="000000"/>
-                </a:solidFill>
-                <a:latin typeface="LeituraSans-Grot 3" charset="0"/>
-                <a:cs typeface="LeituraSans-Grot 3" charset="0"/>
-              </a:rPr>
-              <a:t>362, </a:t>
-            </a:r>
-            <a:r>
-              <a:rPr lang="en-US" sz="2400" dirty="0" smtClean="0">
-                <a:solidFill>
-                  <a:srgbClr val="000000"/>
-                </a:solidFill>
-                <a:latin typeface="LeituraSans-Grot 3" charset="0"/>
-                <a:cs typeface="LeituraSans-Grot 3" charset="0"/>
-              </a:rPr>
-              <a:t>562, and 569</a:t>
+              <a:t> assistance and to students in OSU CS 362, 562, and 569</a:t>
             </a:r>
             <a:endParaRPr lang="en-US" sz="2400" dirty="0">
               <a:solidFill>
@@ -6086,7 +6056,7 @@
       </p:sp>
       <p:pic>
         <p:nvPicPr>
-          <p:cNvPr id="7" name="Picture 6" descr="TSTL Architecture Diagram (3).png"/>
+          <p:cNvPr id="11" name="Picture 10" descr="Screen Shot 2016-05-12 at 4.38.52 PM.png"/>
           <p:cNvPicPr>
             <a:picLocks noChangeAspect="1"/>
           </p:cNvPicPr>
@@ -6106,36 +6076,6 @@
         </p:blipFill>
         <p:spPr>
           <a:xfrm>
-            <a:off x="11582400" y="8305800"/>
-            <a:ext cx="19377185" cy="9296400"/>
-          </a:xfrm>
-          <a:prstGeom prst="rect">
-            <a:avLst/>
-          </a:prstGeom>
-        </p:spPr>
-      </p:pic>
-      <p:pic>
-        <p:nvPicPr>
-          <p:cNvPr id="11" name="Picture 10" descr="Screen Shot 2016-05-12 at 4.38.52 PM.png"/>
-          <p:cNvPicPr>
-            <a:picLocks noChangeAspect="1"/>
-          </p:cNvPicPr>
-          <p:nvPr/>
-        </p:nvPicPr>
-        <p:blipFill>
-          <a:blip r:embed="rId3">
-            <a:extLst>
-              <a:ext uri="{28A0092B-C50C-407E-A947-70E740481C1C}">
-                <a14:useLocalDpi xmlns:a14="http://schemas.microsoft.com/office/drawing/2010/main" val="0"/>
-              </a:ext>
-            </a:extLst>
-          </a:blip>
-          <a:stretch>
-            <a:fillRect/>
-          </a:stretch>
-        </p:blipFill>
-        <p:spPr>
-          <a:xfrm>
             <a:off x="11963400" y="27660600"/>
             <a:ext cx="8458200" cy="9188613"/>
           </a:xfrm>
@@ -6302,7 +6242,7 @@
                 </a:solidFill>
                 <a:latin typeface="LeituraSans-Grot 2"/>
                 <a:cs typeface="LeituraSans-Grot 2"/>
-                <a:hlinkClick r:id="rId4"/>
+                <a:hlinkClick r:id="rId3"/>
               </a:rPr>
               <a:t>http</a:t>
             </a:r>
@@ -6313,7 +6253,7 @@
                 </a:solidFill>
                 <a:latin typeface="LeituraSans-Grot 2"/>
                 <a:cs typeface="LeituraSans-Grot 2"/>
-                <a:hlinkClick r:id="rId4"/>
+                <a:hlinkClick r:id="rId3"/>
               </a:rPr>
               <a:t>://www.cs.cmu.edu/~agroce/nfm15.</a:t>
             </a:r>
@@ -6324,7 +6264,7 @@
                 </a:solidFill>
                 <a:latin typeface="LeituraSans-Grot 2"/>
                 <a:cs typeface="LeituraSans-Grot 2"/>
-                <a:hlinkClick r:id="rId4"/>
+                <a:hlinkClick r:id="rId3"/>
               </a:rPr>
               <a:t>pdf</a:t>
             </a:r>
@@ -6373,7 +6313,7 @@
                 </a:solidFill>
                 <a:latin typeface="LeituraSans-Grot 2"/>
                 <a:cs typeface="LeituraSans-Grot 2"/>
-                <a:hlinkClick r:id="rId5"/>
+                <a:hlinkClick r:id="rId4"/>
               </a:rPr>
               <a:t>http://dl.acm.org/citation.cfm?id=2784769</a:t>
             </a:r>
@@ -6427,7 +6367,7 @@
                 </a:solidFill>
                 <a:latin typeface="LeituraSans-Grot 2"/>
                 <a:cs typeface="LeituraSans-Grot 2"/>
-                <a:hlinkClick r:id="rId6"/>
+                <a:hlinkClick r:id="rId5"/>
               </a:rPr>
               <a:t>https:</a:t>
             </a:r>
@@ -6438,7 +6378,7 @@
                 </a:solidFill>
                 <a:latin typeface="LeituraSans-Grot 2"/>
                 <a:cs typeface="LeituraSans-Grot 2"/>
-                <a:hlinkClick r:id="rId6"/>
+                <a:hlinkClick r:id="rId5"/>
               </a:rPr>
               <a:t>//github.com/agroce/</a:t>
             </a:r>
@@ -6449,7 +6389,7 @@
                 </a:solidFill>
                 <a:latin typeface="LeituraSans-Grot 2"/>
                 <a:cs typeface="LeituraSans-Grot 2"/>
-                <a:hlinkClick r:id="rId6"/>
+                <a:hlinkClick r:id="rId5"/>
               </a:rPr>
               <a:t>tstl</a:t>
             </a:r>
@@ -6537,7 +6477,7 @@
                 </a:solidFill>
                 <a:latin typeface="LeituraSans-Grot 2"/>
                 <a:cs typeface="LeituraSans-Grot 2"/>
-                <a:hlinkClick r:id="rId7"/>
+                <a:hlinkClick r:id="rId6"/>
               </a:rPr>
               <a:t>https://github.com/flipturnapps/TSTL-Java</a:t>
             </a:r>
@@ -6601,7 +6541,7 @@
                 </a:solidFill>
                 <a:latin typeface="LeituraSans-Grot 2"/>
                 <a:cs typeface="LeituraSans-Grot 2"/>
-                <a:hlinkClick r:id="rId8"/>
+                <a:hlinkClick r:id="rId7"/>
               </a:rPr>
               <a:t>https://github.com/pramttl/pycon2016-poster-tstl</a:t>
             </a:r>
@@ -6963,7 +6903,7 @@
           <p:nvPr/>
         </p:nvPicPr>
         <p:blipFill>
-          <a:blip r:embed="rId9" cstate="print">
+          <a:blip r:embed="rId8" cstate="print">
             <a:extLst>
               <a:ext uri="{28A0092B-C50C-407E-A947-70E740481C1C}">
                 <a14:useLocalDpi xmlns:a14="http://schemas.microsoft.com/office/drawing/2010/main" val="0"/>
@@ -6987,6 +6927,36 @@
       <p:pic>
         <p:nvPicPr>
           <p:cNvPr id="3" name="Picture 2" descr="Screen Shot 2016-05-15 at 2.55.43 PM.png"/>
+          <p:cNvPicPr>
+            <a:picLocks noChangeAspect="1"/>
+          </p:cNvPicPr>
+          <p:nvPr/>
+        </p:nvPicPr>
+        <p:blipFill>
+          <a:blip r:embed="rId9">
+            <a:extLst>
+              <a:ext uri="{28A0092B-C50C-407E-A947-70E740481C1C}">
+                <a14:useLocalDpi xmlns:a14="http://schemas.microsoft.com/office/drawing/2010/main" val="0"/>
+              </a:ext>
+            </a:extLst>
+          </a:blip>
+          <a:stretch>
+            <a:fillRect/>
+          </a:stretch>
+        </p:blipFill>
+        <p:spPr>
+          <a:xfrm>
+            <a:off x="11582400" y="19050000"/>
+            <a:ext cx="9525000" cy="6365875"/>
+          </a:xfrm>
+          <a:prstGeom prst="rect">
+            <a:avLst/>
+          </a:prstGeom>
+        </p:spPr>
+      </p:pic>
+      <p:pic>
+        <p:nvPicPr>
+          <p:cNvPr id="4" name="Picture 3" descr="TSTL Architecture Diagram (4).png"/>
           <p:cNvPicPr>
             <a:picLocks noChangeAspect="1"/>
           </p:cNvPicPr>
@@ -7006,8 +6976,8 @@
         </p:blipFill>
         <p:spPr>
           <a:xfrm>
-            <a:off x="11582400" y="19050000"/>
-            <a:ext cx="9525000" cy="6365875"/>
+            <a:off x="11353800" y="8915400"/>
+            <a:ext cx="20254677" cy="8915400"/>
           </a:xfrm>
           <a:prstGeom prst="rect">
             <a:avLst/>

</xml_diff>